<commit_message>
Commit Proyectos Patrones Estructurales Completos
</commit_message>
<xml_diff>
--- a/Slides/5_Patrones_Estructurales.pptx
+++ b/Slides/5_Patrones_Estructurales.pptx
@@ -42,8 +42,19 @@
     <p:sldId id="337" r:id="rId36"/>
     <p:sldId id="339" r:id="rId37"/>
     <p:sldId id="340" r:id="rId38"/>
-    <p:sldId id="303" r:id="rId39"/>
-    <p:sldId id="304" r:id="rId40"/>
+    <p:sldId id="341" r:id="rId39"/>
+    <p:sldId id="342" r:id="rId40"/>
+    <p:sldId id="343" r:id="rId41"/>
+    <p:sldId id="344" r:id="rId42"/>
+    <p:sldId id="345" r:id="rId43"/>
+    <p:sldId id="346" r:id="rId44"/>
+    <p:sldId id="347" r:id="rId45"/>
+    <p:sldId id="348" r:id="rId46"/>
+    <p:sldId id="349" r:id="rId47"/>
+    <p:sldId id="350" r:id="rId48"/>
+    <p:sldId id="351" r:id="rId49"/>
+    <p:sldId id="303" r:id="rId50"/>
+    <p:sldId id="304" r:id="rId51"/>
   </p:sldIdLst>
   <p:sldSz cx="12192000" cy="6858000"/>
   <p:notesSz cx="6858000" cy="9144000"/>
@@ -155,7 +166,7 @@
   <pc:docChgLst>
     <pc:chgData name="Cesar Augusto Lopez Gallego" userId="0dfa9112-9251-4882-b472-cf2dfcee09d1" providerId="ADAL" clId="{9AE26A11-4DF8-499E-A657-41CE392852CE}"/>
     <pc:docChg chg="undo redo custSel addSld delSld modSld sldOrd">
-      <pc:chgData name="Cesar Augusto Lopez Gallego" userId="0dfa9112-9251-4882-b472-cf2dfcee09d1" providerId="ADAL" clId="{9AE26A11-4DF8-499E-A657-41CE392852CE}" dt="2025-03-05T12:21:38.006" v="5571" actId="20577"/>
+      <pc:chgData name="Cesar Augusto Lopez Gallego" userId="0dfa9112-9251-4882-b472-cf2dfcee09d1" providerId="ADAL" clId="{9AE26A11-4DF8-499E-A657-41CE392852CE}" dt="2025-03-07T01:39:04.153" v="8811" actId="20577"/>
       <pc:docMkLst>
         <pc:docMk/>
       </pc:docMkLst>
@@ -2357,6 +2368,140 @@
           <pc:sldMk cId="2402638101" sldId="341"/>
         </pc:sldMkLst>
       </pc:sldChg>
+      <pc:sldChg chg="addSp delSp modSp new mod">
+        <pc:chgData name="Cesar Augusto Lopez Gallego" userId="0dfa9112-9251-4882-b472-cf2dfcee09d1" providerId="ADAL" clId="{9AE26A11-4DF8-499E-A657-41CE392852CE}" dt="2025-03-06T12:54:13.298" v="6737" actId="20577"/>
+        <pc:sldMkLst>
+          <pc:docMk/>
+          <pc:sldMk cId="2953447785" sldId="341"/>
+        </pc:sldMkLst>
+        <pc:spChg chg="add mod">
+          <ac:chgData name="Cesar Augusto Lopez Gallego" userId="0dfa9112-9251-4882-b472-cf2dfcee09d1" providerId="ADAL" clId="{9AE26A11-4DF8-499E-A657-41CE392852CE}" dt="2025-03-06T12:22:50.809" v="5588" actId="20577"/>
+          <ac:spMkLst>
+            <pc:docMk/>
+            <pc:sldMk cId="2953447785" sldId="341"/>
+            <ac:spMk id="2" creationId="{D2A3C107-9D8F-4BF5-991A-97A89C0E2244}"/>
+          </ac:spMkLst>
+        </pc:spChg>
+        <pc:spChg chg="add mod">
+          <ac:chgData name="Cesar Augusto Lopez Gallego" userId="0dfa9112-9251-4882-b472-cf2dfcee09d1" providerId="ADAL" clId="{9AE26A11-4DF8-499E-A657-41CE392852CE}" dt="2025-03-06T12:54:13.298" v="6737" actId="20577"/>
+          <ac:spMkLst>
+            <pc:docMk/>
+            <pc:sldMk cId="2953447785" sldId="341"/>
+            <ac:spMk id="4" creationId="{C3FE3822-AF3A-4946-914B-6885EFB67664}"/>
+          </ac:spMkLst>
+        </pc:spChg>
+        <pc:spChg chg="add del mod">
+          <ac:chgData name="Cesar Augusto Lopez Gallego" userId="0dfa9112-9251-4882-b472-cf2dfcee09d1" providerId="ADAL" clId="{9AE26A11-4DF8-499E-A657-41CE392852CE}" dt="2025-03-06T12:47:03.254" v="6515" actId="478"/>
+          <ac:spMkLst>
+            <pc:docMk/>
+            <pc:sldMk cId="2953447785" sldId="341"/>
+            <ac:spMk id="7" creationId="{063406EB-ECF2-44DE-AC57-DCEDD91EC884}"/>
+          </ac:spMkLst>
+        </pc:spChg>
+        <pc:spChg chg="add del mod">
+          <ac:chgData name="Cesar Augusto Lopez Gallego" userId="0dfa9112-9251-4882-b472-cf2dfcee09d1" providerId="ADAL" clId="{9AE26A11-4DF8-499E-A657-41CE392852CE}" dt="2025-03-06T12:47:03.254" v="6515" actId="478"/>
+          <ac:spMkLst>
+            <pc:docMk/>
+            <pc:sldMk cId="2953447785" sldId="341"/>
+            <ac:spMk id="9" creationId="{2FA83485-12A2-4886-8ABB-43A1E16A7E63}"/>
+          </ac:spMkLst>
+        </pc:spChg>
+        <pc:spChg chg="add del mod">
+          <ac:chgData name="Cesar Augusto Lopez Gallego" userId="0dfa9112-9251-4882-b472-cf2dfcee09d1" providerId="ADAL" clId="{9AE26A11-4DF8-499E-A657-41CE392852CE}" dt="2025-03-06T12:47:03.254" v="6515" actId="478"/>
+          <ac:spMkLst>
+            <pc:docMk/>
+            <pc:sldMk cId="2953447785" sldId="341"/>
+            <ac:spMk id="10" creationId="{CC691FED-17A5-4906-8DFD-FDEEBD68DBBC}"/>
+          </ac:spMkLst>
+        </pc:spChg>
+        <pc:picChg chg="add del mod">
+          <ac:chgData name="Cesar Augusto Lopez Gallego" userId="0dfa9112-9251-4882-b472-cf2dfcee09d1" providerId="ADAL" clId="{9AE26A11-4DF8-499E-A657-41CE392852CE}" dt="2025-03-06T12:47:03.254" v="6515" actId="478"/>
+          <ac:picMkLst>
+            <pc:docMk/>
+            <pc:sldMk cId="2953447785" sldId="341"/>
+            <ac:picMk id="6" creationId="{D18DC27B-0B9B-4547-853C-04A8D7F8F7C4}"/>
+          </ac:picMkLst>
+        </pc:picChg>
+        <pc:picChg chg="add mod">
+          <ac:chgData name="Cesar Augusto Lopez Gallego" userId="0dfa9112-9251-4882-b472-cf2dfcee09d1" providerId="ADAL" clId="{9AE26A11-4DF8-499E-A657-41CE392852CE}" dt="2025-03-06T12:50:07.766" v="6583" actId="14100"/>
+          <ac:picMkLst>
+            <pc:docMk/>
+            <pc:sldMk cId="2953447785" sldId="341"/>
+            <ac:picMk id="12" creationId="{BC811D23-2701-45AA-9496-7E9BCE691EE9}"/>
+          </ac:picMkLst>
+        </pc:picChg>
+      </pc:sldChg>
+      <pc:sldChg chg="addSp modSp new mod">
+        <pc:chgData name="Cesar Augusto Lopez Gallego" userId="0dfa9112-9251-4882-b472-cf2dfcee09d1" providerId="ADAL" clId="{9AE26A11-4DF8-499E-A657-41CE392852CE}" dt="2025-03-06T23:23:09.002" v="6945" actId="1076"/>
+        <pc:sldMkLst>
+          <pc:docMk/>
+          <pc:sldMk cId="2120660414" sldId="342"/>
+        </pc:sldMkLst>
+        <pc:spChg chg="add mod">
+          <ac:chgData name="Cesar Augusto Lopez Gallego" userId="0dfa9112-9251-4882-b472-cf2dfcee09d1" providerId="ADAL" clId="{9AE26A11-4DF8-499E-A657-41CE392852CE}" dt="2025-03-06T23:21:51.020" v="6864" actId="1076"/>
+          <ac:spMkLst>
+            <pc:docMk/>
+            <pc:sldMk cId="2120660414" sldId="342"/>
+            <ac:spMk id="3" creationId="{E8741A7A-9FC6-4AFF-8148-C00DCEC70EEC}"/>
+          </ac:spMkLst>
+        </pc:spChg>
+        <pc:spChg chg="add mod">
+          <ac:chgData name="Cesar Augusto Lopez Gallego" userId="0dfa9112-9251-4882-b472-cf2dfcee09d1" providerId="ADAL" clId="{9AE26A11-4DF8-499E-A657-41CE392852CE}" dt="2025-03-06T12:51:33.314" v="6660" actId="1076"/>
+          <ac:spMkLst>
+            <pc:docMk/>
+            <pc:sldMk cId="2120660414" sldId="342"/>
+            <ac:spMk id="4" creationId="{36C4BA92-15E6-48DB-8FCB-35FD123077E1}"/>
+          </ac:spMkLst>
+        </pc:spChg>
+        <pc:spChg chg="add mod">
+          <ac:chgData name="Cesar Augusto Lopez Gallego" userId="0dfa9112-9251-4882-b472-cf2dfcee09d1" providerId="ADAL" clId="{9AE26A11-4DF8-499E-A657-41CE392852CE}" dt="2025-03-06T23:22:38.850" v="6936" actId="1076"/>
+          <ac:spMkLst>
+            <pc:docMk/>
+            <pc:sldMk cId="2120660414" sldId="342"/>
+            <ac:spMk id="5" creationId="{A226E491-DAD0-4CB0-A4E5-28F3AF455521}"/>
+          </ac:spMkLst>
+        </pc:spChg>
+        <pc:spChg chg="add mod">
+          <ac:chgData name="Cesar Augusto Lopez Gallego" userId="0dfa9112-9251-4882-b472-cf2dfcee09d1" providerId="ADAL" clId="{9AE26A11-4DF8-499E-A657-41CE392852CE}" dt="2025-03-06T12:47:17.306" v="6519"/>
+          <ac:spMkLst>
+            <pc:docMk/>
+            <pc:sldMk cId="2120660414" sldId="342"/>
+            <ac:spMk id="6" creationId="{2A299067-B7A1-4379-ACF5-74CEC71BF6C7}"/>
+          </ac:spMkLst>
+        </pc:spChg>
+        <pc:spChg chg="add mod">
+          <ac:chgData name="Cesar Augusto Lopez Gallego" userId="0dfa9112-9251-4882-b472-cf2dfcee09d1" providerId="ADAL" clId="{9AE26A11-4DF8-499E-A657-41CE392852CE}" dt="2025-03-06T23:23:09.002" v="6945" actId="1076"/>
+          <ac:spMkLst>
+            <pc:docMk/>
+            <pc:sldMk cId="2120660414" sldId="342"/>
+            <ac:spMk id="7" creationId="{13928D20-D713-4C5C-AE94-A8EA0B91E828}"/>
+          </ac:spMkLst>
+        </pc:spChg>
+        <pc:spChg chg="add mod">
+          <ac:chgData name="Cesar Augusto Lopez Gallego" userId="0dfa9112-9251-4882-b472-cf2dfcee09d1" providerId="ADAL" clId="{9AE26A11-4DF8-499E-A657-41CE392852CE}" dt="2025-03-06T23:22:31.435" v="6935" actId="1076"/>
+          <ac:spMkLst>
+            <pc:docMk/>
+            <pc:sldMk cId="2120660414" sldId="342"/>
+            <ac:spMk id="9" creationId="{D95E5FB6-46A8-4B0B-BB7B-B4680C42C044}"/>
+          </ac:spMkLst>
+        </pc:spChg>
+        <pc:spChg chg="add mod">
+          <ac:chgData name="Cesar Augusto Lopez Gallego" userId="0dfa9112-9251-4882-b472-cf2dfcee09d1" providerId="ADAL" clId="{9AE26A11-4DF8-499E-A657-41CE392852CE}" dt="2025-03-06T23:23:02.179" v="6944" actId="14100"/>
+          <ac:spMkLst>
+            <pc:docMk/>
+            <pc:sldMk cId="2120660414" sldId="342"/>
+            <ac:spMk id="10" creationId="{5CFD0819-92C1-49E0-AF24-683C08C2AB7B}"/>
+          </ac:spMkLst>
+        </pc:spChg>
+        <pc:picChg chg="add mod">
+          <ac:chgData name="Cesar Augusto Lopez Gallego" userId="0dfa9112-9251-4882-b472-cf2dfcee09d1" providerId="ADAL" clId="{9AE26A11-4DF8-499E-A657-41CE392852CE}" dt="2025-03-06T12:47:19.718" v="6520" actId="1076"/>
+          <ac:picMkLst>
+            <pc:docMk/>
+            <pc:sldMk cId="2120660414" sldId="342"/>
+            <ac:picMk id="2" creationId="{E52307E4-6719-452E-9485-77A2A1E7DFAC}"/>
+          </ac:picMkLst>
+        </pc:picChg>
+      </pc:sldChg>
       <pc:sldChg chg="del">
         <pc:chgData name="Cesar Augusto Lopez Gallego" userId="0dfa9112-9251-4882-b472-cf2dfcee09d1" providerId="ADAL" clId="{9AE26A11-4DF8-499E-A657-41CE392852CE}" dt="2025-03-03T22:01:40.300" v="0" actId="47"/>
         <pc:sldMkLst>
@@ -2364,12 +2509,146 @@
           <pc:sldMk cId="2157447811" sldId="342"/>
         </pc:sldMkLst>
       </pc:sldChg>
+      <pc:sldChg chg="addSp modSp new mod">
+        <pc:chgData name="Cesar Augusto Lopez Gallego" userId="0dfa9112-9251-4882-b472-cf2dfcee09d1" providerId="ADAL" clId="{9AE26A11-4DF8-499E-A657-41CE392852CE}" dt="2025-03-07T00:10:24.486" v="7269" actId="1076"/>
+        <pc:sldMkLst>
+          <pc:docMk/>
+          <pc:sldMk cId="870906304" sldId="343"/>
+        </pc:sldMkLst>
+        <pc:spChg chg="add mod">
+          <ac:chgData name="Cesar Augusto Lopez Gallego" userId="0dfa9112-9251-4882-b472-cf2dfcee09d1" providerId="ADAL" clId="{9AE26A11-4DF8-499E-A657-41CE392852CE}" dt="2025-03-06T23:23:43.897" v="6995" actId="1076"/>
+          <ac:spMkLst>
+            <pc:docMk/>
+            <pc:sldMk cId="870906304" sldId="343"/>
+            <ac:spMk id="2" creationId="{A390C258-B5A2-4D02-8484-603436154632}"/>
+          </ac:spMkLst>
+        </pc:spChg>
+        <pc:spChg chg="add mod">
+          <ac:chgData name="Cesar Augusto Lopez Gallego" userId="0dfa9112-9251-4882-b472-cf2dfcee09d1" providerId="ADAL" clId="{9AE26A11-4DF8-499E-A657-41CE392852CE}" dt="2025-03-06T23:33:48.375" v="7252" actId="5793"/>
+          <ac:spMkLst>
+            <pc:docMk/>
+            <pc:sldMk cId="870906304" sldId="343"/>
+            <ac:spMk id="3" creationId="{520685AC-4F31-4AE7-B480-CA8FEE6579CE}"/>
+          </ac:spMkLst>
+        </pc:spChg>
+        <pc:spChg chg="add mod">
+          <ac:chgData name="Cesar Augusto Lopez Gallego" userId="0dfa9112-9251-4882-b472-cf2dfcee09d1" providerId="ADAL" clId="{9AE26A11-4DF8-499E-A657-41CE392852CE}" dt="2025-03-06T23:35:36.642" v="7264" actId="1076"/>
+          <ac:spMkLst>
+            <pc:docMk/>
+            <pc:sldMk cId="870906304" sldId="343"/>
+            <ac:spMk id="5" creationId="{D077E009-3DD6-44E7-94DC-88502E70E3F1}"/>
+          </ac:spMkLst>
+        </pc:spChg>
+        <pc:spChg chg="add mod">
+          <ac:chgData name="Cesar Augusto Lopez Gallego" userId="0dfa9112-9251-4882-b472-cf2dfcee09d1" providerId="ADAL" clId="{9AE26A11-4DF8-499E-A657-41CE392852CE}" dt="2025-03-07T00:10:24.486" v="7269" actId="1076"/>
+          <ac:spMkLst>
+            <pc:docMk/>
+            <pc:sldMk cId="870906304" sldId="343"/>
+            <ac:spMk id="7" creationId="{4379FCA7-249C-4E4D-B810-B975653156EB}"/>
+          </ac:spMkLst>
+        </pc:spChg>
+        <pc:spChg chg="add mod">
+          <ac:chgData name="Cesar Augusto Lopez Gallego" userId="0dfa9112-9251-4882-b472-cf2dfcee09d1" providerId="ADAL" clId="{9AE26A11-4DF8-499E-A657-41CE392852CE}" dt="2025-03-06T23:36:01.179" v="7268" actId="113"/>
+          <ac:spMkLst>
+            <pc:docMk/>
+            <pc:sldMk cId="870906304" sldId="343"/>
+            <ac:spMk id="9" creationId="{9C9B2CAF-333C-4B55-ADCB-043BCB15324F}"/>
+          </ac:spMkLst>
+        </pc:spChg>
+        <pc:picChg chg="add mod">
+          <ac:chgData name="Cesar Augusto Lopez Gallego" userId="0dfa9112-9251-4882-b472-cf2dfcee09d1" providerId="ADAL" clId="{9AE26A11-4DF8-499E-A657-41CE392852CE}" dt="2025-03-06T23:28:43.293" v="7215" actId="1076"/>
+          <ac:picMkLst>
+            <pc:docMk/>
+            <pc:sldMk cId="870906304" sldId="343"/>
+            <ac:picMk id="4" creationId="{55CA70E6-C136-4058-86DA-4C1A5129AF28}"/>
+          </ac:picMkLst>
+        </pc:picChg>
+      </pc:sldChg>
       <pc:sldChg chg="del">
         <pc:chgData name="Cesar Augusto Lopez Gallego" userId="0dfa9112-9251-4882-b472-cf2dfcee09d1" providerId="ADAL" clId="{9AE26A11-4DF8-499E-A657-41CE392852CE}" dt="2025-03-03T22:01:40.300" v="0" actId="47"/>
         <pc:sldMkLst>
           <pc:docMk/>
           <pc:sldMk cId="4048408092" sldId="343"/>
         </pc:sldMkLst>
+      </pc:sldChg>
+      <pc:sldChg chg="addSp modSp new mod">
+        <pc:chgData name="Cesar Augusto Lopez Gallego" userId="0dfa9112-9251-4882-b472-cf2dfcee09d1" providerId="ADAL" clId="{9AE26A11-4DF8-499E-A657-41CE392852CE}" dt="2025-03-07T00:26:43.385" v="7905" actId="404"/>
+        <pc:sldMkLst>
+          <pc:docMk/>
+          <pc:sldMk cId="2914004312" sldId="344"/>
+        </pc:sldMkLst>
+        <pc:spChg chg="add mod">
+          <ac:chgData name="Cesar Augusto Lopez Gallego" userId="0dfa9112-9251-4882-b472-cf2dfcee09d1" providerId="ADAL" clId="{9AE26A11-4DF8-499E-A657-41CE392852CE}" dt="2025-03-07T00:26:22.214" v="7898" actId="1076"/>
+          <ac:spMkLst>
+            <pc:docMk/>
+            <pc:sldMk cId="2914004312" sldId="344"/>
+            <ac:spMk id="4" creationId="{0000DEDF-7BB8-43B9-A789-150006746B42}"/>
+          </ac:spMkLst>
+        </pc:spChg>
+        <pc:spChg chg="add mod">
+          <ac:chgData name="Cesar Augusto Lopez Gallego" userId="0dfa9112-9251-4882-b472-cf2dfcee09d1" providerId="ADAL" clId="{9AE26A11-4DF8-499E-A657-41CE392852CE}" dt="2025-03-07T00:26:43.385" v="7905" actId="404"/>
+          <ac:spMkLst>
+            <pc:docMk/>
+            <pc:sldMk cId="2914004312" sldId="344"/>
+            <ac:spMk id="9" creationId="{3BAB920C-BB0A-415D-8FC2-E6985B0D544A}"/>
+          </ac:spMkLst>
+        </pc:spChg>
+        <pc:spChg chg="add mod">
+          <ac:chgData name="Cesar Augusto Lopez Gallego" userId="0dfa9112-9251-4882-b472-cf2dfcee09d1" providerId="ADAL" clId="{9AE26A11-4DF8-499E-A657-41CE392852CE}" dt="2025-03-07T00:19:15.998" v="7296" actId="20577"/>
+          <ac:spMkLst>
+            <pc:docMk/>
+            <pc:sldMk cId="2914004312" sldId="344"/>
+            <ac:spMk id="10" creationId="{A2DBDD11-46FE-4EDC-B5C3-C9A0C153B30A}"/>
+          </ac:spMkLst>
+        </pc:spChg>
+        <pc:spChg chg="add mod">
+          <ac:chgData name="Cesar Augusto Lopez Gallego" userId="0dfa9112-9251-4882-b472-cf2dfcee09d1" providerId="ADAL" clId="{9AE26A11-4DF8-499E-A657-41CE392852CE}" dt="2025-03-07T00:26:34.421" v="7903" actId="1076"/>
+          <ac:spMkLst>
+            <pc:docMk/>
+            <pc:sldMk cId="2914004312" sldId="344"/>
+            <ac:spMk id="14" creationId="{77F59832-C639-45E9-9765-36F7A32724A6}"/>
+          </ac:spMkLst>
+        </pc:spChg>
+        <pc:grpChg chg="add mod">
+          <ac:chgData name="Cesar Augusto Lopez Gallego" userId="0dfa9112-9251-4882-b472-cf2dfcee09d1" providerId="ADAL" clId="{9AE26A11-4DF8-499E-A657-41CE392852CE}" dt="2025-03-07T00:26:22.214" v="7898" actId="1076"/>
+          <ac:grpSpMkLst>
+            <pc:docMk/>
+            <pc:sldMk cId="2914004312" sldId="344"/>
+            <ac:grpSpMk id="11" creationId="{8B3527FE-C538-4745-A640-1159BBCA54AA}"/>
+          </ac:grpSpMkLst>
+        </pc:grpChg>
+        <pc:picChg chg="add mod">
+          <ac:chgData name="Cesar Augusto Lopez Gallego" userId="0dfa9112-9251-4882-b472-cf2dfcee09d1" providerId="ADAL" clId="{9AE26A11-4DF8-499E-A657-41CE392852CE}" dt="2025-03-07T00:26:22.214" v="7898" actId="1076"/>
+          <ac:picMkLst>
+            <pc:docMk/>
+            <pc:sldMk cId="2914004312" sldId="344"/>
+            <ac:picMk id="3" creationId="{F81B87A4-636F-4635-B656-7C8821598890}"/>
+          </ac:picMkLst>
+        </pc:picChg>
+        <pc:picChg chg="add mod">
+          <ac:chgData name="Cesar Augusto Lopez Gallego" userId="0dfa9112-9251-4882-b472-cf2dfcee09d1" providerId="ADAL" clId="{9AE26A11-4DF8-499E-A657-41CE392852CE}" dt="2025-03-07T00:26:32.174" v="7902" actId="14100"/>
+          <ac:picMkLst>
+            <pc:docMk/>
+            <pc:sldMk cId="2914004312" sldId="344"/>
+            <ac:picMk id="13" creationId="{2A8C130D-AB5C-41DC-9144-B4C494DCBEFE}"/>
+          </ac:picMkLst>
+        </pc:picChg>
+        <pc:picChg chg="add mod">
+          <ac:chgData name="Cesar Augusto Lopez Gallego" userId="0dfa9112-9251-4882-b472-cf2dfcee09d1" providerId="ADAL" clId="{9AE26A11-4DF8-499E-A657-41CE392852CE}" dt="2025-03-07T00:26:22.214" v="7898" actId="1076"/>
+          <ac:picMkLst>
+            <pc:docMk/>
+            <pc:sldMk cId="2914004312" sldId="344"/>
+            <ac:picMk id="1026" creationId="{314889F9-B490-44D4-A56F-608333A9493A}"/>
+          </ac:picMkLst>
+        </pc:picChg>
+        <pc:cxnChg chg="add mod">
+          <ac:chgData name="Cesar Augusto Lopez Gallego" userId="0dfa9112-9251-4882-b472-cf2dfcee09d1" providerId="ADAL" clId="{9AE26A11-4DF8-499E-A657-41CE392852CE}" dt="2025-03-07T00:26:22.214" v="7898" actId="1076"/>
+          <ac:cxnSpMkLst>
+            <pc:docMk/>
+            <pc:sldMk cId="2914004312" sldId="344"/>
+            <ac:cxnSpMk id="6" creationId="{B9BCEDD9-1783-4BAD-B329-7BD91BBC26AD}"/>
+          </ac:cxnSpMkLst>
+        </pc:cxnChg>
       </pc:sldChg>
       <pc:sldChg chg="del">
         <pc:chgData name="Cesar Augusto Lopez Gallego" userId="0dfa9112-9251-4882-b472-cf2dfcee09d1" providerId="ADAL" clId="{9AE26A11-4DF8-499E-A657-41CE392852CE}" dt="2025-03-03T22:01:40.300" v="0" actId="47"/>
@@ -2385,12 +2664,90 @@
           <pc:sldMk cId="1624091320" sldId="345"/>
         </pc:sldMkLst>
       </pc:sldChg>
+      <pc:sldChg chg="addSp modSp new mod">
+        <pc:chgData name="Cesar Augusto Lopez Gallego" userId="0dfa9112-9251-4882-b472-cf2dfcee09d1" providerId="ADAL" clId="{9AE26A11-4DF8-499E-A657-41CE392852CE}" dt="2025-03-07T00:32:33.094" v="7969" actId="113"/>
+        <pc:sldMkLst>
+          <pc:docMk/>
+          <pc:sldMk cId="2934238383" sldId="345"/>
+        </pc:sldMkLst>
+        <pc:spChg chg="add mod">
+          <ac:chgData name="Cesar Augusto Lopez Gallego" userId="0dfa9112-9251-4882-b472-cf2dfcee09d1" providerId="ADAL" clId="{9AE26A11-4DF8-499E-A657-41CE392852CE}" dt="2025-03-07T00:29:45.397" v="7916" actId="20577"/>
+          <ac:spMkLst>
+            <pc:docMk/>
+            <pc:sldMk cId="2934238383" sldId="345"/>
+            <ac:spMk id="2" creationId="{A76A8214-277D-4F3D-9AE3-F0CEB8C6CF2B}"/>
+          </ac:spMkLst>
+        </pc:spChg>
+        <pc:spChg chg="add mod">
+          <ac:chgData name="Cesar Augusto Lopez Gallego" userId="0dfa9112-9251-4882-b472-cf2dfcee09d1" providerId="ADAL" clId="{9AE26A11-4DF8-499E-A657-41CE392852CE}" dt="2025-03-07T00:32:10.085" v="7938" actId="1076"/>
+          <ac:spMkLst>
+            <pc:docMk/>
+            <pc:sldMk cId="2934238383" sldId="345"/>
+            <ac:spMk id="4" creationId="{F6505008-52E0-47DA-B358-340DB3EE2613}"/>
+          </ac:spMkLst>
+        </pc:spChg>
+        <pc:spChg chg="add mod">
+          <ac:chgData name="Cesar Augusto Lopez Gallego" userId="0dfa9112-9251-4882-b472-cf2dfcee09d1" providerId="ADAL" clId="{9AE26A11-4DF8-499E-A657-41CE392852CE}" dt="2025-03-07T00:32:33.094" v="7969" actId="113"/>
+          <ac:spMkLst>
+            <pc:docMk/>
+            <pc:sldMk cId="2934238383" sldId="345"/>
+            <ac:spMk id="7" creationId="{3C87D1ED-4C86-4ADD-A78A-3EAC68483665}"/>
+          </ac:spMkLst>
+        </pc:spChg>
+        <pc:picChg chg="add mod">
+          <ac:chgData name="Cesar Augusto Lopez Gallego" userId="0dfa9112-9251-4882-b472-cf2dfcee09d1" providerId="ADAL" clId="{9AE26A11-4DF8-499E-A657-41CE392852CE}" dt="2025-03-07T00:32:14.317" v="7941" actId="1076"/>
+          <ac:picMkLst>
+            <pc:docMk/>
+            <pc:sldMk cId="2934238383" sldId="345"/>
+            <ac:picMk id="6" creationId="{B726069C-0BEC-43AF-82DA-D7908E6FC6CA}"/>
+          </ac:picMkLst>
+        </pc:picChg>
+      </pc:sldChg>
       <pc:sldChg chg="del">
         <pc:chgData name="Cesar Augusto Lopez Gallego" userId="0dfa9112-9251-4882-b472-cf2dfcee09d1" providerId="ADAL" clId="{9AE26A11-4DF8-499E-A657-41CE392852CE}" dt="2025-03-03T22:01:40.300" v="0" actId="47"/>
         <pc:sldMkLst>
           <pc:docMk/>
           <pc:sldMk cId="698486847" sldId="346"/>
         </pc:sldMkLst>
+      </pc:sldChg>
+      <pc:sldChg chg="addSp modSp new mod">
+        <pc:chgData name="Cesar Augusto Lopez Gallego" userId="0dfa9112-9251-4882-b472-cf2dfcee09d1" providerId="ADAL" clId="{9AE26A11-4DF8-499E-A657-41CE392852CE}" dt="2025-03-07T00:39:29.837" v="8289" actId="1076"/>
+        <pc:sldMkLst>
+          <pc:docMk/>
+          <pc:sldMk cId="3819471036" sldId="346"/>
+        </pc:sldMkLst>
+        <pc:spChg chg="add mod">
+          <ac:chgData name="Cesar Augusto Lopez Gallego" userId="0dfa9112-9251-4882-b472-cf2dfcee09d1" providerId="ADAL" clId="{9AE26A11-4DF8-499E-A657-41CE392852CE}" dt="2025-03-07T00:37:09.261" v="8257" actId="20577"/>
+          <ac:spMkLst>
+            <pc:docMk/>
+            <pc:sldMk cId="3819471036" sldId="346"/>
+            <ac:spMk id="2" creationId="{2A8C042C-C441-481E-8A0C-ABC4893538E8}"/>
+          </ac:spMkLst>
+        </pc:spChg>
+        <pc:spChg chg="add mod">
+          <ac:chgData name="Cesar Augusto Lopez Gallego" userId="0dfa9112-9251-4882-b472-cf2dfcee09d1" providerId="ADAL" clId="{9AE26A11-4DF8-499E-A657-41CE392852CE}" dt="2025-03-07T00:39:12.477" v="8273" actId="1076"/>
+          <ac:spMkLst>
+            <pc:docMk/>
+            <pc:sldMk cId="3819471036" sldId="346"/>
+            <ac:spMk id="4" creationId="{AE0575CC-8ED6-44F9-9767-FFB89FEF4699}"/>
+          </ac:spMkLst>
+        </pc:spChg>
+        <pc:spChg chg="add mod">
+          <ac:chgData name="Cesar Augusto Lopez Gallego" userId="0dfa9112-9251-4882-b472-cf2dfcee09d1" providerId="ADAL" clId="{9AE26A11-4DF8-499E-A657-41CE392852CE}" dt="2025-03-07T00:39:12.477" v="8273" actId="1076"/>
+          <ac:spMkLst>
+            <pc:docMk/>
+            <pc:sldMk cId="3819471036" sldId="346"/>
+            <ac:spMk id="6" creationId="{5CD94E0F-279E-4D80-8D55-CB679339455D}"/>
+          </ac:spMkLst>
+        </pc:spChg>
+        <pc:spChg chg="add mod">
+          <ac:chgData name="Cesar Augusto Lopez Gallego" userId="0dfa9112-9251-4882-b472-cf2dfcee09d1" providerId="ADAL" clId="{9AE26A11-4DF8-499E-A657-41CE392852CE}" dt="2025-03-07T00:39:29.837" v="8289" actId="1076"/>
+          <ac:spMkLst>
+            <pc:docMk/>
+            <pc:sldMk cId="3819471036" sldId="346"/>
+            <ac:spMk id="7" creationId="{886BBC8A-E85E-4DC6-85B9-9870E07527AB}"/>
+          </ac:spMkLst>
+        </pc:spChg>
       </pc:sldChg>
       <pc:sldChg chg="del">
         <pc:chgData name="Cesar Augusto Lopez Gallego" userId="0dfa9112-9251-4882-b472-cf2dfcee09d1" providerId="ADAL" clId="{9AE26A11-4DF8-499E-A657-41CE392852CE}" dt="2025-03-03T22:01:40.300" v="0" actId="47"/>
@@ -2399,12 +2756,121 @@
           <pc:sldMk cId="340427815" sldId="347"/>
         </pc:sldMkLst>
       </pc:sldChg>
+      <pc:sldChg chg="addSp delSp modSp new mod">
+        <pc:chgData name="Cesar Augusto Lopez Gallego" userId="0dfa9112-9251-4882-b472-cf2dfcee09d1" providerId="ADAL" clId="{9AE26A11-4DF8-499E-A657-41CE392852CE}" dt="2025-03-07T00:59:17.558" v="8749" actId="1076"/>
+        <pc:sldMkLst>
+          <pc:docMk/>
+          <pc:sldMk cId="2651642034" sldId="347"/>
+        </pc:sldMkLst>
+        <pc:spChg chg="add mod">
+          <ac:chgData name="Cesar Augusto Lopez Gallego" userId="0dfa9112-9251-4882-b472-cf2dfcee09d1" providerId="ADAL" clId="{9AE26A11-4DF8-499E-A657-41CE392852CE}" dt="2025-03-07T00:41:18.092" v="8297" actId="20577"/>
+          <ac:spMkLst>
+            <pc:docMk/>
+            <pc:sldMk cId="2651642034" sldId="347"/>
+            <ac:spMk id="2" creationId="{4D534EAD-BB09-4CD8-B3F7-3FAF6ABF03B2}"/>
+          </ac:spMkLst>
+        </pc:spChg>
+        <pc:spChg chg="add mod">
+          <ac:chgData name="Cesar Augusto Lopez Gallego" userId="0dfa9112-9251-4882-b472-cf2dfcee09d1" providerId="ADAL" clId="{9AE26A11-4DF8-499E-A657-41CE392852CE}" dt="2025-03-07T00:59:17.558" v="8749" actId="1076"/>
+          <ac:spMkLst>
+            <pc:docMk/>
+            <pc:sldMk cId="2651642034" sldId="347"/>
+            <ac:spMk id="4" creationId="{8F87BCF9-E728-44B0-9FA7-B98C79D8E652}"/>
+          </ac:spMkLst>
+        </pc:spChg>
+        <pc:spChg chg="add mod">
+          <ac:chgData name="Cesar Augusto Lopez Gallego" userId="0dfa9112-9251-4882-b472-cf2dfcee09d1" providerId="ADAL" clId="{9AE26A11-4DF8-499E-A657-41CE392852CE}" dt="2025-03-07T00:59:13.028" v="8748" actId="1076"/>
+          <ac:spMkLst>
+            <pc:docMk/>
+            <pc:sldMk cId="2651642034" sldId="347"/>
+            <ac:spMk id="8" creationId="{45E39EAD-4843-4885-A51F-CADA29293D24}"/>
+          </ac:spMkLst>
+        </pc:spChg>
+        <pc:picChg chg="add del mod">
+          <ac:chgData name="Cesar Augusto Lopez Gallego" userId="0dfa9112-9251-4882-b472-cf2dfcee09d1" providerId="ADAL" clId="{9AE26A11-4DF8-499E-A657-41CE392852CE}" dt="2025-03-07T00:55:10.004" v="8332" actId="21"/>
+          <ac:picMkLst>
+            <pc:docMk/>
+            <pc:sldMk cId="2651642034" sldId="347"/>
+            <ac:picMk id="5" creationId="{612B05A3-0360-4C34-8FA2-98C5AC5B91DE}"/>
+          </ac:picMkLst>
+        </pc:picChg>
+        <pc:picChg chg="add mod">
+          <ac:chgData name="Cesar Augusto Lopez Gallego" userId="0dfa9112-9251-4882-b472-cf2dfcee09d1" providerId="ADAL" clId="{9AE26A11-4DF8-499E-A657-41CE392852CE}" dt="2025-03-07T00:59:13.028" v="8748" actId="1076"/>
+          <ac:picMkLst>
+            <pc:docMk/>
+            <pc:sldMk cId="2651642034" sldId="347"/>
+            <ac:picMk id="7" creationId="{8203720F-8DDE-4111-9507-EC5D99BFD7BB}"/>
+          </ac:picMkLst>
+        </pc:picChg>
+      </pc:sldChg>
+      <pc:sldChg chg="addSp delSp modSp new del mod ord">
+        <pc:chgData name="Cesar Augusto Lopez Gallego" userId="0dfa9112-9251-4882-b472-cf2dfcee09d1" providerId="ADAL" clId="{9AE26A11-4DF8-499E-A657-41CE392852CE}" dt="2025-03-07T00:39:32.926" v="8290" actId="47"/>
+        <pc:sldMkLst>
+          <pc:docMk/>
+          <pc:sldMk cId="3226383905" sldId="347"/>
+        </pc:sldMkLst>
+        <pc:spChg chg="add mod">
+          <ac:chgData name="Cesar Augusto Lopez Gallego" userId="0dfa9112-9251-4882-b472-cf2dfcee09d1" providerId="ADAL" clId="{9AE26A11-4DF8-499E-A657-41CE392852CE}" dt="2025-03-07T00:37:42.721" v="8259"/>
+          <ac:spMkLst>
+            <pc:docMk/>
+            <pc:sldMk cId="3226383905" sldId="347"/>
+            <ac:spMk id="2" creationId="{40415DD6-4A47-4ADC-B3C4-1F25957BD02F}"/>
+          </ac:spMkLst>
+        </pc:spChg>
+        <pc:spChg chg="add del mod">
+          <ac:chgData name="Cesar Augusto Lopez Gallego" userId="0dfa9112-9251-4882-b472-cf2dfcee09d1" providerId="ADAL" clId="{9AE26A11-4DF8-499E-A657-41CE392852CE}" dt="2025-03-07T00:37:49.679" v="8263"/>
+          <ac:spMkLst>
+            <pc:docMk/>
+            <pc:sldMk cId="3226383905" sldId="347"/>
+            <ac:spMk id="3" creationId="{EAA48193-0C7B-4628-A2CA-36E01D2C32DE}"/>
+          </ac:spMkLst>
+        </pc:spChg>
+        <pc:spChg chg="add mod">
+          <ac:chgData name="Cesar Augusto Lopez Gallego" userId="0dfa9112-9251-4882-b472-cf2dfcee09d1" providerId="ADAL" clId="{9AE26A11-4DF8-499E-A657-41CE392852CE}" dt="2025-03-07T00:38:59.992" v="8272" actId="12"/>
+          <ac:spMkLst>
+            <pc:docMk/>
+            <pc:sldMk cId="3226383905" sldId="347"/>
+            <ac:spMk id="5" creationId="{C903AD06-B742-47AD-82B4-D2FFD35B45A1}"/>
+          </ac:spMkLst>
+        </pc:spChg>
+      </pc:sldChg>
       <pc:sldChg chg="del">
         <pc:chgData name="Cesar Augusto Lopez Gallego" userId="0dfa9112-9251-4882-b472-cf2dfcee09d1" providerId="ADAL" clId="{9AE26A11-4DF8-499E-A657-41CE392852CE}" dt="2025-03-03T22:01:40.300" v="0" actId="47"/>
         <pc:sldMkLst>
           <pc:docMk/>
           <pc:sldMk cId="18777224" sldId="348"/>
         </pc:sldMkLst>
+      </pc:sldChg>
+      <pc:sldChg chg="addSp modSp new mod">
+        <pc:chgData name="Cesar Augusto Lopez Gallego" userId="0dfa9112-9251-4882-b472-cf2dfcee09d1" providerId="ADAL" clId="{9AE26A11-4DF8-499E-A657-41CE392852CE}" dt="2025-03-07T00:58:51.833" v="8746"/>
+        <pc:sldMkLst>
+          <pc:docMk/>
+          <pc:sldMk cId="3733510634" sldId="348"/>
+        </pc:sldMkLst>
+        <pc:spChg chg="add mod">
+          <ac:chgData name="Cesar Augusto Lopez Gallego" userId="0dfa9112-9251-4882-b472-cf2dfcee09d1" providerId="ADAL" clId="{9AE26A11-4DF8-499E-A657-41CE392852CE}" dt="2025-03-07T00:58:47.715" v="8745" actId="1076"/>
+          <ac:spMkLst>
+            <pc:docMk/>
+            <pc:sldMk cId="3733510634" sldId="348"/>
+            <ac:spMk id="3" creationId="{0F5155A0-3030-49FE-9F98-ECA7B5556CEE}"/>
+          </ac:spMkLst>
+        </pc:spChg>
+        <pc:spChg chg="add mod">
+          <ac:chgData name="Cesar Augusto Lopez Gallego" userId="0dfa9112-9251-4882-b472-cf2dfcee09d1" providerId="ADAL" clId="{9AE26A11-4DF8-499E-A657-41CE392852CE}" dt="2025-03-07T00:58:51.833" v="8746"/>
+          <ac:spMkLst>
+            <pc:docMk/>
+            <pc:sldMk cId="3733510634" sldId="348"/>
+            <ac:spMk id="5" creationId="{50E92D40-0121-4796-A234-3D10E9BC3D9E}"/>
+          </ac:spMkLst>
+        </pc:spChg>
+        <pc:picChg chg="add mod">
+          <ac:chgData name="Cesar Augusto Lopez Gallego" userId="0dfa9112-9251-4882-b472-cf2dfcee09d1" providerId="ADAL" clId="{9AE26A11-4DF8-499E-A657-41CE392852CE}" dt="2025-03-07T00:55:15.805" v="8335" actId="1076"/>
+          <ac:picMkLst>
+            <pc:docMk/>
+            <pc:sldMk cId="3733510634" sldId="348"/>
+            <ac:picMk id="4" creationId="{D736236F-3770-4969-BFA5-3FD8B954BAFF}"/>
+          </ac:picMkLst>
+        </pc:picChg>
       </pc:sldChg>
       <pc:sldChg chg="del">
         <pc:chgData name="Cesar Augusto Lopez Gallego" userId="0dfa9112-9251-4882-b472-cf2dfcee09d1" providerId="ADAL" clId="{9AE26A11-4DF8-499E-A657-41CE392852CE}" dt="2025-03-03T22:01:40.300" v="0" actId="47"/>
@@ -2413,6 +2879,45 @@
           <pc:sldMk cId="3131083621" sldId="349"/>
         </pc:sldMkLst>
       </pc:sldChg>
+      <pc:sldChg chg="addSp delSp modSp new mod">
+        <pc:chgData name="Cesar Augusto Lopez Gallego" userId="0dfa9112-9251-4882-b472-cf2dfcee09d1" providerId="ADAL" clId="{9AE26A11-4DF8-499E-A657-41CE392852CE}" dt="2025-03-07T01:05:06.683" v="8777" actId="1076"/>
+        <pc:sldMkLst>
+          <pc:docMk/>
+          <pc:sldMk cId="4096407198" sldId="349"/>
+        </pc:sldMkLst>
+        <pc:spChg chg="add mod">
+          <ac:chgData name="Cesar Augusto Lopez Gallego" userId="0dfa9112-9251-4882-b472-cf2dfcee09d1" providerId="ADAL" clId="{9AE26A11-4DF8-499E-A657-41CE392852CE}" dt="2025-03-07T01:04:30.478" v="8772" actId="12"/>
+          <ac:spMkLst>
+            <pc:docMk/>
+            <pc:sldMk cId="4096407198" sldId="349"/>
+            <ac:spMk id="3" creationId="{61E43687-C1AC-4E2B-B5B5-F83FB5625D63}"/>
+          </ac:spMkLst>
+        </pc:spChg>
+        <pc:spChg chg="add mod">
+          <ac:chgData name="Cesar Augusto Lopez Gallego" userId="0dfa9112-9251-4882-b472-cf2dfcee09d1" providerId="ADAL" clId="{9AE26A11-4DF8-499E-A657-41CE392852CE}" dt="2025-03-07T01:02:59.732" v="8767" actId="20577"/>
+          <ac:spMkLst>
+            <pc:docMk/>
+            <pc:sldMk cId="4096407198" sldId="349"/>
+            <ac:spMk id="4" creationId="{7E29F097-B40B-4325-B8B0-C31122A2076F}"/>
+          </ac:spMkLst>
+        </pc:spChg>
+        <pc:picChg chg="add del mod">
+          <ac:chgData name="Cesar Augusto Lopez Gallego" userId="0dfa9112-9251-4882-b472-cf2dfcee09d1" providerId="ADAL" clId="{9AE26A11-4DF8-499E-A657-41CE392852CE}" dt="2025-03-07T01:05:03.803" v="8775" actId="478"/>
+          <ac:picMkLst>
+            <pc:docMk/>
+            <pc:sldMk cId="4096407198" sldId="349"/>
+            <ac:picMk id="6" creationId="{EB352556-D3CD-47EB-8045-79FF956538A2}"/>
+          </ac:picMkLst>
+        </pc:picChg>
+        <pc:picChg chg="add mod">
+          <ac:chgData name="Cesar Augusto Lopez Gallego" userId="0dfa9112-9251-4882-b472-cf2dfcee09d1" providerId="ADAL" clId="{9AE26A11-4DF8-499E-A657-41CE392852CE}" dt="2025-03-07T01:05:06.683" v="8777" actId="1076"/>
+          <ac:picMkLst>
+            <pc:docMk/>
+            <pc:sldMk cId="4096407198" sldId="349"/>
+            <ac:picMk id="2050" creationId="{996A4354-8932-4A4D-8159-1030AA7F05C5}"/>
+          </ac:picMkLst>
+        </pc:picChg>
+      </pc:sldChg>
       <pc:sldChg chg="del">
         <pc:chgData name="Cesar Augusto Lopez Gallego" userId="0dfa9112-9251-4882-b472-cf2dfcee09d1" providerId="ADAL" clId="{9AE26A11-4DF8-499E-A657-41CE392852CE}" dt="2025-03-03T22:01:40.300" v="0" actId="47"/>
         <pc:sldMkLst>
@@ -2420,12 +2925,90 @@
           <pc:sldMk cId="1655447724" sldId="350"/>
         </pc:sldMkLst>
       </pc:sldChg>
+      <pc:sldChg chg="addSp delSp modSp new mod">
+        <pc:chgData name="Cesar Augusto Lopez Gallego" userId="0dfa9112-9251-4882-b472-cf2dfcee09d1" providerId="ADAL" clId="{9AE26A11-4DF8-499E-A657-41CE392852CE}" dt="2025-03-07T01:35:20.841" v="8791" actId="20577"/>
+        <pc:sldMkLst>
+          <pc:docMk/>
+          <pc:sldMk cId="2163885232" sldId="350"/>
+        </pc:sldMkLst>
+        <pc:spChg chg="add del">
+          <ac:chgData name="Cesar Augusto Lopez Gallego" userId="0dfa9112-9251-4882-b472-cf2dfcee09d1" providerId="ADAL" clId="{9AE26A11-4DF8-499E-A657-41CE392852CE}" dt="2025-03-07T01:34:08.147" v="8779" actId="478"/>
+          <ac:spMkLst>
+            <pc:docMk/>
+            <pc:sldMk cId="2163885232" sldId="350"/>
+            <ac:spMk id="3" creationId="{BA94E4E7-CF27-4EC1-B757-E33F709427DD}"/>
+          </ac:spMkLst>
+        </pc:spChg>
+        <pc:spChg chg="add mod">
+          <ac:chgData name="Cesar Augusto Lopez Gallego" userId="0dfa9112-9251-4882-b472-cf2dfcee09d1" providerId="ADAL" clId="{9AE26A11-4DF8-499E-A657-41CE392852CE}" dt="2025-03-07T01:35:00.046" v="8785"/>
+          <ac:spMkLst>
+            <pc:docMk/>
+            <pc:sldMk cId="2163885232" sldId="350"/>
+            <ac:spMk id="7" creationId="{DD1CE35E-8073-4218-9416-95EDC5AAD44C}"/>
+          </ac:spMkLst>
+        </pc:spChg>
+        <pc:spChg chg="add mod">
+          <ac:chgData name="Cesar Augusto Lopez Gallego" userId="0dfa9112-9251-4882-b472-cf2dfcee09d1" providerId="ADAL" clId="{9AE26A11-4DF8-499E-A657-41CE392852CE}" dt="2025-03-07T01:35:20.841" v="8791" actId="20577"/>
+          <ac:spMkLst>
+            <pc:docMk/>
+            <pc:sldMk cId="2163885232" sldId="350"/>
+            <ac:spMk id="8" creationId="{B181CEED-A02B-4908-97C5-A99BEDFDCF2A}"/>
+          </ac:spMkLst>
+        </pc:spChg>
+        <pc:picChg chg="add mod">
+          <ac:chgData name="Cesar Augusto Lopez Gallego" userId="0dfa9112-9251-4882-b472-cf2dfcee09d1" providerId="ADAL" clId="{9AE26A11-4DF8-499E-A657-41CE392852CE}" dt="2025-03-07T01:34:37.057" v="8784" actId="1076"/>
+          <ac:picMkLst>
+            <pc:docMk/>
+            <pc:sldMk cId="2163885232" sldId="350"/>
+            <ac:picMk id="5" creationId="{565A7202-A9AE-46A6-9761-B2747CB125F0}"/>
+          </ac:picMkLst>
+        </pc:picChg>
+        <pc:picChg chg="add mod">
+          <ac:chgData name="Cesar Augusto Lopez Gallego" userId="0dfa9112-9251-4882-b472-cf2dfcee09d1" providerId="ADAL" clId="{9AE26A11-4DF8-499E-A657-41CE392852CE}" dt="2025-03-07T01:35:00.046" v="8785"/>
+          <ac:picMkLst>
+            <pc:docMk/>
+            <pc:sldMk cId="2163885232" sldId="350"/>
+            <ac:picMk id="6" creationId="{96A12BA5-25DD-46D3-BA33-D317E152D0B6}"/>
+          </ac:picMkLst>
+        </pc:picChg>
+      </pc:sldChg>
       <pc:sldChg chg="del">
         <pc:chgData name="Cesar Augusto Lopez Gallego" userId="0dfa9112-9251-4882-b472-cf2dfcee09d1" providerId="ADAL" clId="{9AE26A11-4DF8-499E-A657-41CE392852CE}" dt="2025-03-03T22:01:40.300" v="0" actId="47"/>
         <pc:sldMkLst>
           <pc:docMk/>
           <pc:sldMk cId="1297440520" sldId="351"/>
         </pc:sldMkLst>
+      </pc:sldChg>
+      <pc:sldChg chg="addSp modSp new mod">
+        <pc:chgData name="Cesar Augusto Lopez Gallego" userId="0dfa9112-9251-4882-b472-cf2dfcee09d1" providerId="ADAL" clId="{9AE26A11-4DF8-499E-A657-41CE392852CE}" dt="2025-03-07T01:39:04.153" v="8811" actId="20577"/>
+        <pc:sldMkLst>
+          <pc:docMk/>
+          <pc:sldMk cId="1366297695" sldId="351"/>
+        </pc:sldMkLst>
+        <pc:spChg chg="add mod">
+          <ac:chgData name="Cesar Augusto Lopez Gallego" userId="0dfa9112-9251-4882-b472-cf2dfcee09d1" providerId="ADAL" clId="{9AE26A11-4DF8-499E-A657-41CE392852CE}" dt="2025-03-07T01:38:31.749" v="8797" actId="14100"/>
+          <ac:spMkLst>
+            <pc:docMk/>
+            <pc:sldMk cId="1366297695" sldId="351"/>
+            <ac:spMk id="3" creationId="{83A97330-DDB4-4E8F-B43A-77BDBACBE4D9}"/>
+          </ac:spMkLst>
+        </pc:spChg>
+        <pc:spChg chg="add mod">
+          <ac:chgData name="Cesar Augusto Lopez Gallego" userId="0dfa9112-9251-4882-b472-cf2dfcee09d1" providerId="ADAL" clId="{9AE26A11-4DF8-499E-A657-41CE392852CE}" dt="2025-03-07T01:38:37.458" v="8800" actId="14100"/>
+          <ac:spMkLst>
+            <pc:docMk/>
+            <pc:sldMk cId="1366297695" sldId="351"/>
+            <ac:spMk id="5" creationId="{6700F23A-4D7A-46EE-8C5A-03D7E4E43130}"/>
+          </ac:spMkLst>
+        </pc:spChg>
+        <pc:spChg chg="add mod">
+          <ac:chgData name="Cesar Augusto Lopez Gallego" userId="0dfa9112-9251-4882-b472-cf2dfcee09d1" providerId="ADAL" clId="{9AE26A11-4DF8-499E-A657-41CE392852CE}" dt="2025-03-07T01:39:04.153" v="8811" actId="20577"/>
+          <ac:spMkLst>
+            <pc:docMk/>
+            <pc:sldMk cId="1366297695" sldId="351"/>
+            <ac:spMk id="6" creationId="{1D771DEB-C2C3-4516-B63C-61A5C68B3343}"/>
+          </ac:spMkLst>
+        </pc:spChg>
       </pc:sldChg>
       <pc:sldChg chg="del">
         <pc:chgData name="Cesar Augusto Lopez Gallego" userId="0dfa9112-9251-4882-b472-cf2dfcee09d1" providerId="ADAL" clId="{9AE26A11-4DF8-499E-A657-41CE392852CE}" dt="2025-03-03T22:01:40.300" v="0" actId="47"/>
@@ -5342,7 +5925,7 @@
           <a:p>
             <a:fld id="{6B86245D-015E-46AE-96CC-32E8A5E9A1DF}" type="datetimeFigureOut">
               <a:rPr lang="es-CO" smtClean="0"/>
-              <a:t>5/03/2025</a:t>
+              <a:t>6/03/2025</a:t>
             </a:fld>
             <a:endParaRPr lang="es-CO"/>
           </a:p>
@@ -5512,7 +6095,7 @@
           <a:p>
             <a:fld id="{6B86245D-015E-46AE-96CC-32E8A5E9A1DF}" type="datetimeFigureOut">
               <a:rPr lang="es-CO" smtClean="0"/>
-              <a:t>5/03/2025</a:t>
+              <a:t>6/03/2025</a:t>
             </a:fld>
             <a:endParaRPr lang="es-CO"/>
           </a:p>
@@ -5744,7 +6327,7 @@
           <a:p>
             <a:fld id="{6B86245D-015E-46AE-96CC-32E8A5E9A1DF}" type="datetimeFigureOut">
               <a:rPr lang="es-CO" smtClean="0"/>
-              <a:t>5/03/2025</a:t>
+              <a:t>6/03/2025</a:t>
             </a:fld>
             <a:endParaRPr lang="es-CO"/>
           </a:p>
@@ -5936,7 +6519,7 @@
           <a:p>
             <a:fld id="{6B86245D-015E-46AE-96CC-32E8A5E9A1DF}" type="datetimeFigureOut">
               <a:rPr lang="es-CO" smtClean="0"/>
-              <a:t>5/03/2025</a:t>
+              <a:t>6/03/2025</a:t>
             </a:fld>
             <a:endParaRPr lang="es-CO"/>
           </a:p>
@@ -15953,6 +16536,3133 @@
       </p:grpSpPr>
       <p:sp>
         <p:nvSpPr>
+          <p:cNvPr id="2" name="CuadroTexto 1">
+            <a:extLst>
+              <a:ext uri="{FF2B5EF4-FFF2-40B4-BE49-F238E27FC236}">
+                <a16:creationId xmlns:a16="http://schemas.microsoft.com/office/drawing/2014/main" id="{D2A3C107-9D8F-4BF5-991A-97A89C0E2244}"/>
+              </a:ext>
+            </a:extLst>
+          </p:cNvPr>
+          <p:cNvSpPr txBox="1"/>
+          <p:nvPr/>
+        </p:nvSpPr>
+        <p:spPr>
+          <a:xfrm>
+            <a:off x="974721" y="611653"/>
+            <a:ext cx="5778619" cy="646331"/>
+          </a:xfrm>
+          <a:prstGeom prst="rect">
+            <a:avLst/>
+          </a:prstGeom>
+          <a:noFill/>
+        </p:spPr>
+        <p:txBody>
+          <a:bodyPr wrap="square" rtlCol="0">
+            <a:spAutoFit/>
+          </a:bodyPr>
+          <a:lstStyle/>
+          <a:p>
+            <a:r>
+              <a:rPr lang="es-ES" sz="3600" dirty="0"/>
+              <a:t>Patrón </a:t>
+            </a:r>
+            <a:r>
+              <a:rPr lang="es-ES" sz="3600" dirty="0" err="1"/>
+              <a:t>FlyWeight</a:t>
+            </a:r>
+            <a:endParaRPr lang="es-419" sz="3600" dirty="0"/>
+          </a:p>
+        </p:txBody>
+      </p:sp>
+      <p:sp>
+        <p:nvSpPr>
+          <p:cNvPr id="4" name="CuadroTexto 3">
+            <a:extLst>
+              <a:ext uri="{FF2B5EF4-FFF2-40B4-BE49-F238E27FC236}">
+                <a16:creationId xmlns:a16="http://schemas.microsoft.com/office/drawing/2014/main" id="{C3FE3822-AF3A-4946-914B-6885EFB67664}"/>
+              </a:ext>
+            </a:extLst>
+          </p:cNvPr>
+          <p:cNvSpPr txBox="1"/>
+          <p:nvPr/>
+        </p:nvSpPr>
+        <p:spPr>
+          <a:xfrm>
+            <a:off x="4021157" y="2017742"/>
+            <a:ext cx="6896560" cy="3693319"/>
+          </a:xfrm>
+          <a:prstGeom prst="rect">
+            <a:avLst/>
+          </a:prstGeom>
+          <a:noFill/>
+        </p:spPr>
+        <p:txBody>
+          <a:bodyPr wrap="square">
+            <a:spAutoFit/>
+          </a:bodyPr>
+          <a:lstStyle/>
+          <a:p>
+            <a:r>
+              <a:rPr lang="es-ES" dirty="0"/>
+              <a:t>Patrón estructural que ayuda a optimizar el uso de la memoria y mejora el rendimiento al compartir objetos en lugar de crearlos de manera redundante. </a:t>
+            </a:r>
+          </a:p>
+          <a:p>
+            <a:endParaRPr lang="es-ES" dirty="0"/>
+          </a:p>
+          <a:p>
+            <a:r>
+              <a:rPr lang="es-ES" dirty="0"/>
+              <a:t>Normalmente se encuentran casos donde los objetos tienen partes comunes que se repiten en todos y otras que no. </a:t>
+            </a:r>
+          </a:p>
+          <a:p>
+            <a:endParaRPr lang="es-ES" dirty="0"/>
+          </a:p>
+          <a:p>
+            <a:r>
+              <a:rPr lang="es-ES" dirty="0"/>
+              <a:t>La utilidad de este patrón será poder compartir los datos comunes (</a:t>
+            </a:r>
+            <a:r>
+              <a:rPr lang="es-419" b="1" i="0" dirty="0">
+                <a:solidFill>
+                  <a:srgbClr val="333333"/>
+                </a:solidFill>
+                <a:effectLst/>
+                <a:latin typeface="Lucida Grande"/>
+              </a:rPr>
+              <a:t>Intrínsecos</a:t>
+            </a:r>
+            <a:r>
+              <a:rPr lang="es-ES" dirty="0"/>
+              <a:t>) entre todos los objetos y manejar la privada o la no común(</a:t>
+            </a:r>
+            <a:r>
+              <a:rPr lang="es-419" b="1" i="0" dirty="0">
+                <a:solidFill>
+                  <a:srgbClr val="333333"/>
+                </a:solidFill>
+                <a:effectLst/>
+                <a:latin typeface="Lucida Grande"/>
+              </a:rPr>
+              <a:t>Extrínsecos</a:t>
+            </a:r>
+            <a:r>
+              <a:rPr lang="es-ES" dirty="0"/>
+              <a:t>) que puede ser modificada en tiempo de ejecución. </a:t>
+            </a:r>
+          </a:p>
+          <a:p>
+            <a:endParaRPr lang="es-ES" dirty="0"/>
+          </a:p>
+          <a:p>
+            <a:r>
+              <a:rPr lang="es-ES" dirty="0"/>
+              <a:t>Con esto se optimiza el consumo de recursos</a:t>
+            </a:r>
+            <a:endParaRPr lang="es-419" dirty="0"/>
+          </a:p>
+        </p:txBody>
+      </p:sp>
+      <p:pic>
+        <p:nvPicPr>
+          <p:cNvPr id="12" name="Imagen 11">
+            <a:extLst>
+              <a:ext uri="{FF2B5EF4-FFF2-40B4-BE49-F238E27FC236}">
+                <a16:creationId xmlns:a16="http://schemas.microsoft.com/office/drawing/2014/main" id="{BC811D23-2701-45AA-9496-7E9BCE691EE9}"/>
+              </a:ext>
+            </a:extLst>
+          </p:cNvPr>
+          <p:cNvPicPr>
+            <a:picLocks noChangeAspect="1"/>
+          </p:cNvPicPr>
+          <p:nvPr/>
+        </p:nvPicPr>
+        <p:blipFill>
+          <a:blip r:embed="rId2"/>
+          <a:stretch>
+            <a:fillRect/>
+          </a:stretch>
+        </p:blipFill>
+        <p:spPr>
+          <a:xfrm>
+            <a:off x="1106924" y="2501467"/>
+            <a:ext cx="2357586" cy="2235786"/>
+          </a:xfrm>
+          <a:prstGeom prst="rect">
+            <a:avLst/>
+          </a:prstGeom>
+        </p:spPr>
+      </p:pic>
+    </p:spTree>
+    <p:extLst>
+      <p:ext uri="{BB962C8B-B14F-4D97-AF65-F5344CB8AC3E}">
+        <p14:creationId xmlns:p14="http://schemas.microsoft.com/office/powerpoint/2010/main" val="2953447785"/>
+      </p:ext>
+    </p:extLst>
+  </p:cSld>
+  <p:clrMapOvr>
+    <a:masterClrMapping/>
+  </p:clrMapOvr>
+</p:sld>
+</file>
+
+<file path=ppt/slides/slide39.xml><?xml version="1.0" encoding="utf-8"?>
+<p:sld xmlns:a="http://schemas.openxmlformats.org/drawingml/2006/main" xmlns:r="http://schemas.openxmlformats.org/officeDocument/2006/relationships" xmlns:p="http://schemas.openxmlformats.org/presentationml/2006/main">
+  <p:cSld>
+    <p:spTree>
+      <p:nvGrpSpPr>
+        <p:cNvPr id="1" name=""/>
+        <p:cNvGrpSpPr/>
+        <p:nvPr/>
+      </p:nvGrpSpPr>
+      <p:grpSpPr>
+        <a:xfrm>
+          <a:off x="0" y="0"/>
+          <a:ext cx="0" cy="0"/>
+          <a:chOff x="0" y="0"/>
+          <a:chExt cx="0" cy="0"/>
+        </a:xfrm>
+      </p:grpSpPr>
+      <p:pic>
+        <p:nvPicPr>
+          <p:cNvPr id="2" name="Imagen 1">
+            <a:extLst>
+              <a:ext uri="{FF2B5EF4-FFF2-40B4-BE49-F238E27FC236}">
+                <a16:creationId xmlns:a16="http://schemas.microsoft.com/office/drawing/2014/main" id="{E52307E4-6719-452E-9485-77A2A1E7DFAC}"/>
+              </a:ext>
+            </a:extLst>
+          </p:cNvPr>
+          <p:cNvPicPr>
+            <a:picLocks noChangeAspect="1"/>
+          </p:cNvPicPr>
+          <p:nvPr/>
+        </p:nvPicPr>
+        <p:blipFill>
+          <a:blip r:embed="rId2"/>
+          <a:stretch>
+            <a:fillRect/>
+          </a:stretch>
+        </p:blipFill>
+        <p:spPr>
+          <a:xfrm>
+            <a:off x="1184040" y="2587528"/>
+            <a:ext cx="3270929" cy="1807327"/>
+          </a:xfrm>
+          <a:prstGeom prst="rect">
+            <a:avLst/>
+          </a:prstGeom>
+        </p:spPr>
+      </p:pic>
+      <p:sp>
+        <p:nvSpPr>
+          <p:cNvPr id="3" name="CuadroTexto 2">
+            <a:extLst>
+              <a:ext uri="{FF2B5EF4-FFF2-40B4-BE49-F238E27FC236}">
+                <a16:creationId xmlns:a16="http://schemas.microsoft.com/office/drawing/2014/main" id="{E8741A7A-9FC6-4AFF-8148-C00DCEC70EEC}"/>
+              </a:ext>
+            </a:extLst>
+          </p:cNvPr>
+          <p:cNvSpPr txBox="1"/>
+          <p:nvPr/>
+        </p:nvSpPr>
+        <p:spPr>
+          <a:xfrm>
+            <a:off x="4791665" y="2551837"/>
+            <a:ext cx="3681664" cy="1754326"/>
+          </a:xfrm>
+          <a:prstGeom prst="rect">
+            <a:avLst/>
+          </a:prstGeom>
+          <a:noFill/>
+        </p:spPr>
+        <p:txBody>
+          <a:bodyPr wrap="square" rtlCol="0">
+            <a:spAutoFit/>
+          </a:bodyPr>
+          <a:lstStyle/>
+          <a:p>
+            <a:r>
+              <a:rPr lang="es-ES" dirty="0"/>
+              <a:t>Motor = híbrido 1300 turbo</a:t>
+            </a:r>
+          </a:p>
+          <a:p>
+            <a:r>
+              <a:rPr lang="es-419" dirty="0"/>
+              <a:t>Llantas = “Michelin”</a:t>
+            </a:r>
+          </a:p>
+          <a:p>
+            <a:r>
+              <a:rPr lang="es-419" dirty="0"/>
+              <a:t>Vidrio panorámico = “Saint-Gobain,”</a:t>
+            </a:r>
+          </a:p>
+          <a:p>
+            <a:r>
+              <a:rPr lang="es-419" dirty="0"/>
+              <a:t>Vidrio trasero = “Saint-Gobain”</a:t>
+            </a:r>
+          </a:p>
+          <a:p>
+            <a:r>
+              <a:rPr lang="es-419" dirty="0"/>
+              <a:t>Aire Acondicionado=“Denso”</a:t>
+            </a:r>
+          </a:p>
+          <a:p>
+            <a:r>
+              <a:rPr lang="es-419" dirty="0"/>
+              <a:t>Vidrios laterales = “Vico”</a:t>
+            </a:r>
+          </a:p>
+        </p:txBody>
+      </p:sp>
+      <p:sp>
+        <p:nvSpPr>
+          <p:cNvPr id="4" name="CuadroTexto 3">
+            <a:extLst>
+              <a:ext uri="{FF2B5EF4-FFF2-40B4-BE49-F238E27FC236}">
+                <a16:creationId xmlns:a16="http://schemas.microsoft.com/office/drawing/2014/main" id="{36C4BA92-15E6-48DB-8FCB-35FD123077E1}"/>
+              </a:ext>
+            </a:extLst>
+          </p:cNvPr>
+          <p:cNvSpPr txBox="1"/>
+          <p:nvPr/>
+        </p:nvSpPr>
+        <p:spPr>
+          <a:xfrm>
+            <a:off x="5126043" y="1561705"/>
+            <a:ext cx="6741242" cy="707886"/>
+          </a:xfrm>
+          <a:prstGeom prst="rect">
+            <a:avLst/>
+          </a:prstGeom>
+          <a:noFill/>
+        </p:spPr>
+        <p:txBody>
+          <a:bodyPr wrap="square">
+            <a:spAutoFit/>
+          </a:bodyPr>
+          <a:lstStyle/>
+          <a:p>
+            <a:pPr algn="ctr"/>
+            <a:r>
+              <a:rPr lang="es-ES" sz="2000" dirty="0"/>
+              <a:t>Suponga que en una línea de ensamble de vehículos </a:t>
+            </a:r>
+            <a:r>
+              <a:rPr lang="es-ES" sz="2000" dirty="0" err="1"/>
+              <a:t>ud</a:t>
+            </a:r>
+            <a:r>
+              <a:rPr lang="es-ES" sz="2000" dirty="0"/>
+              <a:t> está produciendo vehículos de este tipo:</a:t>
+            </a:r>
+          </a:p>
+        </p:txBody>
+      </p:sp>
+      <p:sp>
+        <p:nvSpPr>
+          <p:cNvPr id="5" name="CuadroTexto 4">
+            <a:extLst>
+              <a:ext uri="{FF2B5EF4-FFF2-40B4-BE49-F238E27FC236}">
+                <a16:creationId xmlns:a16="http://schemas.microsoft.com/office/drawing/2014/main" id="{A226E491-DAD0-4CB0-A4E5-28F3AF455521}"/>
+              </a:ext>
+            </a:extLst>
+          </p:cNvPr>
+          <p:cNvSpPr txBox="1"/>
+          <p:nvPr/>
+        </p:nvSpPr>
+        <p:spPr>
+          <a:xfrm>
+            <a:off x="8986632" y="2943076"/>
+            <a:ext cx="3205368" cy="1200329"/>
+          </a:xfrm>
+          <a:prstGeom prst="rect">
+            <a:avLst/>
+          </a:prstGeom>
+          <a:noFill/>
+        </p:spPr>
+        <p:txBody>
+          <a:bodyPr wrap="square" rtlCol="0">
+            <a:spAutoFit/>
+          </a:bodyPr>
+          <a:lstStyle/>
+          <a:p>
+            <a:r>
+              <a:rPr lang="es-ES" dirty="0"/>
+              <a:t>Número Chasis</a:t>
+            </a:r>
+          </a:p>
+          <a:p>
+            <a:r>
+              <a:rPr lang="es-419" dirty="0"/>
+              <a:t>Número del Motor</a:t>
+            </a:r>
+          </a:p>
+          <a:p>
+            <a:r>
+              <a:rPr lang="es-419" dirty="0"/>
+              <a:t>Código Interno</a:t>
+            </a:r>
+          </a:p>
+          <a:p>
+            <a:r>
+              <a:rPr lang="es-419" dirty="0"/>
+              <a:t>Datos del lote de fabricación</a:t>
+            </a:r>
+          </a:p>
+        </p:txBody>
+      </p:sp>
+      <p:sp>
+        <p:nvSpPr>
+          <p:cNvPr id="6" name="CuadroTexto 5">
+            <a:extLst>
+              <a:ext uri="{FF2B5EF4-FFF2-40B4-BE49-F238E27FC236}">
+                <a16:creationId xmlns:a16="http://schemas.microsoft.com/office/drawing/2014/main" id="{2A299067-B7A1-4379-ACF5-74CEC71BF6C7}"/>
+              </a:ext>
+            </a:extLst>
+          </p:cNvPr>
+          <p:cNvSpPr txBox="1"/>
+          <p:nvPr/>
+        </p:nvSpPr>
+        <p:spPr>
+          <a:xfrm>
+            <a:off x="974721" y="611653"/>
+            <a:ext cx="5778619" cy="646331"/>
+          </a:xfrm>
+          <a:prstGeom prst="rect">
+            <a:avLst/>
+          </a:prstGeom>
+          <a:noFill/>
+        </p:spPr>
+        <p:txBody>
+          <a:bodyPr wrap="square" rtlCol="0">
+            <a:spAutoFit/>
+          </a:bodyPr>
+          <a:lstStyle/>
+          <a:p>
+            <a:r>
+              <a:rPr lang="es-ES" sz="3600" dirty="0"/>
+              <a:t>Patrón </a:t>
+            </a:r>
+            <a:r>
+              <a:rPr lang="es-ES" sz="3600" dirty="0" err="1"/>
+              <a:t>FlyWeight</a:t>
+            </a:r>
+            <a:endParaRPr lang="es-419" sz="3600" dirty="0"/>
+          </a:p>
+        </p:txBody>
+      </p:sp>
+      <p:sp>
+        <p:nvSpPr>
+          <p:cNvPr id="7" name="CuadroTexto 6">
+            <a:extLst>
+              <a:ext uri="{FF2B5EF4-FFF2-40B4-BE49-F238E27FC236}">
+                <a16:creationId xmlns:a16="http://schemas.microsoft.com/office/drawing/2014/main" id="{13928D20-D713-4C5C-AE94-A8EA0B91E828}"/>
+              </a:ext>
+            </a:extLst>
+          </p:cNvPr>
+          <p:cNvSpPr txBox="1"/>
+          <p:nvPr/>
+        </p:nvSpPr>
+        <p:spPr>
+          <a:xfrm>
+            <a:off x="2819504" y="5296295"/>
+            <a:ext cx="6547177" cy="830997"/>
+          </a:xfrm>
+          <a:prstGeom prst="rect">
+            <a:avLst/>
+          </a:prstGeom>
+          <a:noFill/>
+        </p:spPr>
+        <p:txBody>
+          <a:bodyPr wrap="none" rtlCol="0">
+            <a:spAutoFit/>
+          </a:bodyPr>
+          <a:lstStyle/>
+          <a:p>
+            <a:pPr algn="ctr"/>
+            <a:r>
+              <a:rPr lang="es-ES" sz="2400" dirty="0"/>
+              <a:t>Conclusión: </a:t>
+            </a:r>
+          </a:p>
+          <a:p>
+            <a:pPr algn="ctr"/>
+            <a:r>
+              <a:rPr lang="es-ES" sz="2400" dirty="0"/>
+              <a:t>El objeto vehículo lo podemos dividir en dos partes</a:t>
+            </a:r>
+            <a:endParaRPr lang="es-419" sz="2400" dirty="0"/>
+          </a:p>
+        </p:txBody>
+      </p:sp>
+      <p:sp>
+        <p:nvSpPr>
+          <p:cNvPr id="9" name="CuadroTexto 8">
+            <a:extLst>
+              <a:ext uri="{FF2B5EF4-FFF2-40B4-BE49-F238E27FC236}">
+                <a16:creationId xmlns:a16="http://schemas.microsoft.com/office/drawing/2014/main" id="{D95E5FB6-46A8-4B0B-BB7B-B4680C42C044}"/>
+              </a:ext>
+            </a:extLst>
+          </p:cNvPr>
+          <p:cNvSpPr txBox="1"/>
+          <p:nvPr/>
+        </p:nvSpPr>
+        <p:spPr>
+          <a:xfrm>
+            <a:off x="4969105" y="4477373"/>
+            <a:ext cx="2253790" cy="369332"/>
+          </a:xfrm>
+          <a:prstGeom prst="rect">
+            <a:avLst/>
+          </a:prstGeom>
+          <a:noFill/>
+        </p:spPr>
+        <p:txBody>
+          <a:bodyPr wrap="square">
+            <a:spAutoFit/>
+          </a:bodyPr>
+          <a:lstStyle/>
+          <a:p>
+            <a:r>
+              <a:rPr lang="es-419" b="1" i="0" dirty="0">
+                <a:solidFill>
+                  <a:srgbClr val="FF0000"/>
+                </a:solidFill>
+                <a:effectLst/>
+                <a:latin typeface="Lucida Grande"/>
+              </a:rPr>
+              <a:t>Datos Intrínsecos</a:t>
+            </a:r>
+            <a:endParaRPr lang="es-419" dirty="0">
+              <a:solidFill>
+                <a:srgbClr val="FF0000"/>
+              </a:solidFill>
+            </a:endParaRPr>
+          </a:p>
+        </p:txBody>
+      </p:sp>
+      <p:sp>
+        <p:nvSpPr>
+          <p:cNvPr id="10" name="CuadroTexto 9">
+            <a:extLst>
+              <a:ext uri="{FF2B5EF4-FFF2-40B4-BE49-F238E27FC236}">
+                <a16:creationId xmlns:a16="http://schemas.microsoft.com/office/drawing/2014/main" id="{5CFD0819-92C1-49E0-AF24-683C08C2AB7B}"/>
+              </a:ext>
+            </a:extLst>
+          </p:cNvPr>
+          <p:cNvSpPr txBox="1"/>
+          <p:nvPr/>
+        </p:nvSpPr>
+        <p:spPr>
+          <a:xfrm>
+            <a:off x="9252284" y="4219078"/>
+            <a:ext cx="2526631" cy="369332"/>
+          </a:xfrm>
+          <a:prstGeom prst="rect">
+            <a:avLst/>
+          </a:prstGeom>
+          <a:noFill/>
+        </p:spPr>
+        <p:txBody>
+          <a:bodyPr wrap="square">
+            <a:spAutoFit/>
+          </a:bodyPr>
+          <a:lstStyle/>
+          <a:p>
+            <a:r>
+              <a:rPr lang="es-419" b="1" i="0" dirty="0">
+                <a:solidFill>
+                  <a:srgbClr val="FF0000"/>
+                </a:solidFill>
+                <a:effectLst/>
+                <a:latin typeface="Lucida Grande"/>
+              </a:rPr>
+              <a:t>Datos Extrínsecos</a:t>
+            </a:r>
+            <a:endParaRPr lang="es-419" dirty="0">
+              <a:solidFill>
+                <a:srgbClr val="FF0000"/>
+              </a:solidFill>
+            </a:endParaRPr>
+          </a:p>
+        </p:txBody>
+      </p:sp>
+    </p:spTree>
+    <p:extLst>
+      <p:ext uri="{BB962C8B-B14F-4D97-AF65-F5344CB8AC3E}">
+        <p14:creationId xmlns:p14="http://schemas.microsoft.com/office/powerpoint/2010/main" val="2120660414"/>
+      </p:ext>
+    </p:extLst>
+  </p:cSld>
+  <p:clrMapOvr>
+    <a:masterClrMapping/>
+  </p:clrMapOvr>
+</p:sld>
+</file>
+
+<file path=ppt/slides/slide4.xml><?xml version="1.0" encoding="utf-8"?>
+<p:sld xmlns:a="http://schemas.openxmlformats.org/drawingml/2006/main" xmlns:r="http://schemas.openxmlformats.org/officeDocument/2006/relationships" xmlns:p="http://schemas.openxmlformats.org/presentationml/2006/main">
+  <p:cSld>
+    <p:spTree>
+      <p:nvGrpSpPr>
+        <p:cNvPr id="1" name=""/>
+        <p:cNvGrpSpPr/>
+        <p:nvPr/>
+      </p:nvGrpSpPr>
+      <p:grpSpPr>
+        <a:xfrm>
+          <a:off x="0" y="0"/>
+          <a:ext cx="0" cy="0"/>
+          <a:chOff x="0" y="0"/>
+          <a:chExt cx="0" cy="0"/>
+        </a:xfrm>
+      </p:grpSpPr>
+      <p:pic>
+        <p:nvPicPr>
+          <p:cNvPr id="3" name="Imagen 2">
+            <a:extLst>
+              <a:ext uri="{FF2B5EF4-FFF2-40B4-BE49-F238E27FC236}">
+                <a16:creationId xmlns:a16="http://schemas.microsoft.com/office/drawing/2014/main" id="{52C61192-5480-47E0-B6A7-9FEA92DDC317}"/>
+              </a:ext>
+            </a:extLst>
+          </p:cNvPr>
+          <p:cNvPicPr>
+            <a:picLocks noChangeAspect="1"/>
+          </p:cNvPicPr>
+          <p:nvPr/>
+        </p:nvPicPr>
+        <p:blipFill>
+          <a:blip r:embed="rId2"/>
+          <a:stretch>
+            <a:fillRect/>
+          </a:stretch>
+        </p:blipFill>
+        <p:spPr>
+          <a:xfrm>
+            <a:off x="776238" y="1318832"/>
+            <a:ext cx="4686099" cy="2551710"/>
+          </a:xfrm>
+          <a:prstGeom prst="rect">
+            <a:avLst/>
+          </a:prstGeom>
+        </p:spPr>
+      </p:pic>
+      <p:sp>
+        <p:nvSpPr>
+          <p:cNvPr id="4" name="CuadroTexto 3">
+            <a:extLst>
+              <a:ext uri="{FF2B5EF4-FFF2-40B4-BE49-F238E27FC236}">
+                <a16:creationId xmlns:a16="http://schemas.microsoft.com/office/drawing/2014/main" id="{DDED7E18-0555-43C4-99AC-AE25E90EC659}"/>
+              </a:ext>
+            </a:extLst>
+          </p:cNvPr>
+          <p:cNvSpPr txBox="1"/>
+          <p:nvPr/>
+        </p:nvSpPr>
+        <p:spPr>
+          <a:xfrm>
+            <a:off x="1943301" y="3870542"/>
+            <a:ext cx="1955985" cy="307777"/>
+          </a:xfrm>
+          <a:prstGeom prst="rect">
+            <a:avLst/>
+          </a:prstGeom>
+          <a:noFill/>
+        </p:spPr>
+        <p:txBody>
+          <a:bodyPr wrap="none" rtlCol="0">
+            <a:spAutoFit/>
+          </a:bodyPr>
+          <a:lstStyle/>
+          <a:p>
+            <a:r>
+              <a:rPr lang="es-ES" sz="1400" dirty="0"/>
+              <a:t>Fuente: </a:t>
+            </a:r>
+            <a:r>
+              <a:rPr lang="es-ES" sz="1400" dirty="0" err="1"/>
+              <a:t>refactoring</a:t>
+            </a:r>
+            <a:r>
+              <a:rPr lang="es-ES" sz="1400" dirty="0"/>
+              <a:t> </a:t>
+            </a:r>
+            <a:r>
+              <a:rPr lang="es-ES" sz="1400" dirty="0" err="1"/>
+              <a:t>guru</a:t>
+            </a:r>
+            <a:endParaRPr lang="es-419" sz="1400" dirty="0"/>
+          </a:p>
+        </p:txBody>
+      </p:sp>
+      <p:pic>
+        <p:nvPicPr>
+          <p:cNvPr id="8" name="Imagen 7">
+            <a:extLst>
+              <a:ext uri="{FF2B5EF4-FFF2-40B4-BE49-F238E27FC236}">
+                <a16:creationId xmlns:a16="http://schemas.microsoft.com/office/drawing/2014/main" id="{4AFE1997-E721-45A1-9300-2A907226A5DB}"/>
+              </a:ext>
+            </a:extLst>
+          </p:cNvPr>
+          <p:cNvPicPr>
+            <a:picLocks noChangeAspect="1"/>
+          </p:cNvPicPr>
+          <p:nvPr/>
+        </p:nvPicPr>
+        <p:blipFill>
+          <a:blip r:embed="rId3"/>
+          <a:stretch>
+            <a:fillRect/>
+          </a:stretch>
+        </p:blipFill>
+        <p:spPr>
+          <a:xfrm>
+            <a:off x="6310292" y="3163315"/>
+            <a:ext cx="4686099" cy="2712472"/>
+          </a:xfrm>
+          <a:prstGeom prst="rect">
+            <a:avLst/>
+          </a:prstGeom>
+        </p:spPr>
+      </p:pic>
+      <p:sp>
+        <p:nvSpPr>
+          <p:cNvPr id="9" name="CuadroTexto 8">
+            <a:extLst>
+              <a:ext uri="{FF2B5EF4-FFF2-40B4-BE49-F238E27FC236}">
+                <a16:creationId xmlns:a16="http://schemas.microsoft.com/office/drawing/2014/main" id="{95595F12-9572-472F-9693-0F6A7B687CB6}"/>
+              </a:ext>
+            </a:extLst>
+          </p:cNvPr>
+          <p:cNvSpPr txBox="1"/>
+          <p:nvPr/>
+        </p:nvSpPr>
+        <p:spPr>
+          <a:xfrm>
+            <a:off x="7798670" y="5875787"/>
+            <a:ext cx="1955985" cy="307777"/>
+          </a:xfrm>
+          <a:prstGeom prst="rect">
+            <a:avLst/>
+          </a:prstGeom>
+          <a:noFill/>
+        </p:spPr>
+        <p:txBody>
+          <a:bodyPr wrap="none" rtlCol="0">
+            <a:spAutoFit/>
+          </a:bodyPr>
+          <a:lstStyle/>
+          <a:p>
+            <a:r>
+              <a:rPr lang="es-ES" sz="1400" dirty="0"/>
+              <a:t>Fuente: </a:t>
+            </a:r>
+            <a:r>
+              <a:rPr lang="es-ES" sz="1400" dirty="0" err="1"/>
+              <a:t>refactoring</a:t>
+            </a:r>
+            <a:r>
+              <a:rPr lang="es-ES" sz="1400" dirty="0"/>
+              <a:t> </a:t>
+            </a:r>
+            <a:r>
+              <a:rPr lang="es-ES" sz="1400" dirty="0" err="1"/>
+              <a:t>guru</a:t>
+            </a:r>
+            <a:endParaRPr lang="es-419" sz="1400" dirty="0"/>
+          </a:p>
+        </p:txBody>
+      </p:sp>
+      <p:sp>
+        <p:nvSpPr>
+          <p:cNvPr id="10" name="CuadroTexto 9">
+            <a:extLst>
+              <a:ext uri="{FF2B5EF4-FFF2-40B4-BE49-F238E27FC236}">
+                <a16:creationId xmlns:a16="http://schemas.microsoft.com/office/drawing/2014/main" id="{2C540134-ED54-442A-821A-0A4A96F2537F}"/>
+              </a:ext>
+            </a:extLst>
+          </p:cNvPr>
+          <p:cNvSpPr txBox="1"/>
+          <p:nvPr/>
+        </p:nvSpPr>
+        <p:spPr>
+          <a:xfrm>
+            <a:off x="1033526" y="469231"/>
+            <a:ext cx="3609065" cy="646331"/>
+          </a:xfrm>
+          <a:prstGeom prst="rect">
+            <a:avLst/>
+          </a:prstGeom>
+          <a:noFill/>
+        </p:spPr>
+        <p:txBody>
+          <a:bodyPr wrap="none" rtlCol="0">
+            <a:spAutoFit/>
+          </a:bodyPr>
+          <a:lstStyle/>
+          <a:p>
+            <a:r>
+              <a:rPr lang="es-ES" sz="3600" dirty="0"/>
+              <a:t>El diseño estándar</a:t>
+            </a:r>
+            <a:endParaRPr lang="es-419" sz="3600" dirty="0"/>
+          </a:p>
+        </p:txBody>
+      </p:sp>
+    </p:spTree>
+    <p:extLst>
+      <p:ext uri="{BB962C8B-B14F-4D97-AF65-F5344CB8AC3E}">
+        <p14:creationId xmlns:p14="http://schemas.microsoft.com/office/powerpoint/2010/main" val="2682431457"/>
+      </p:ext>
+    </p:extLst>
+  </p:cSld>
+  <p:clrMapOvr>
+    <a:masterClrMapping/>
+  </p:clrMapOvr>
+</p:sld>
+</file>
+
+<file path=ppt/slides/slide40.xml><?xml version="1.0" encoding="utf-8"?>
+<p:sld xmlns:a="http://schemas.openxmlformats.org/drawingml/2006/main" xmlns:r="http://schemas.openxmlformats.org/officeDocument/2006/relationships" xmlns:p="http://schemas.openxmlformats.org/presentationml/2006/main">
+  <p:cSld>
+    <p:spTree>
+      <p:nvGrpSpPr>
+        <p:cNvPr id="1" name=""/>
+        <p:cNvGrpSpPr/>
+        <p:nvPr/>
+      </p:nvGrpSpPr>
+      <p:grpSpPr>
+        <a:xfrm>
+          <a:off x="0" y="0"/>
+          <a:ext cx="0" cy="0"/>
+          <a:chOff x="0" y="0"/>
+          <a:chExt cx="0" cy="0"/>
+        </a:xfrm>
+      </p:grpSpPr>
+      <p:sp>
+        <p:nvSpPr>
+          <p:cNvPr id="2" name="CuadroTexto 1">
+            <a:extLst>
+              <a:ext uri="{FF2B5EF4-FFF2-40B4-BE49-F238E27FC236}">
+                <a16:creationId xmlns:a16="http://schemas.microsoft.com/office/drawing/2014/main" id="{A390C258-B5A2-4D02-8484-603436154632}"/>
+              </a:ext>
+            </a:extLst>
+          </p:cNvPr>
+          <p:cNvSpPr txBox="1"/>
+          <p:nvPr/>
+        </p:nvSpPr>
+        <p:spPr>
+          <a:xfrm>
+            <a:off x="685963" y="647748"/>
+            <a:ext cx="9348374" cy="646331"/>
+          </a:xfrm>
+          <a:prstGeom prst="rect">
+            <a:avLst/>
+          </a:prstGeom>
+          <a:noFill/>
+        </p:spPr>
+        <p:txBody>
+          <a:bodyPr wrap="square" rtlCol="0">
+            <a:spAutoFit/>
+          </a:bodyPr>
+          <a:lstStyle/>
+          <a:p>
+            <a:r>
+              <a:rPr lang="es-ES" sz="3600" dirty="0"/>
+              <a:t>Patrón </a:t>
+            </a:r>
+            <a:r>
+              <a:rPr lang="es-ES" sz="3600" dirty="0" err="1"/>
+              <a:t>FlyWeight</a:t>
+            </a:r>
+            <a:r>
+              <a:rPr lang="es-ES" sz="3600" dirty="0"/>
+              <a:t> Relacionado con Patrón Factory</a:t>
+            </a:r>
+            <a:endParaRPr lang="es-419" sz="3600" dirty="0"/>
+          </a:p>
+        </p:txBody>
+      </p:sp>
+      <p:sp>
+        <p:nvSpPr>
+          <p:cNvPr id="3" name="CuadroTexto 2">
+            <a:extLst>
+              <a:ext uri="{FF2B5EF4-FFF2-40B4-BE49-F238E27FC236}">
+                <a16:creationId xmlns:a16="http://schemas.microsoft.com/office/drawing/2014/main" id="{520685AC-4F31-4AE7-B480-CA8FEE6579CE}"/>
+              </a:ext>
+            </a:extLst>
+          </p:cNvPr>
+          <p:cNvSpPr txBox="1"/>
+          <p:nvPr/>
+        </p:nvSpPr>
+        <p:spPr>
+          <a:xfrm>
+            <a:off x="685964" y="2455068"/>
+            <a:ext cx="3753690" cy="3385542"/>
+          </a:xfrm>
+          <a:prstGeom prst="rect">
+            <a:avLst/>
+          </a:prstGeom>
+          <a:noFill/>
+        </p:spPr>
+        <p:txBody>
+          <a:bodyPr wrap="square" rtlCol="0">
+            <a:spAutoFit/>
+          </a:bodyPr>
+          <a:lstStyle/>
+          <a:p>
+            <a:r>
+              <a:rPr lang="es-ES" dirty="0"/>
+              <a:t>La relación entre estos dos patrones permite que:</a:t>
+            </a:r>
+          </a:p>
+          <a:p>
+            <a:endParaRPr lang="es-ES" dirty="0"/>
+          </a:p>
+          <a:p>
+            <a:pPr marL="285750" indent="-285750">
+              <a:buFont typeface="Arial" panose="020B0604020202020204" pitchFamily="34" charset="0"/>
+              <a:buChar char="•"/>
+            </a:pPr>
+            <a:r>
+              <a:rPr lang="es-ES" sz="1600" dirty="0"/>
+              <a:t>El objeto que implementa este patrón sea el que gestione la separación entre la parte «común» (denominada intrínseca) y la parte «privada» (denominada extrínseca)</a:t>
+            </a:r>
+          </a:p>
+          <a:p>
+            <a:endParaRPr lang="es-ES" sz="1600" dirty="0"/>
+          </a:p>
+          <a:p>
+            <a:pPr marL="285750" indent="-285750">
+              <a:buFont typeface="Arial" panose="020B0604020202020204" pitchFamily="34" charset="0"/>
+              <a:buChar char="•"/>
+            </a:pPr>
+            <a:r>
+              <a:rPr lang="es-ES" sz="1600" dirty="0"/>
+              <a:t>Con </a:t>
+            </a:r>
+            <a:r>
+              <a:rPr lang="es-ES" sz="1600" dirty="0" err="1"/>
+              <a:t>factory</a:t>
+            </a:r>
+            <a:r>
+              <a:rPr lang="es-ES" sz="1600" dirty="0"/>
+              <a:t> se centraliza el proceso asegurando que pierdan referencias, riesgo que se tiene si no se implementa la </a:t>
+            </a:r>
+            <a:r>
+              <a:rPr lang="es-ES" sz="1600" dirty="0" err="1"/>
+              <a:t>factory</a:t>
+            </a:r>
+            <a:r>
+              <a:rPr lang="es-ES" sz="1600" dirty="0"/>
+              <a:t>.</a:t>
+            </a:r>
+            <a:endParaRPr lang="es-419" sz="1600" dirty="0"/>
+          </a:p>
+        </p:txBody>
+      </p:sp>
+      <p:pic>
+        <p:nvPicPr>
+          <p:cNvPr id="4" name="Imagen 3">
+            <a:extLst>
+              <a:ext uri="{FF2B5EF4-FFF2-40B4-BE49-F238E27FC236}">
+                <a16:creationId xmlns:a16="http://schemas.microsoft.com/office/drawing/2014/main" id="{55CA70E6-C136-4058-86DA-4C1A5129AF28}"/>
+              </a:ext>
+            </a:extLst>
+          </p:cNvPr>
+          <p:cNvPicPr>
+            <a:picLocks noChangeAspect="1"/>
+          </p:cNvPicPr>
+          <p:nvPr/>
+        </p:nvPicPr>
+        <p:blipFill>
+          <a:blip r:embed="rId2"/>
+          <a:stretch>
+            <a:fillRect/>
+          </a:stretch>
+        </p:blipFill>
+        <p:spPr>
+          <a:xfrm>
+            <a:off x="5963343" y="2030329"/>
+            <a:ext cx="5434571" cy="3311692"/>
+          </a:xfrm>
+          <a:prstGeom prst="rect">
+            <a:avLst/>
+          </a:prstGeom>
+        </p:spPr>
+      </p:pic>
+      <p:sp>
+        <p:nvSpPr>
+          <p:cNvPr id="5" name="CuadroTexto 4">
+            <a:extLst>
+              <a:ext uri="{FF2B5EF4-FFF2-40B4-BE49-F238E27FC236}">
+                <a16:creationId xmlns:a16="http://schemas.microsoft.com/office/drawing/2014/main" id="{D077E009-3DD6-44E7-94DC-88502E70E3F1}"/>
+              </a:ext>
+            </a:extLst>
+          </p:cNvPr>
+          <p:cNvSpPr txBox="1"/>
+          <p:nvPr/>
+        </p:nvSpPr>
+        <p:spPr>
+          <a:xfrm>
+            <a:off x="10034337" y="5686721"/>
+            <a:ext cx="1955985" cy="307777"/>
+          </a:xfrm>
+          <a:prstGeom prst="rect">
+            <a:avLst/>
+          </a:prstGeom>
+          <a:noFill/>
+        </p:spPr>
+        <p:txBody>
+          <a:bodyPr wrap="none" rtlCol="0">
+            <a:spAutoFit/>
+          </a:bodyPr>
+          <a:lstStyle/>
+          <a:p>
+            <a:r>
+              <a:rPr lang="es-ES" sz="1400" dirty="0"/>
+              <a:t>Fuente: </a:t>
+            </a:r>
+            <a:r>
+              <a:rPr lang="es-ES" sz="1400" dirty="0" err="1"/>
+              <a:t>refactoring</a:t>
+            </a:r>
+            <a:r>
+              <a:rPr lang="es-ES" sz="1400" dirty="0"/>
+              <a:t> </a:t>
+            </a:r>
+            <a:r>
+              <a:rPr lang="es-ES" sz="1400" dirty="0" err="1"/>
+              <a:t>guru</a:t>
+            </a:r>
+            <a:endParaRPr lang="es-419" sz="1400" dirty="0"/>
+          </a:p>
+        </p:txBody>
+      </p:sp>
+      <p:sp>
+        <p:nvSpPr>
+          <p:cNvPr id="7" name="CuadroTexto 6">
+            <a:extLst>
+              <a:ext uri="{FF2B5EF4-FFF2-40B4-BE49-F238E27FC236}">
+                <a16:creationId xmlns:a16="http://schemas.microsoft.com/office/drawing/2014/main" id="{4379FCA7-249C-4E4D-B810-B975653156EB}"/>
+              </a:ext>
+            </a:extLst>
+          </p:cNvPr>
+          <p:cNvSpPr txBox="1"/>
+          <p:nvPr/>
+        </p:nvSpPr>
+        <p:spPr>
+          <a:xfrm>
+            <a:off x="5727030" y="1351353"/>
+            <a:ext cx="3474117" cy="523220"/>
+          </a:xfrm>
+          <a:prstGeom prst="rect">
+            <a:avLst/>
+          </a:prstGeom>
+          <a:noFill/>
+        </p:spPr>
+        <p:txBody>
+          <a:bodyPr wrap="square">
+            <a:spAutoFit/>
+          </a:bodyPr>
+          <a:lstStyle/>
+          <a:p>
+            <a:r>
+              <a:rPr lang="es-ES" sz="1400" b="1" dirty="0">
+                <a:solidFill>
+                  <a:schemeClr val="accent6"/>
+                </a:solidFill>
+              </a:rPr>
+              <a:t>Administra los objetos compartidos, evitando duplicaciones.</a:t>
+            </a:r>
+            <a:endParaRPr lang="es-419" sz="1400" b="1" dirty="0">
+              <a:solidFill>
+                <a:schemeClr val="accent6"/>
+              </a:solidFill>
+            </a:endParaRPr>
+          </a:p>
+        </p:txBody>
+      </p:sp>
+      <p:sp>
+        <p:nvSpPr>
+          <p:cNvPr id="9" name="CuadroTexto 8">
+            <a:extLst>
+              <a:ext uri="{FF2B5EF4-FFF2-40B4-BE49-F238E27FC236}">
+                <a16:creationId xmlns:a16="http://schemas.microsoft.com/office/drawing/2014/main" id="{9C9B2CAF-333C-4B55-ADCB-043BCB15324F}"/>
+              </a:ext>
+            </a:extLst>
+          </p:cNvPr>
+          <p:cNvSpPr txBox="1"/>
+          <p:nvPr/>
+        </p:nvSpPr>
+        <p:spPr>
+          <a:xfrm>
+            <a:off x="5589094" y="5342021"/>
+            <a:ext cx="2824414" cy="307777"/>
+          </a:xfrm>
+          <a:prstGeom prst="rect">
+            <a:avLst/>
+          </a:prstGeom>
+          <a:noFill/>
+        </p:spPr>
+        <p:txBody>
+          <a:bodyPr wrap="square">
+            <a:spAutoFit/>
+          </a:bodyPr>
+          <a:lstStyle/>
+          <a:p>
+            <a:r>
+              <a:rPr lang="es-419" sz="1400" b="1" dirty="0">
+                <a:solidFill>
+                  <a:schemeClr val="accent6"/>
+                </a:solidFill>
+              </a:rPr>
+              <a:t>Representa los datos compartidos</a:t>
+            </a:r>
+          </a:p>
+        </p:txBody>
+      </p:sp>
+    </p:spTree>
+    <p:extLst>
+      <p:ext uri="{BB962C8B-B14F-4D97-AF65-F5344CB8AC3E}">
+        <p14:creationId xmlns:p14="http://schemas.microsoft.com/office/powerpoint/2010/main" val="870906304"/>
+      </p:ext>
+    </p:extLst>
+  </p:cSld>
+  <p:clrMapOvr>
+    <a:masterClrMapping/>
+  </p:clrMapOvr>
+</p:sld>
+</file>
+
+<file path=ppt/slides/slide41.xml><?xml version="1.0" encoding="utf-8"?>
+<p:sld xmlns:a="http://schemas.openxmlformats.org/drawingml/2006/main" xmlns:r="http://schemas.openxmlformats.org/officeDocument/2006/relationships" xmlns:p="http://schemas.openxmlformats.org/presentationml/2006/main">
+  <p:cSld>
+    <p:spTree>
+      <p:nvGrpSpPr>
+        <p:cNvPr id="1" name=""/>
+        <p:cNvGrpSpPr/>
+        <p:nvPr/>
+      </p:nvGrpSpPr>
+      <p:grpSpPr>
+        <a:xfrm>
+          <a:off x="0" y="0"/>
+          <a:ext cx="0" cy="0"/>
+          <a:chOff x="0" y="0"/>
+          <a:chExt cx="0" cy="0"/>
+        </a:xfrm>
+      </p:grpSpPr>
+      <p:grpSp>
+        <p:nvGrpSpPr>
+          <p:cNvPr id="11" name="Grupo 10">
+            <a:extLst>
+              <a:ext uri="{FF2B5EF4-FFF2-40B4-BE49-F238E27FC236}">
+                <a16:creationId xmlns:a16="http://schemas.microsoft.com/office/drawing/2014/main" id="{8B3527FE-C538-4745-A640-1159BBCA54AA}"/>
+              </a:ext>
+            </a:extLst>
+          </p:cNvPr>
+          <p:cNvGrpSpPr/>
+          <p:nvPr/>
+        </p:nvGrpSpPr>
+        <p:grpSpPr>
+          <a:xfrm>
+            <a:off x="6867776" y="1257984"/>
+            <a:ext cx="5057775" cy="3297853"/>
+            <a:chOff x="5520239" y="2115553"/>
+            <a:chExt cx="5057775" cy="3297853"/>
+          </a:xfrm>
+        </p:grpSpPr>
+        <p:pic>
+          <p:nvPicPr>
+            <p:cNvPr id="3" name="Imagen 2">
+              <a:extLst>
+                <a:ext uri="{FF2B5EF4-FFF2-40B4-BE49-F238E27FC236}">
+                  <a16:creationId xmlns:a16="http://schemas.microsoft.com/office/drawing/2014/main" id="{F81B87A4-636F-4635-B656-7C8821598890}"/>
+                </a:ext>
+              </a:extLst>
+            </p:cNvPr>
+            <p:cNvPicPr>
+              <a:picLocks noChangeAspect="1"/>
+            </p:cNvPicPr>
+            <p:nvPr/>
+          </p:nvPicPr>
+          <p:blipFill>
+            <a:blip r:embed="rId2"/>
+            <a:stretch>
+              <a:fillRect/>
+            </a:stretch>
+          </p:blipFill>
+          <p:spPr>
+            <a:xfrm>
+              <a:off x="6207531" y="4187793"/>
+              <a:ext cx="3683189" cy="1225613"/>
+            </a:xfrm>
+            <a:prstGeom prst="rect">
+              <a:avLst/>
+            </a:prstGeom>
+          </p:spPr>
+        </p:pic>
+        <p:sp>
+          <p:nvSpPr>
+            <p:cNvPr id="4" name="Diagrama de flujo: decisión 3">
+              <a:extLst>
+                <a:ext uri="{FF2B5EF4-FFF2-40B4-BE49-F238E27FC236}">
+                  <a16:creationId xmlns:a16="http://schemas.microsoft.com/office/drawing/2014/main" id="{0000DEDF-7BB8-43B9-A789-150006746B42}"/>
+                </a:ext>
+              </a:extLst>
+            </p:cNvPr>
+            <p:cNvSpPr/>
+            <p:nvPr/>
+          </p:nvSpPr>
+          <p:spPr>
+            <a:xfrm>
+              <a:off x="7872282" y="3068053"/>
+              <a:ext cx="353690" cy="409073"/>
+            </a:xfrm>
+            <a:prstGeom prst="flowChartDecision">
+              <a:avLst/>
+            </a:prstGeom>
+          </p:spPr>
+          <p:style>
+            <a:lnRef idx="2">
+              <a:schemeClr val="dk1"/>
+            </a:lnRef>
+            <a:fillRef idx="1">
+              <a:schemeClr val="lt1"/>
+            </a:fillRef>
+            <a:effectRef idx="0">
+              <a:schemeClr val="dk1"/>
+            </a:effectRef>
+            <a:fontRef idx="minor">
+              <a:schemeClr val="dk1"/>
+            </a:fontRef>
+          </p:style>
+          <p:txBody>
+            <a:bodyPr rtlCol="0" anchor="ctr"/>
+            <a:lstStyle/>
+            <a:p>
+              <a:pPr algn="ctr"/>
+              <a:endParaRPr lang="es-419"/>
+            </a:p>
+          </p:txBody>
+        </p:sp>
+        <p:cxnSp>
+          <p:nvCxnSpPr>
+            <p:cNvPr id="6" name="Conector recto de flecha 5">
+              <a:extLst>
+                <a:ext uri="{FF2B5EF4-FFF2-40B4-BE49-F238E27FC236}">
+                  <a16:creationId xmlns:a16="http://schemas.microsoft.com/office/drawing/2014/main" id="{B9BCEDD9-1783-4BAD-B329-7BD91BBC26AD}"/>
+                </a:ext>
+              </a:extLst>
+            </p:cNvPr>
+            <p:cNvCxnSpPr>
+              <a:cxnSpLocks/>
+            </p:cNvCxnSpPr>
+            <p:nvPr/>
+          </p:nvCxnSpPr>
+          <p:spPr>
+            <a:xfrm>
+              <a:off x="8049127" y="3477126"/>
+              <a:ext cx="0" cy="745958"/>
+            </a:xfrm>
+            <a:prstGeom prst="straightConnector1">
+              <a:avLst/>
+            </a:prstGeom>
+            <a:ln>
+              <a:tailEnd type="triangle"/>
+            </a:ln>
+          </p:spPr>
+          <p:style>
+            <a:lnRef idx="2">
+              <a:schemeClr val="dk1"/>
+            </a:lnRef>
+            <a:fillRef idx="0">
+              <a:schemeClr val="dk1"/>
+            </a:fillRef>
+            <a:effectRef idx="1">
+              <a:schemeClr val="dk1"/>
+            </a:effectRef>
+            <a:fontRef idx="minor">
+              <a:schemeClr val="tx1"/>
+            </a:fontRef>
+          </p:style>
+        </p:cxnSp>
+        <p:pic>
+          <p:nvPicPr>
+            <p:cNvPr id="1026" name="Picture 2" descr="Diagrama de clases">
+              <a:extLst>
+                <a:ext uri="{FF2B5EF4-FFF2-40B4-BE49-F238E27FC236}">
+                  <a16:creationId xmlns:a16="http://schemas.microsoft.com/office/drawing/2014/main" id="{314889F9-B490-44D4-A56F-608333A9493A}"/>
+                </a:ext>
+              </a:extLst>
+            </p:cNvPr>
+            <p:cNvPicPr>
+              <a:picLocks noChangeAspect="1" noChangeArrowheads="1"/>
+            </p:cNvPicPr>
+            <p:nvPr/>
+          </p:nvPicPr>
+          <p:blipFill>
+            <a:blip r:embed="rId3">
+              <a:extLst>
+                <a:ext uri="{28A0092B-C50C-407E-A947-70E740481C1C}">
+                  <a14:useLocalDpi xmlns:a14="http://schemas.microsoft.com/office/drawing/2010/main" val="0"/>
+                </a:ext>
+              </a:extLst>
+            </a:blip>
+            <a:srcRect/>
+            <a:stretch>
+              <a:fillRect/>
+            </a:stretch>
+          </p:blipFill>
+          <p:spPr bwMode="auto">
+            <a:xfrm>
+              <a:off x="5520239" y="2115553"/>
+              <a:ext cx="5057775" cy="952500"/>
+            </a:xfrm>
+            <a:prstGeom prst="rect">
+              <a:avLst/>
+            </a:prstGeom>
+            <a:noFill/>
+            <a:extLst>
+              <a:ext uri="{909E8E84-426E-40DD-AFC4-6F175D3DCCD1}">
+                <a14:hiddenFill xmlns:a14="http://schemas.microsoft.com/office/drawing/2010/main">
+                  <a:solidFill>
+                    <a:srgbClr val="FFFFFF"/>
+                  </a:solidFill>
+                </a14:hiddenFill>
+              </a:ext>
+            </a:extLst>
+          </p:spPr>
+        </p:pic>
+      </p:grpSp>
+      <p:sp>
+        <p:nvSpPr>
+          <p:cNvPr id="10" name="CuadroTexto 9">
+            <a:extLst>
+              <a:ext uri="{FF2B5EF4-FFF2-40B4-BE49-F238E27FC236}">
+                <a16:creationId xmlns:a16="http://schemas.microsoft.com/office/drawing/2014/main" id="{A2DBDD11-46FE-4EDC-B5C3-C9A0C153B30A}"/>
+              </a:ext>
+            </a:extLst>
+          </p:cNvPr>
+          <p:cNvSpPr txBox="1"/>
+          <p:nvPr/>
+        </p:nvSpPr>
+        <p:spPr>
+          <a:xfrm>
+            <a:off x="974721" y="611653"/>
+            <a:ext cx="5778619" cy="646331"/>
+          </a:xfrm>
+          <a:prstGeom prst="rect">
+            <a:avLst/>
+          </a:prstGeom>
+          <a:noFill/>
+        </p:spPr>
+        <p:txBody>
+          <a:bodyPr wrap="square" rtlCol="0">
+            <a:spAutoFit/>
+          </a:bodyPr>
+          <a:lstStyle/>
+          <a:p>
+            <a:r>
+              <a:rPr lang="es-ES" sz="3600" dirty="0"/>
+              <a:t>UML </a:t>
+            </a:r>
+            <a:r>
+              <a:rPr lang="es-ES" sz="3600" dirty="0" err="1"/>
+              <a:t>FlyWeight</a:t>
+            </a:r>
+            <a:endParaRPr lang="es-419" sz="3600" dirty="0"/>
+          </a:p>
+        </p:txBody>
+      </p:sp>
+      <p:sp>
+        <p:nvSpPr>
+          <p:cNvPr id="9" name="CuadroTexto 8">
+            <a:extLst>
+              <a:ext uri="{FF2B5EF4-FFF2-40B4-BE49-F238E27FC236}">
+                <a16:creationId xmlns:a16="http://schemas.microsoft.com/office/drawing/2014/main" id="{3BAB920C-BB0A-415D-8FC2-E6985B0D544A}"/>
+              </a:ext>
+            </a:extLst>
+          </p:cNvPr>
+          <p:cNvSpPr txBox="1"/>
+          <p:nvPr/>
+        </p:nvSpPr>
+        <p:spPr>
+          <a:xfrm>
+            <a:off x="575083" y="2069432"/>
+            <a:ext cx="6175824" cy="3262432"/>
+          </a:xfrm>
+          <a:prstGeom prst="rect">
+            <a:avLst/>
+          </a:prstGeom>
+          <a:noFill/>
+        </p:spPr>
+        <p:txBody>
+          <a:bodyPr wrap="square" rtlCol="0">
+            <a:spAutoFit/>
+          </a:bodyPr>
+          <a:lstStyle/>
+          <a:p>
+            <a:r>
+              <a:rPr lang="es-ES" dirty="0"/>
+              <a:t>El flujo para la implementación sería:</a:t>
+            </a:r>
+          </a:p>
+          <a:p>
+            <a:endParaRPr lang="es-ES" dirty="0"/>
+          </a:p>
+          <a:p>
+            <a:pPr marL="342900" indent="-342900">
+              <a:buFont typeface="+mj-lt"/>
+              <a:buAutoNum type="arabicPeriod"/>
+            </a:pPr>
+            <a:r>
+              <a:rPr lang="es-ES" sz="1600" dirty="0"/>
+              <a:t>El cliente quiere crear un objeto Auto(</a:t>
+            </a:r>
+            <a:r>
+              <a:rPr lang="es-ES" sz="1600" dirty="0" err="1"/>
+              <a:t>AutoFlyweight</a:t>
+            </a:r>
+            <a:r>
+              <a:rPr lang="es-ES" sz="1600" dirty="0"/>
+              <a:t>)</a:t>
+            </a:r>
+          </a:p>
+          <a:p>
+            <a:pPr marL="342900" indent="-342900">
+              <a:buFont typeface="+mj-lt"/>
+              <a:buAutoNum type="arabicPeriod"/>
+            </a:pPr>
+            <a:r>
+              <a:rPr lang="es-ES" sz="1600" dirty="0"/>
+              <a:t>Invoca a la fabrica en el método </a:t>
+            </a:r>
+            <a:r>
+              <a:rPr lang="es-ES" sz="1600" dirty="0" err="1"/>
+              <a:t>BuscarAuto</a:t>
+            </a:r>
+            <a:endParaRPr lang="es-ES" sz="1600" dirty="0"/>
+          </a:p>
+          <a:p>
+            <a:pPr marL="342900" indent="-342900">
+              <a:buFont typeface="+mj-lt"/>
+              <a:buAutoNum type="arabicPeriod"/>
+            </a:pPr>
+            <a:r>
+              <a:rPr lang="es-ES" sz="1600" dirty="0" err="1"/>
+              <a:t>BuscarAuto</a:t>
+            </a:r>
+            <a:r>
+              <a:rPr lang="es-ES" sz="1600" dirty="0"/>
+              <a:t> lo busca en el diccionario (caché) </a:t>
+            </a:r>
+          </a:p>
+          <a:p>
+            <a:pPr marL="342900" indent="-342900">
+              <a:buFont typeface="+mj-lt"/>
+              <a:buAutoNum type="arabicPeriod"/>
+            </a:pPr>
+            <a:r>
+              <a:rPr lang="es-ES" sz="1600" dirty="0"/>
+              <a:t>Si el auto existe en el diccionario, trae el objeto </a:t>
+            </a:r>
+            <a:r>
+              <a:rPr lang="es-ES" sz="1600" dirty="0" err="1"/>
+              <a:t>flyweight</a:t>
+            </a:r>
+            <a:r>
+              <a:rPr lang="es-ES" sz="1600" dirty="0"/>
+              <a:t> almacenado</a:t>
+            </a:r>
+          </a:p>
+          <a:p>
+            <a:pPr marL="342900" indent="-342900">
+              <a:buFont typeface="+mj-lt"/>
+              <a:buAutoNum type="arabicPeriod"/>
+            </a:pPr>
+            <a:r>
+              <a:rPr lang="es-ES" sz="1600" dirty="0"/>
+              <a:t>Si no existe en el diccionario crea un nuevo </a:t>
+            </a:r>
+            <a:r>
+              <a:rPr lang="es-ES" sz="1600" dirty="0" err="1"/>
+              <a:t>flyweight</a:t>
+            </a:r>
+            <a:r>
+              <a:rPr lang="es-ES" sz="1600" dirty="0"/>
+              <a:t> con los valores intrínsecos</a:t>
+            </a:r>
+          </a:p>
+          <a:p>
+            <a:pPr marL="342900" indent="-342900">
+              <a:buFont typeface="+mj-lt"/>
+              <a:buAutoNum type="arabicPeriod"/>
+            </a:pPr>
+            <a:r>
+              <a:rPr lang="es-ES" sz="1600" dirty="0"/>
+              <a:t>Luego se adicionan los valores extrínsecos y se tiene un nuevo auto completo</a:t>
+            </a:r>
+          </a:p>
+          <a:p>
+            <a:endParaRPr lang="es-ES" dirty="0"/>
+          </a:p>
+        </p:txBody>
+      </p:sp>
+      <p:pic>
+        <p:nvPicPr>
+          <p:cNvPr id="13" name="Imagen 12">
+            <a:extLst>
+              <a:ext uri="{FF2B5EF4-FFF2-40B4-BE49-F238E27FC236}">
+                <a16:creationId xmlns:a16="http://schemas.microsoft.com/office/drawing/2014/main" id="{2A8C130D-AB5C-41DC-9144-B4C494DCBEFE}"/>
+              </a:ext>
+            </a:extLst>
+          </p:cNvPr>
+          <p:cNvPicPr>
+            <a:picLocks noChangeAspect="1"/>
+          </p:cNvPicPr>
+          <p:nvPr/>
+        </p:nvPicPr>
+        <p:blipFill>
+          <a:blip r:embed="rId4"/>
+          <a:stretch>
+            <a:fillRect/>
+          </a:stretch>
+        </p:blipFill>
+        <p:spPr>
+          <a:xfrm>
+            <a:off x="8941784" y="4780986"/>
+            <a:ext cx="1184017" cy="894591"/>
+          </a:xfrm>
+          <a:prstGeom prst="rect">
+            <a:avLst/>
+          </a:prstGeom>
+        </p:spPr>
+      </p:pic>
+      <p:sp>
+        <p:nvSpPr>
+          <p:cNvPr id="14" name="CuadroTexto 13">
+            <a:extLst>
+              <a:ext uri="{FF2B5EF4-FFF2-40B4-BE49-F238E27FC236}">
+                <a16:creationId xmlns:a16="http://schemas.microsoft.com/office/drawing/2014/main" id="{77F59832-C639-45E9-9765-36F7A32724A6}"/>
+              </a:ext>
+            </a:extLst>
+          </p:cNvPr>
+          <p:cNvSpPr txBox="1"/>
+          <p:nvPr/>
+        </p:nvSpPr>
+        <p:spPr>
+          <a:xfrm>
+            <a:off x="8712440" y="5876015"/>
+            <a:ext cx="1722138" cy="369332"/>
+          </a:xfrm>
+          <a:prstGeom prst="rect">
+            <a:avLst/>
+          </a:prstGeom>
+          <a:noFill/>
+        </p:spPr>
+        <p:txBody>
+          <a:bodyPr wrap="none" rtlCol="0">
+            <a:spAutoFit/>
+          </a:bodyPr>
+          <a:lstStyle/>
+          <a:p>
+            <a:r>
+              <a:rPr lang="es-ES" dirty="0"/>
+              <a:t>Implementemos</a:t>
+            </a:r>
+            <a:endParaRPr lang="es-419" dirty="0"/>
+          </a:p>
+        </p:txBody>
+      </p:sp>
+    </p:spTree>
+    <p:extLst>
+      <p:ext uri="{BB962C8B-B14F-4D97-AF65-F5344CB8AC3E}">
+        <p14:creationId xmlns:p14="http://schemas.microsoft.com/office/powerpoint/2010/main" val="2914004312"/>
+      </p:ext>
+    </p:extLst>
+  </p:cSld>
+  <p:clrMapOvr>
+    <a:masterClrMapping/>
+  </p:clrMapOvr>
+</p:sld>
+</file>
+
+<file path=ppt/slides/slide42.xml><?xml version="1.0" encoding="utf-8"?>
+<p:sld xmlns:a="http://schemas.openxmlformats.org/drawingml/2006/main" xmlns:r="http://schemas.openxmlformats.org/officeDocument/2006/relationships" xmlns:p="http://schemas.openxmlformats.org/presentationml/2006/main">
+  <p:cSld>
+    <p:spTree>
+      <p:nvGrpSpPr>
+        <p:cNvPr id="1" name=""/>
+        <p:cNvGrpSpPr/>
+        <p:nvPr/>
+      </p:nvGrpSpPr>
+      <p:grpSpPr>
+        <a:xfrm>
+          <a:off x="0" y="0"/>
+          <a:ext cx="0" cy="0"/>
+          <a:chOff x="0" y="0"/>
+          <a:chExt cx="0" cy="0"/>
+        </a:xfrm>
+      </p:grpSpPr>
+      <p:sp>
+        <p:nvSpPr>
+          <p:cNvPr id="2" name="CuadroTexto 1">
+            <a:extLst>
+              <a:ext uri="{FF2B5EF4-FFF2-40B4-BE49-F238E27FC236}">
+                <a16:creationId xmlns:a16="http://schemas.microsoft.com/office/drawing/2014/main" id="{A76A8214-277D-4F3D-9AE3-F0CEB8C6CF2B}"/>
+              </a:ext>
+            </a:extLst>
+          </p:cNvPr>
+          <p:cNvSpPr txBox="1"/>
+          <p:nvPr/>
+        </p:nvSpPr>
+        <p:spPr>
+          <a:xfrm>
+            <a:off x="867578" y="454010"/>
+            <a:ext cx="7185752" cy="646331"/>
+          </a:xfrm>
+          <a:prstGeom prst="rect">
+            <a:avLst/>
+          </a:prstGeom>
+          <a:noFill/>
+        </p:spPr>
+        <p:txBody>
+          <a:bodyPr wrap="square" rtlCol="0">
+            <a:spAutoFit/>
+          </a:bodyPr>
+          <a:lstStyle>
+            <a:defPPr>
+              <a:defRPr lang="es-419"/>
+            </a:defPPr>
+            <a:lvl1pPr>
+              <a:defRPr sz="3600"/>
+            </a:lvl1pPr>
+          </a:lstStyle>
+          <a:p>
+            <a:r>
+              <a:rPr lang="es-ES" dirty="0"/>
+              <a:t>Uso Profesional del Patrón </a:t>
+            </a:r>
+            <a:r>
+              <a:rPr lang="es-ES" dirty="0" err="1"/>
+              <a:t>FlyWeight</a:t>
+            </a:r>
+            <a:endParaRPr lang="es-ES" dirty="0"/>
+          </a:p>
+        </p:txBody>
+      </p:sp>
+      <p:sp>
+        <p:nvSpPr>
+          <p:cNvPr id="4" name="CuadroTexto 3">
+            <a:extLst>
+              <a:ext uri="{FF2B5EF4-FFF2-40B4-BE49-F238E27FC236}">
+                <a16:creationId xmlns:a16="http://schemas.microsoft.com/office/drawing/2014/main" id="{F6505008-52E0-47DA-B358-340DB3EE2613}"/>
+              </a:ext>
+            </a:extLst>
+          </p:cNvPr>
+          <p:cNvSpPr txBox="1"/>
+          <p:nvPr/>
+        </p:nvSpPr>
+        <p:spPr>
+          <a:xfrm>
+            <a:off x="867578" y="1197605"/>
+            <a:ext cx="9976184" cy="2585323"/>
+          </a:xfrm>
+          <a:prstGeom prst="rect">
+            <a:avLst/>
+          </a:prstGeom>
+          <a:noFill/>
+        </p:spPr>
+        <p:txBody>
+          <a:bodyPr wrap="square">
+            <a:spAutoFit/>
+          </a:bodyPr>
+          <a:lstStyle/>
+          <a:p>
+            <a:r>
+              <a:rPr lang="es-ES" b="1" dirty="0"/>
+              <a:t>Cómo lo Usa un Arquitecto de Software?</a:t>
+            </a:r>
+          </a:p>
+          <a:p>
+            <a:endParaRPr lang="es-ES" dirty="0"/>
+          </a:p>
+          <a:p>
+            <a:r>
+              <a:rPr lang="es-ES" dirty="0"/>
+              <a:t>En un entorno profesional, un </a:t>
+            </a:r>
+            <a:r>
+              <a:rPr lang="es-ES" b="1" dirty="0"/>
+              <a:t>arquitecto de software</a:t>
+            </a:r>
+            <a:r>
+              <a:rPr lang="es-ES" dirty="0"/>
+              <a:t> usa </a:t>
+            </a:r>
+            <a:r>
+              <a:rPr lang="es-ES" dirty="0" err="1"/>
+              <a:t>Flyweight</a:t>
+            </a:r>
+            <a:r>
+              <a:rPr lang="es-ES" dirty="0"/>
+              <a:t> en escenarios donde hay </a:t>
+            </a:r>
+            <a:r>
+              <a:rPr lang="es-ES" b="1" dirty="0"/>
+              <a:t>gran cantidad de objetos</a:t>
+            </a:r>
+            <a:r>
+              <a:rPr lang="es-ES" dirty="0"/>
+              <a:t> con atributos repetitivos. Algunos ejemplos:</a:t>
+            </a:r>
+          </a:p>
+          <a:p>
+            <a:endParaRPr lang="es-ES" dirty="0"/>
+          </a:p>
+          <a:p>
+            <a:pPr>
+              <a:buFont typeface="Arial" panose="020B0604020202020204" pitchFamily="34" charset="0"/>
+              <a:buChar char="•"/>
+            </a:pPr>
+            <a:r>
+              <a:rPr lang="es-ES" b="1" dirty="0"/>
+              <a:t> Juegos</a:t>
+            </a:r>
+            <a:r>
+              <a:rPr lang="es-ES" dirty="0"/>
+              <a:t>: Compartir modelos 3D de personajes o texturas.</a:t>
+            </a:r>
+          </a:p>
+          <a:p>
+            <a:pPr>
+              <a:buFont typeface="Arial" panose="020B0604020202020204" pitchFamily="34" charset="0"/>
+              <a:buChar char="•"/>
+            </a:pPr>
+            <a:r>
+              <a:rPr lang="es-ES" b="1" dirty="0"/>
+              <a:t> Sistemas de mapas</a:t>
+            </a:r>
+            <a:r>
+              <a:rPr lang="es-ES" dirty="0"/>
+              <a:t>: Reutilizar íconos y datos de puntos de interés.</a:t>
+            </a:r>
+          </a:p>
+          <a:p>
+            <a:pPr>
+              <a:buFont typeface="Arial" panose="020B0604020202020204" pitchFamily="34" charset="0"/>
+              <a:buChar char="•"/>
+            </a:pPr>
+            <a:r>
+              <a:rPr lang="es-ES" b="1" dirty="0"/>
+              <a:t> Aplicaciones bancarias</a:t>
+            </a:r>
+            <a:r>
+              <a:rPr lang="es-ES" dirty="0"/>
+              <a:t>: Representar clientes con tipos de cuentas comunes.</a:t>
+            </a:r>
+          </a:p>
+          <a:p>
+            <a:pPr>
+              <a:buFont typeface="Arial" panose="020B0604020202020204" pitchFamily="34" charset="0"/>
+              <a:buChar char="•"/>
+            </a:pPr>
+            <a:r>
+              <a:rPr lang="es-ES" b="1" dirty="0"/>
+              <a:t> Renderizado de interfaces</a:t>
+            </a:r>
+            <a:r>
+              <a:rPr lang="es-ES" dirty="0"/>
+              <a:t>: Compartir elementos gráficos en UI.</a:t>
+            </a:r>
+          </a:p>
+        </p:txBody>
+      </p:sp>
+      <p:pic>
+        <p:nvPicPr>
+          <p:cNvPr id="6" name="Imagen 5">
+            <a:extLst>
+              <a:ext uri="{FF2B5EF4-FFF2-40B4-BE49-F238E27FC236}">
+                <a16:creationId xmlns:a16="http://schemas.microsoft.com/office/drawing/2014/main" id="{B726069C-0BEC-43AF-82DA-D7908E6FC6CA}"/>
+              </a:ext>
+            </a:extLst>
+          </p:cNvPr>
+          <p:cNvPicPr>
+            <a:picLocks noChangeAspect="1"/>
+          </p:cNvPicPr>
+          <p:nvPr/>
+        </p:nvPicPr>
+        <p:blipFill>
+          <a:blip r:embed="rId2"/>
+          <a:stretch>
+            <a:fillRect/>
+          </a:stretch>
+        </p:blipFill>
+        <p:spPr>
+          <a:xfrm>
+            <a:off x="4668253" y="4180711"/>
+            <a:ext cx="7073362" cy="2016563"/>
+          </a:xfrm>
+          <a:prstGeom prst="rect">
+            <a:avLst/>
+          </a:prstGeom>
+        </p:spPr>
+      </p:pic>
+      <p:sp>
+        <p:nvSpPr>
+          <p:cNvPr id="7" name="CuadroTexto 6">
+            <a:extLst>
+              <a:ext uri="{FF2B5EF4-FFF2-40B4-BE49-F238E27FC236}">
+                <a16:creationId xmlns:a16="http://schemas.microsoft.com/office/drawing/2014/main" id="{3C87D1ED-4C86-4ADD-A78A-3EAC68483665}"/>
+              </a:ext>
+            </a:extLst>
+          </p:cNvPr>
+          <p:cNvSpPr txBox="1"/>
+          <p:nvPr/>
+        </p:nvSpPr>
+        <p:spPr>
+          <a:xfrm>
+            <a:off x="2406316" y="5004326"/>
+            <a:ext cx="1672253" cy="369332"/>
+          </a:xfrm>
+          <a:prstGeom prst="rect">
+            <a:avLst/>
+          </a:prstGeom>
+          <a:noFill/>
+        </p:spPr>
+        <p:txBody>
+          <a:bodyPr wrap="none" rtlCol="0">
+            <a:spAutoFit/>
+          </a:bodyPr>
+          <a:lstStyle/>
+          <a:p>
+            <a:r>
+              <a:rPr lang="es-ES" b="1" dirty="0"/>
+              <a:t>Cuándo se usa: </a:t>
+            </a:r>
+            <a:endParaRPr lang="es-419" b="1" dirty="0"/>
+          </a:p>
+        </p:txBody>
+      </p:sp>
+    </p:spTree>
+    <p:extLst>
+      <p:ext uri="{BB962C8B-B14F-4D97-AF65-F5344CB8AC3E}">
+        <p14:creationId xmlns:p14="http://schemas.microsoft.com/office/powerpoint/2010/main" val="2934238383"/>
+      </p:ext>
+    </p:extLst>
+  </p:cSld>
+  <p:clrMapOvr>
+    <a:masterClrMapping/>
+  </p:clrMapOvr>
+</p:sld>
+</file>
+
+<file path=ppt/slides/slide43.xml><?xml version="1.0" encoding="utf-8"?>
+<p:sld xmlns:a="http://schemas.openxmlformats.org/drawingml/2006/main" xmlns:r="http://schemas.openxmlformats.org/officeDocument/2006/relationships" xmlns:p="http://schemas.openxmlformats.org/presentationml/2006/main">
+  <p:cSld>
+    <p:spTree>
+      <p:nvGrpSpPr>
+        <p:cNvPr id="1" name=""/>
+        <p:cNvGrpSpPr/>
+        <p:nvPr/>
+      </p:nvGrpSpPr>
+      <p:grpSpPr>
+        <a:xfrm>
+          <a:off x="0" y="0"/>
+          <a:ext cx="0" cy="0"/>
+          <a:chOff x="0" y="0"/>
+          <a:chExt cx="0" cy="0"/>
+        </a:xfrm>
+      </p:grpSpPr>
+      <p:sp>
+        <p:nvSpPr>
+          <p:cNvPr id="2" name="CuadroTexto 1">
+            <a:extLst>
+              <a:ext uri="{FF2B5EF4-FFF2-40B4-BE49-F238E27FC236}">
+                <a16:creationId xmlns:a16="http://schemas.microsoft.com/office/drawing/2014/main" id="{2A8C042C-C441-481E-8A0C-ABC4893538E8}"/>
+              </a:ext>
+            </a:extLst>
+          </p:cNvPr>
+          <p:cNvSpPr txBox="1"/>
+          <p:nvPr/>
+        </p:nvSpPr>
+        <p:spPr>
+          <a:xfrm>
+            <a:off x="867578" y="454010"/>
+            <a:ext cx="7185752" cy="646331"/>
+          </a:xfrm>
+          <a:prstGeom prst="rect">
+            <a:avLst/>
+          </a:prstGeom>
+          <a:noFill/>
+        </p:spPr>
+        <p:txBody>
+          <a:bodyPr wrap="square" rtlCol="0">
+            <a:spAutoFit/>
+          </a:bodyPr>
+          <a:lstStyle>
+            <a:defPPr>
+              <a:defRPr lang="es-419"/>
+            </a:defPPr>
+            <a:lvl1pPr>
+              <a:defRPr sz="3600"/>
+            </a:lvl1pPr>
+          </a:lstStyle>
+          <a:p>
+            <a:r>
+              <a:rPr lang="es-ES" dirty="0"/>
+              <a:t>Finalmente</a:t>
+            </a:r>
+          </a:p>
+        </p:txBody>
+      </p:sp>
+      <p:sp>
+        <p:nvSpPr>
+          <p:cNvPr id="4" name="CuadroTexto 3">
+            <a:extLst>
+              <a:ext uri="{FF2B5EF4-FFF2-40B4-BE49-F238E27FC236}">
+                <a16:creationId xmlns:a16="http://schemas.microsoft.com/office/drawing/2014/main" id="{AE0575CC-8ED6-44F9-9767-FFB89FEF4699}"/>
+              </a:ext>
+            </a:extLst>
+          </p:cNvPr>
+          <p:cNvSpPr txBox="1"/>
+          <p:nvPr/>
+        </p:nvSpPr>
+        <p:spPr>
+          <a:xfrm>
+            <a:off x="1254291" y="3446962"/>
+            <a:ext cx="4677277" cy="2308324"/>
+          </a:xfrm>
+          <a:prstGeom prst="rect">
+            <a:avLst/>
+          </a:prstGeom>
+          <a:noFill/>
+        </p:spPr>
+        <p:txBody>
+          <a:bodyPr wrap="square">
+            <a:spAutoFit/>
+          </a:bodyPr>
+          <a:lstStyle/>
+          <a:p>
+            <a:r>
+              <a:rPr lang="es-419" dirty="0"/>
+              <a:t>✅ </a:t>
+            </a:r>
+            <a:r>
+              <a:rPr lang="es-419" b="1" dirty="0"/>
+              <a:t>Ventajas (Pros)</a:t>
+            </a:r>
+          </a:p>
+          <a:p>
+            <a:endParaRPr lang="es-419" b="1" dirty="0"/>
+          </a:p>
+          <a:p>
+            <a:pPr marL="285750" indent="-285750">
+              <a:buFont typeface="Arial" panose="020B0604020202020204" pitchFamily="34" charset="0"/>
+              <a:buChar char="•"/>
+            </a:pPr>
+            <a:r>
+              <a:rPr lang="es-419" dirty="0"/>
+              <a:t>Ahorro de Memoria</a:t>
+            </a:r>
+            <a:endParaRPr lang="es-419" b="1" dirty="0"/>
+          </a:p>
+          <a:p>
+            <a:pPr marL="285750" indent="-285750">
+              <a:buFont typeface="Arial" panose="020B0604020202020204" pitchFamily="34" charset="0"/>
+              <a:buChar char="•"/>
+            </a:pPr>
+            <a:r>
+              <a:rPr lang="es-419" dirty="0"/>
+              <a:t>Mejora el Rendimiento, menos objetos creados</a:t>
+            </a:r>
+          </a:p>
+          <a:p>
+            <a:pPr marL="285750" indent="-285750">
+              <a:buFont typeface="Arial" panose="020B0604020202020204" pitchFamily="34" charset="0"/>
+              <a:buChar char="•"/>
+            </a:pPr>
+            <a:r>
+              <a:rPr lang="es-419" dirty="0"/>
+              <a:t>Centralización de Datos Comunes</a:t>
+            </a:r>
+          </a:p>
+          <a:p>
+            <a:pPr marL="285750" indent="-285750">
+              <a:buFont typeface="Arial" panose="020B0604020202020204" pitchFamily="34" charset="0"/>
+              <a:buChar char="•"/>
+            </a:pPr>
+            <a:r>
+              <a:rPr lang="es-419" dirty="0"/>
+              <a:t>Escalabilidad Mejorada, representación gráfica masiva</a:t>
+            </a:r>
+          </a:p>
+        </p:txBody>
+      </p:sp>
+      <p:sp>
+        <p:nvSpPr>
+          <p:cNvPr id="6" name="CuadroTexto 5">
+            <a:extLst>
+              <a:ext uri="{FF2B5EF4-FFF2-40B4-BE49-F238E27FC236}">
+                <a16:creationId xmlns:a16="http://schemas.microsoft.com/office/drawing/2014/main" id="{5CD94E0F-279E-4D80-8D55-CB679339455D}"/>
+              </a:ext>
+            </a:extLst>
+          </p:cNvPr>
+          <p:cNvSpPr txBox="1"/>
+          <p:nvPr/>
+        </p:nvSpPr>
+        <p:spPr>
+          <a:xfrm>
+            <a:off x="6340641" y="3429000"/>
+            <a:ext cx="4812631" cy="2308324"/>
+          </a:xfrm>
+          <a:prstGeom prst="rect">
+            <a:avLst/>
+          </a:prstGeom>
+          <a:noFill/>
+        </p:spPr>
+        <p:txBody>
+          <a:bodyPr wrap="square">
+            <a:spAutoFit/>
+          </a:bodyPr>
+          <a:lstStyle/>
+          <a:p>
+            <a:r>
+              <a:rPr lang="es-419" dirty="0"/>
+              <a:t>❌ </a:t>
+            </a:r>
+            <a:r>
+              <a:rPr lang="es-419" b="1" dirty="0"/>
+              <a:t>Desventajas (Contras) </a:t>
+            </a:r>
+          </a:p>
+          <a:p>
+            <a:pPr marL="285750" indent="-285750">
+              <a:buFont typeface="Arial" panose="020B0604020202020204" pitchFamily="34" charset="0"/>
+              <a:buChar char="•"/>
+            </a:pPr>
+            <a:endParaRPr lang="es-419" dirty="0"/>
+          </a:p>
+          <a:p>
+            <a:pPr marL="285750" indent="-285750">
+              <a:buFont typeface="Arial" panose="020B0604020202020204" pitchFamily="34" charset="0"/>
+              <a:buChar char="•"/>
+            </a:pPr>
+            <a:r>
+              <a:rPr lang="es-419" dirty="0"/>
+              <a:t>Mayor Complejidad para implementar y mantener</a:t>
+            </a:r>
+          </a:p>
+          <a:p>
+            <a:pPr marL="285750" indent="-285750">
+              <a:buFont typeface="Arial" panose="020B0604020202020204" pitchFamily="34" charset="0"/>
+              <a:buChar char="•"/>
+            </a:pPr>
+            <a:r>
+              <a:rPr lang="es-419" dirty="0"/>
+              <a:t>Mayor costo de búsqueda en el elemento que maneje la caché</a:t>
+            </a:r>
+          </a:p>
+          <a:p>
+            <a:pPr marL="285750" indent="-285750">
+              <a:buFont typeface="Arial" panose="020B0604020202020204" pitchFamily="34" charset="0"/>
+              <a:buChar char="•"/>
+            </a:pPr>
+            <a:r>
+              <a:rPr lang="es-419" dirty="0"/>
+              <a:t>Dificultad con Datos Mutables</a:t>
+            </a:r>
+          </a:p>
+          <a:p>
+            <a:pPr marL="285750" indent="-285750">
+              <a:buFont typeface="Arial" panose="020B0604020202020204" pitchFamily="34" charset="0"/>
+              <a:buChar char="•"/>
+            </a:pPr>
+            <a:r>
+              <a:rPr lang="es-419" dirty="0"/>
+              <a:t>Ahorro puede ser no significativo</a:t>
+            </a:r>
+          </a:p>
+        </p:txBody>
+      </p:sp>
+      <p:sp>
+        <p:nvSpPr>
+          <p:cNvPr id="7" name="CuadroTexto 6">
+            <a:extLst>
+              <a:ext uri="{FF2B5EF4-FFF2-40B4-BE49-F238E27FC236}">
+                <a16:creationId xmlns:a16="http://schemas.microsoft.com/office/drawing/2014/main" id="{886BBC8A-E85E-4DC6-85B9-9870E07527AB}"/>
+              </a:ext>
+            </a:extLst>
+          </p:cNvPr>
+          <p:cNvSpPr txBox="1"/>
+          <p:nvPr/>
+        </p:nvSpPr>
+        <p:spPr>
+          <a:xfrm>
+            <a:off x="1254291" y="1523819"/>
+            <a:ext cx="6093994" cy="1200329"/>
+          </a:xfrm>
+          <a:prstGeom prst="rect">
+            <a:avLst/>
+          </a:prstGeom>
+          <a:noFill/>
+        </p:spPr>
+        <p:txBody>
+          <a:bodyPr wrap="square">
+            <a:spAutoFit/>
+          </a:bodyPr>
+          <a:lstStyle/>
+          <a:p>
+            <a:r>
+              <a:rPr lang="es-ES" dirty="0"/>
+              <a:t>Usado en: </a:t>
+            </a:r>
+          </a:p>
+          <a:p>
+            <a:pPr marL="285750" indent="-285750">
+              <a:buFont typeface="Arial" panose="020B0604020202020204" pitchFamily="34" charset="0"/>
+              <a:buChar char="•"/>
+            </a:pPr>
+            <a:r>
+              <a:rPr lang="es-ES" dirty="0"/>
+              <a:t>Videojuegos: Renderizado de Objetos y Personajes</a:t>
+            </a:r>
+          </a:p>
+          <a:p>
+            <a:pPr marL="285750" indent="-285750">
+              <a:buFont typeface="Arial" panose="020B0604020202020204" pitchFamily="34" charset="0"/>
+              <a:buChar char="•"/>
+            </a:pPr>
+            <a:r>
+              <a:rPr lang="es-ES" dirty="0"/>
+              <a:t>Mapas y Sistemas de Navegación</a:t>
+            </a:r>
+          </a:p>
+          <a:p>
+            <a:pPr marL="285750" indent="-285750">
+              <a:buFont typeface="Arial" panose="020B0604020202020204" pitchFamily="34" charset="0"/>
+              <a:buChar char="•"/>
+            </a:pPr>
+            <a:r>
+              <a:rPr lang="es-ES" dirty="0"/>
+              <a:t>UI (Interfaz de Usuario)</a:t>
+            </a:r>
+          </a:p>
+        </p:txBody>
+      </p:sp>
+    </p:spTree>
+    <p:extLst>
+      <p:ext uri="{BB962C8B-B14F-4D97-AF65-F5344CB8AC3E}">
+        <p14:creationId xmlns:p14="http://schemas.microsoft.com/office/powerpoint/2010/main" val="3819471036"/>
+      </p:ext>
+    </p:extLst>
+  </p:cSld>
+  <p:clrMapOvr>
+    <a:masterClrMapping/>
+  </p:clrMapOvr>
+</p:sld>
+</file>
+
+<file path=ppt/slides/slide44.xml><?xml version="1.0" encoding="utf-8"?>
+<p:sld xmlns:a="http://schemas.openxmlformats.org/drawingml/2006/main" xmlns:r="http://schemas.openxmlformats.org/officeDocument/2006/relationships" xmlns:p="http://schemas.openxmlformats.org/presentationml/2006/main">
+  <p:cSld>
+    <p:spTree>
+      <p:nvGrpSpPr>
+        <p:cNvPr id="1" name=""/>
+        <p:cNvGrpSpPr/>
+        <p:nvPr/>
+      </p:nvGrpSpPr>
+      <p:grpSpPr>
+        <a:xfrm>
+          <a:off x="0" y="0"/>
+          <a:ext cx="0" cy="0"/>
+          <a:chOff x="0" y="0"/>
+          <a:chExt cx="0" cy="0"/>
+        </a:xfrm>
+      </p:grpSpPr>
+      <p:sp>
+        <p:nvSpPr>
+          <p:cNvPr id="2" name="CuadroTexto 1">
+            <a:extLst>
+              <a:ext uri="{FF2B5EF4-FFF2-40B4-BE49-F238E27FC236}">
+                <a16:creationId xmlns:a16="http://schemas.microsoft.com/office/drawing/2014/main" id="{4D534EAD-BB09-4CD8-B3F7-3FAF6ABF03B2}"/>
+              </a:ext>
+            </a:extLst>
+          </p:cNvPr>
+          <p:cNvSpPr txBox="1"/>
+          <p:nvPr/>
+        </p:nvSpPr>
+        <p:spPr>
+          <a:xfrm>
+            <a:off x="974721" y="611653"/>
+            <a:ext cx="5778619" cy="646331"/>
+          </a:xfrm>
+          <a:prstGeom prst="rect">
+            <a:avLst/>
+          </a:prstGeom>
+          <a:noFill/>
+        </p:spPr>
+        <p:txBody>
+          <a:bodyPr wrap="square" rtlCol="0">
+            <a:spAutoFit/>
+          </a:bodyPr>
+          <a:lstStyle/>
+          <a:p>
+            <a:r>
+              <a:rPr lang="es-ES" sz="3600" dirty="0"/>
+              <a:t>Patrón Proxy</a:t>
+            </a:r>
+            <a:endParaRPr lang="es-419" sz="3600" dirty="0"/>
+          </a:p>
+        </p:txBody>
+      </p:sp>
+      <p:sp>
+        <p:nvSpPr>
+          <p:cNvPr id="4" name="CuadroTexto 3">
+            <a:extLst>
+              <a:ext uri="{FF2B5EF4-FFF2-40B4-BE49-F238E27FC236}">
+                <a16:creationId xmlns:a16="http://schemas.microsoft.com/office/drawing/2014/main" id="{8F87BCF9-E728-44B0-9FA7-B98C79D8E652}"/>
+              </a:ext>
+            </a:extLst>
+          </p:cNvPr>
+          <p:cNvSpPr txBox="1"/>
+          <p:nvPr/>
+        </p:nvSpPr>
+        <p:spPr>
+          <a:xfrm>
+            <a:off x="6096000" y="2274838"/>
+            <a:ext cx="5778618" cy="2308324"/>
+          </a:xfrm>
+          <a:prstGeom prst="rect">
+            <a:avLst/>
+          </a:prstGeom>
+          <a:noFill/>
+        </p:spPr>
+        <p:txBody>
+          <a:bodyPr wrap="square">
+            <a:spAutoFit/>
+          </a:bodyPr>
+          <a:lstStyle/>
+          <a:p>
+            <a:r>
+              <a:rPr lang="es-ES" dirty="0"/>
+              <a:t>El patrón Proxy es un patrón estructural que se usa para controlar el acceso, añadir seguridad, optimizar rendimiento o diferir la creación de objetos costosos. </a:t>
+            </a:r>
+          </a:p>
+          <a:p>
+            <a:endParaRPr lang="es-ES" dirty="0"/>
+          </a:p>
+          <a:p>
+            <a:r>
+              <a:rPr lang="es-ES" dirty="0"/>
+              <a:t>Es una clase que funciona como una interfaz para otra cosa. Podría interactuar con cualquier cosa: una conexión de red, un objeto grande en la memoria, un archivo o algún otro recurso que sea costoso o imposible de duplicar</a:t>
+            </a:r>
+            <a:endParaRPr lang="es-419" dirty="0"/>
+          </a:p>
+        </p:txBody>
+      </p:sp>
+      <p:pic>
+        <p:nvPicPr>
+          <p:cNvPr id="7" name="Imagen 6">
+            <a:extLst>
+              <a:ext uri="{FF2B5EF4-FFF2-40B4-BE49-F238E27FC236}">
+                <a16:creationId xmlns:a16="http://schemas.microsoft.com/office/drawing/2014/main" id="{8203720F-8DDE-4111-9507-EC5D99BFD7BB}"/>
+              </a:ext>
+            </a:extLst>
+          </p:cNvPr>
+          <p:cNvPicPr>
+            <a:picLocks noChangeAspect="1"/>
+          </p:cNvPicPr>
+          <p:nvPr/>
+        </p:nvPicPr>
+        <p:blipFill>
+          <a:blip r:embed="rId2"/>
+          <a:stretch>
+            <a:fillRect/>
+          </a:stretch>
+        </p:blipFill>
+        <p:spPr>
+          <a:xfrm>
+            <a:off x="974721" y="1897528"/>
+            <a:ext cx="4234416" cy="2467008"/>
+          </a:xfrm>
+          <a:prstGeom prst="rect">
+            <a:avLst/>
+          </a:prstGeom>
+        </p:spPr>
+      </p:pic>
+      <p:sp>
+        <p:nvSpPr>
+          <p:cNvPr id="8" name="CuadroTexto 7">
+            <a:extLst>
+              <a:ext uri="{FF2B5EF4-FFF2-40B4-BE49-F238E27FC236}">
+                <a16:creationId xmlns:a16="http://schemas.microsoft.com/office/drawing/2014/main" id="{45E39EAD-4843-4885-A51F-CADA29293D24}"/>
+              </a:ext>
+            </a:extLst>
+          </p:cNvPr>
+          <p:cNvSpPr txBox="1"/>
+          <p:nvPr/>
+        </p:nvSpPr>
+        <p:spPr>
+          <a:xfrm>
+            <a:off x="882327" y="4477607"/>
+            <a:ext cx="4912895" cy="954107"/>
+          </a:xfrm>
+          <a:prstGeom prst="rect">
+            <a:avLst/>
+          </a:prstGeom>
+          <a:noFill/>
+        </p:spPr>
+        <p:txBody>
+          <a:bodyPr wrap="square" rtlCol="0">
+            <a:spAutoFit/>
+          </a:bodyPr>
+          <a:lstStyle/>
+          <a:p>
+            <a:r>
+              <a:rPr lang="es-ES" sz="1400" i="1" dirty="0">
+                <a:solidFill>
+                  <a:schemeClr val="accent3">
+                    <a:lumMod val="75000"/>
+                  </a:schemeClr>
+                </a:solidFill>
+              </a:rPr>
+              <a:t>Un conductor necesita cargar artículos desde una bodega. Normalmente, un intermediario con acceso controlado a la bodega es quién trae los artículos hasta el camión para ser cargados</a:t>
+            </a:r>
+            <a:endParaRPr lang="es-419" sz="1400" i="1" dirty="0">
+              <a:solidFill>
+                <a:schemeClr val="accent3">
+                  <a:lumMod val="75000"/>
+                </a:schemeClr>
+              </a:solidFill>
+            </a:endParaRPr>
+          </a:p>
+        </p:txBody>
+      </p:sp>
+    </p:spTree>
+    <p:extLst>
+      <p:ext uri="{BB962C8B-B14F-4D97-AF65-F5344CB8AC3E}">
+        <p14:creationId xmlns:p14="http://schemas.microsoft.com/office/powerpoint/2010/main" val="2651642034"/>
+      </p:ext>
+    </p:extLst>
+  </p:cSld>
+  <p:clrMapOvr>
+    <a:masterClrMapping/>
+  </p:clrMapOvr>
+</p:sld>
+</file>
+
+<file path=ppt/slides/slide45.xml><?xml version="1.0" encoding="utf-8"?>
+<p:sld xmlns:a="http://schemas.openxmlformats.org/drawingml/2006/main" xmlns:r="http://schemas.openxmlformats.org/officeDocument/2006/relationships" xmlns:p="http://schemas.openxmlformats.org/presentationml/2006/main">
+  <p:cSld>
+    <p:spTree>
+      <p:nvGrpSpPr>
+        <p:cNvPr id="1" name=""/>
+        <p:cNvGrpSpPr/>
+        <p:nvPr/>
+      </p:nvGrpSpPr>
+      <p:grpSpPr>
+        <a:xfrm>
+          <a:off x="0" y="0"/>
+          <a:ext cx="0" cy="0"/>
+          <a:chOff x="0" y="0"/>
+          <a:chExt cx="0" cy="0"/>
+        </a:xfrm>
+      </p:grpSpPr>
+      <p:sp>
+        <p:nvSpPr>
+          <p:cNvPr id="3" name="CuadroTexto 2">
+            <a:extLst>
+              <a:ext uri="{FF2B5EF4-FFF2-40B4-BE49-F238E27FC236}">
+                <a16:creationId xmlns:a16="http://schemas.microsoft.com/office/drawing/2014/main" id="{0F5155A0-3030-49FE-9F98-ECA7B5556CEE}"/>
+              </a:ext>
+            </a:extLst>
+          </p:cNvPr>
+          <p:cNvSpPr txBox="1"/>
+          <p:nvPr/>
+        </p:nvSpPr>
+        <p:spPr>
+          <a:xfrm>
+            <a:off x="977565" y="2594083"/>
+            <a:ext cx="4568992" cy="2031325"/>
+          </a:xfrm>
+          <a:prstGeom prst="rect">
+            <a:avLst/>
+          </a:prstGeom>
+          <a:noFill/>
+        </p:spPr>
+        <p:txBody>
+          <a:bodyPr wrap="square">
+            <a:spAutoFit/>
+          </a:bodyPr>
+          <a:lstStyle/>
+          <a:p>
+            <a:r>
+              <a:rPr lang="es-ES" b="1" dirty="0"/>
+              <a:t>Ejemplo: Servicios en la Nube como Google Drive o Dropbox</a:t>
+            </a:r>
+            <a:endParaRPr lang="es-ES" dirty="0"/>
+          </a:p>
+          <a:p>
+            <a:endParaRPr lang="es-ES" dirty="0"/>
+          </a:p>
+          <a:p>
+            <a:pPr marL="285750" indent="-285750">
+              <a:buFont typeface="Arial" panose="020B0604020202020204" pitchFamily="34" charset="0"/>
+              <a:buChar char="•"/>
+            </a:pPr>
+            <a:r>
+              <a:rPr lang="es-ES" dirty="0"/>
+              <a:t>El usuario no accede directamente a los archivos remotos.</a:t>
+            </a:r>
+          </a:p>
+          <a:p>
+            <a:pPr marL="285750" indent="-285750">
+              <a:buFont typeface="Arial" panose="020B0604020202020204" pitchFamily="34" charset="0"/>
+              <a:buChar char="•"/>
+            </a:pPr>
+            <a:r>
+              <a:rPr lang="es-ES" dirty="0"/>
+              <a:t>Un </a:t>
+            </a:r>
+            <a:r>
+              <a:rPr lang="es-ES" b="1" dirty="0"/>
+              <a:t>proxy remoto</a:t>
+            </a:r>
+            <a:r>
+              <a:rPr lang="es-ES" dirty="0"/>
+              <a:t> maneja la comunicación entre el usuario y los servidores en la nube.</a:t>
+            </a:r>
+          </a:p>
+        </p:txBody>
+      </p:sp>
+      <p:pic>
+        <p:nvPicPr>
+          <p:cNvPr id="4" name="Imagen 3">
+            <a:extLst>
+              <a:ext uri="{FF2B5EF4-FFF2-40B4-BE49-F238E27FC236}">
+                <a16:creationId xmlns:a16="http://schemas.microsoft.com/office/drawing/2014/main" id="{D736236F-3770-4969-BFA5-3FD8B954BAFF}"/>
+              </a:ext>
+            </a:extLst>
+          </p:cNvPr>
+          <p:cNvPicPr>
+            <a:picLocks noChangeAspect="1"/>
+          </p:cNvPicPr>
+          <p:nvPr/>
+        </p:nvPicPr>
+        <p:blipFill>
+          <a:blip r:embed="rId2"/>
+          <a:stretch>
+            <a:fillRect/>
+          </a:stretch>
+        </p:blipFill>
+        <p:spPr>
+          <a:xfrm>
+            <a:off x="6385307" y="1492190"/>
+            <a:ext cx="3873619" cy="3873619"/>
+          </a:xfrm>
+          <a:prstGeom prst="rect">
+            <a:avLst/>
+          </a:prstGeom>
+        </p:spPr>
+      </p:pic>
+      <p:sp>
+        <p:nvSpPr>
+          <p:cNvPr id="5" name="CuadroTexto 4">
+            <a:extLst>
+              <a:ext uri="{FF2B5EF4-FFF2-40B4-BE49-F238E27FC236}">
+                <a16:creationId xmlns:a16="http://schemas.microsoft.com/office/drawing/2014/main" id="{50E92D40-0121-4796-A234-3D10E9BC3D9E}"/>
+              </a:ext>
+            </a:extLst>
+          </p:cNvPr>
+          <p:cNvSpPr txBox="1"/>
+          <p:nvPr/>
+        </p:nvSpPr>
+        <p:spPr>
+          <a:xfrm>
+            <a:off x="974721" y="611653"/>
+            <a:ext cx="5778619" cy="646331"/>
+          </a:xfrm>
+          <a:prstGeom prst="rect">
+            <a:avLst/>
+          </a:prstGeom>
+          <a:noFill/>
+        </p:spPr>
+        <p:txBody>
+          <a:bodyPr wrap="square" rtlCol="0">
+            <a:spAutoFit/>
+          </a:bodyPr>
+          <a:lstStyle/>
+          <a:p>
+            <a:r>
+              <a:rPr lang="es-ES" sz="3600" dirty="0"/>
+              <a:t>Patrón Proxy</a:t>
+            </a:r>
+            <a:endParaRPr lang="es-419" sz="3600" dirty="0"/>
+          </a:p>
+        </p:txBody>
+      </p:sp>
+    </p:spTree>
+    <p:extLst>
+      <p:ext uri="{BB962C8B-B14F-4D97-AF65-F5344CB8AC3E}">
+        <p14:creationId xmlns:p14="http://schemas.microsoft.com/office/powerpoint/2010/main" val="3733510634"/>
+      </p:ext>
+    </p:extLst>
+  </p:cSld>
+  <p:clrMapOvr>
+    <a:masterClrMapping/>
+  </p:clrMapOvr>
+</p:sld>
+</file>
+
+<file path=ppt/slides/slide46.xml><?xml version="1.0" encoding="utf-8"?>
+<p:sld xmlns:a="http://schemas.openxmlformats.org/drawingml/2006/main" xmlns:r="http://schemas.openxmlformats.org/officeDocument/2006/relationships" xmlns:p="http://schemas.openxmlformats.org/presentationml/2006/main">
+  <p:cSld>
+    <p:spTree>
+      <p:nvGrpSpPr>
+        <p:cNvPr id="1" name=""/>
+        <p:cNvGrpSpPr/>
+        <p:nvPr/>
+      </p:nvGrpSpPr>
+      <p:grpSpPr>
+        <a:xfrm>
+          <a:off x="0" y="0"/>
+          <a:ext cx="0" cy="0"/>
+          <a:chOff x="0" y="0"/>
+          <a:chExt cx="0" cy="0"/>
+        </a:xfrm>
+      </p:grpSpPr>
+      <p:sp>
+        <p:nvSpPr>
+          <p:cNvPr id="3" name="CuadroTexto 2">
+            <a:extLst>
+              <a:ext uri="{FF2B5EF4-FFF2-40B4-BE49-F238E27FC236}">
+                <a16:creationId xmlns:a16="http://schemas.microsoft.com/office/drawing/2014/main" id="{61E43687-C1AC-4E2B-B5B5-F83FB5625D63}"/>
+              </a:ext>
+            </a:extLst>
+          </p:cNvPr>
+          <p:cNvSpPr txBox="1"/>
+          <p:nvPr/>
+        </p:nvSpPr>
+        <p:spPr>
+          <a:xfrm>
+            <a:off x="4646141" y="2019978"/>
+            <a:ext cx="6391531" cy="2862322"/>
+          </a:xfrm>
+          <a:prstGeom prst="rect">
+            <a:avLst/>
+          </a:prstGeom>
+          <a:noFill/>
+        </p:spPr>
+        <p:txBody>
+          <a:bodyPr wrap="square">
+            <a:spAutoFit/>
+          </a:bodyPr>
+          <a:lstStyle/>
+          <a:p>
+            <a:pPr marL="285750" indent="-285750">
+              <a:buFont typeface="Arial" panose="020B0604020202020204" pitchFamily="34" charset="0"/>
+              <a:buChar char="•"/>
+            </a:pPr>
+            <a:r>
+              <a:rPr lang="es-ES" b="1" dirty="0"/>
+              <a:t>Proxy de Protección (Security Proxy)</a:t>
+            </a:r>
+            <a:r>
+              <a:rPr lang="es-ES" dirty="0"/>
+              <a:t> – Controla el acceso según permisos.</a:t>
+            </a:r>
+          </a:p>
+          <a:p>
+            <a:pPr marL="285750" indent="-285750">
+              <a:buFont typeface="Arial" panose="020B0604020202020204" pitchFamily="34" charset="0"/>
+              <a:buChar char="•"/>
+            </a:pPr>
+            <a:r>
+              <a:rPr lang="es-ES" b="1" dirty="0"/>
+              <a:t>Proxy Virtual (Virtual Proxy)</a:t>
+            </a:r>
+            <a:r>
+              <a:rPr lang="es-ES" dirty="0"/>
+              <a:t> – Carga diferida de objetos pesados.</a:t>
+            </a:r>
+          </a:p>
+          <a:p>
+            <a:pPr marL="285750" indent="-285750">
+              <a:buFont typeface="Arial" panose="020B0604020202020204" pitchFamily="34" charset="0"/>
+              <a:buChar char="•"/>
+            </a:pPr>
+            <a:r>
+              <a:rPr lang="es-ES" b="1" dirty="0"/>
+              <a:t>Proxy Remoto (Remote Proxy)</a:t>
+            </a:r>
+            <a:r>
+              <a:rPr lang="es-ES" dirty="0"/>
+              <a:t> – Representa objetos en otra máquina o red.</a:t>
+            </a:r>
+          </a:p>
+          <a:p>
+            <a:pPr marL="285750" indent="-285750">
+              <a:buFont typeface="Arial" panose="020B0604020202020204" pitchFamily="34" charset="0"/>
+              <a:buChar char="•"/>
+            </a:pPr>
+            <a:r>
+              <a:rPr lang="es-ES" b="1" dirty="0"/>
+              <a:t>Proxy de Caché (Cache Proxy)</a:t>
+            </a:r>
+            <a:r>
+              <a:rPr lang="es-ES" dirty="0"/>
+              <a:t> – Almacena respuestas para mejorar rendimiento.</a:t>
+            </a:r>
+          </a:p>
+          <a:p>
+            <a:pPr marL="285750" indent="-285750">
+              <a:buFont typeface="Arial" panose="020B0604020202020204" pitchFamily="34" charset="0"/>
+              <a:buChar char="•"/>
+            </a:pPr>
+            <a:r>
+              <a:rPr lang="es-ES" b="1" dirty="0"/>
+              <a:t>Proxy de Registro (</a:t>
+            </a:r>
+            <a:r>
+              <a:rPr lang="es-ES" b="1" dirty="0" err="1"/>
+              <a:t>Logging</a:t>
+            </a:r>
+            <a:r>
+              <a:rPr lang="es-ES" b="1" dirty="0"/>
+              <a:t> Proxy)</a:t>
+            </a:r>
+            <a:r>
+              <a:rPr lang="es-ES" dirty="0"/>
+              <a:t> – Registra solicitudes para auditoría.</a:t>
+            </a:r>
+          </a:p>
+        </p:txBody>
+      </p:sp>
+      <p:sp>
+        <p:nvSpPr>
+          <p:cNvPr id="4" name="CuadroTexto 3">
+            <a:extLst>
+              <a:ext uri="{FF2B5EF4-FFF2-40B4-BE49-F238E27FC236}">
+                <a16:creationId xmlns:a16="http://schemas.microsoft.com/office/drawing/2014/main" id="{7E29F097-B40B-4325-B8B0-C31122A2076F}"/>
+              </a:ext>
+            </a:extLst>
+          </p:cNvPr>
+          <p:cNvSpPr txBox="1"/>
+          <p:nvPr/>
+        </p:nvSpPr>
+        <p:spPr>
+          <a:xfrm>
+            <a:off x="974721" y="611653"/>
+            <a:ext cx="5778619" cy="646331"/>
+          </a:xfrm>
+          <a:prstGeom prst="rect">
+            <a:avLst/>
+          </a:prstGeom>
+          <a:noFill/>
+        </p:spPr>
+        <p:txBody>
+          <a:bodyPr wrap="square" rtlCol="0">
+            <a:spAutoFit/>
+          </a:bodyPr>
+          <a:lstStyle/>
+          <a:p>
+            <a:r>
+              <a:rPr lang="es-419" sz="3600" dirty="0"/>
+              <a:t>Principales tipos de Proxy:</a:t>
+            </a:r>
+          </a:p>
+        </p:txBody>
+      </p:sp>
+      <p:pic>
+        <p:nvPicPr>
+          <p:cNvPr id="2050" name="Picture 2" descr="Qué es un intermediario de seguros ...">
+            <a:extLst>
+              <a:ext uri="{FF2B5EF4-FFF2-40B4-BE49-F238E27FC236}">
+                <a16:creationId xmlns:a16="http://schemas.microsoft.com/office/drawing/2014/main" id="{996A4354-8932-4A4D-8159-1030AA7F05C5}"/>
+              </a:ext>
+            </a:extLst>
+          </p:cNvPr>
+          <p:cNvPicPr>
+            <a:picLocks noChangeAspect="1" noChangeArrowheads="1"/>
+          </p:cNvPicPr>
+          <p:nvPr/>
+        </p:nvPicPr>
+        <p:blipFill>
+          <a:blip r:embed="rId2">
+            <a:extLst>
+              <a:ext uri="{28A0092B-C50C-407E-A947-70E740481C1C}">
+                <a14:useLocalDpi xmlns:a14="http://schemas.microsoft.com/office/drawing/2010/main" val="0"/>
+              </a:ext>
+            </a:extLst>
+          </a:blip>
+          <a:srcRect/>
+          <a:stretch>
+            <a:fillRect/>
+          </a:stretch>
+        </p:blipFill>
+        <p:spPr bwMode="auto">
+          <a:xfrm>
+            <a:off x="1359067" y="2556460"/>
+            <a:ext cx="2952750" cy="1552575"/>
+          </a:xfrm>
+          <a:prstGeom prst="rect">
+            <a:avLst/>
+          </a:prstGeom>
+          <a:noFill/>
+          <a:extLst>
+            <a:ext uri="{909E8E84-426E-40DD-AFC4-6F175D3DCCD1}">
+              <a14:hiddenFill xmlns:a14="http://schemas.microsoft.com/office/drawing/2010/main">
+                <a:solidFill>
+                  <a:srgbClr val="FFFFFF"/>
+                </a:solidFill>
+              </a14:hiddenFill>
+            </a:ext>
+          </a:extLst>
+        </p:spPr>
+      </p:pic>
+    </p:spTree>
+    <p:extLst>
+      <p:ext uri="{BB962C8B-B14F-4D97-AF65-F5344CB8AC3E}">
+        <p14:creationId xmlns:p14="http://schemas.microsoft.com/office/powerpoint/2010/main" val="4096407198"/>
+      </p:ext>
+    </p:extLst>
+  </p:cSld>
+  <p:clrMapOvr>
+    <a:masterClrMapping/>
+  </p:clrMapOvr>
+</p:sld>
+</file>
+
+<file path=ppt/slides/slide47.xml><?xml version="1.0" encoding="utf-8"?>
+<p:sld xmlns:a="http://schemas.openxmlformats.org/drawingml/2006/main" xmlns:r="http://schemas.openxmlformats.org/officeDocument/2006/relationships" xmlns:p="http://schemas.openxmlformats.org/presentationml/2006/main">
+  <p:cSld>
+    <p:spTree>
+      <p:nvGrpSpPr>
+        <p:cNvPr id="1" name=""/>
+        <p:cNvGrpSpPr/>
+        <p:nvPr/>
+      </p:nvGrpSpPr>
+      <p:grpSpPr>
+        <a:xfrm>
+          <a:off x="0" y="0"/>
+          <a:ext cx="0" cy="0"/>
+          <a:chOff x="0" y="0"/>
+          <a:chExt cx="0" cy="0"/>
+        </a:xfrm>
+      </p:grpSpPr>
+      <p:pic>
+        <p:nvPicPr>
+          <p:cNvPr id="5" name="Imagen 4">
+            <a:extLst>
+              <a:ext uri="{FF2B5EF4-FFF2-40B4-BE49-F238E27FC236}">
+                <a16:creationId xmlns:a16="http://schemas.microsoft.com/office/drawing/2014/main" id="{565A7202-A9AE-46A6-9761-B2747CB125F0}"/>
+              </a:ext>
+            </a:extLst>
+          </p:cNvPr>
+          <p:cNvPicPr>
+            <a:picLocks noChangeAspect="1"/>
+          </p:cNvPicPr>
+          <p:nvPr/>
+        </p:nvPicPr>
+        <p:blipFill>
+          <a:blip r:embed="rId2"/>
+          <a:stretch>
+            <a:fillRect/>
+          </a:stretch>
+        </p:blipFill>
+        <p:spPr>
+          <a:xfrm>
+            <a:off x="3009566" y="1708267"/>
+            <a:ext cx="5616833" cy="3068270"/>
+          </a:xfrm>
+          <a:prstGeom prst="rect">
+            <a:avLst/>
+          </a:prstGeom>
+        </p:spPr>
+      </p:pic>
+      <p:pic>
+        <p:nvPicPr>
+          <p:cNvPr id="6" name="Imagen 5">
+            <a:extLst>
+              <a:ext uri="{FF2B5EF4-FFF2-40B4-BE49-F238E27FC236}">
+                <a16:creationId xmlns:a16="http://schemas.microsoft.com/office/drawing/2014/main" id="{96A12BA5-25DD-46D3-BA33-D317E152D0B6}"/>
+              </a:ext>
+            </a:extLst>
+          </p:cNvPr>
+          <p:cNvPicPr>
+            <a:picLocks noChangeAspect="1"/>
+          </p:cNvPicPr>
+          <p:nvPr/>
+        </p:nvPicPr>
+        <p:blipFill>
+          <a:blip r:embed="rId3"/>
+          <a:stretch>
+            <a:fillRect/>
+          </a:stretch>
+        </p:blipFill>
+        <p:spPr>
+          <a:xfrm>
+            <a:off x="8941784" y="4780986"/>
+            <a:ext cx="1184017" cy="894591"/>
+          </a:xfrm>
+          <a:prstGeom prst="rect">
+            <a:avLst/>
+          </a:prstGeom>
+        </p:spPr>
+      </p:pic>
+      <p:sp>
+        <p:nvSpPr>
+          <p:cNvPr id="7" name="CuadroTexto 6">
+            <a:extLst>
+              <a:ext uri="{FF2B5EF4-FFF2-40B4-BE49-F238E27FC236}">
+                <a16:creationId xmlns:a16="http://schemas.microsoft.com/office/drawing/2014/main" id="{DD1CE35E-8073-4218-9416-95EDC5AAD44C}"/>
+              </a:ext>
+            </a:extLst>
+          </p:cNvPr>
+          <p:cNvSpPr txBox="1"/>
+          <p:nvPr/>
+        </p:nvSpPr>
+        <p:spPr>
+          <a:xfrm>
+            <a:off x="8712440" y="5876015"/>
+            <a:ext cx="1722138" cy="369332"/>
+          </a:xfrm>
+          <a:prstGeom prst="rect">
+            <a:avLst/>
+          </a:prstGeom>
+          <a:noFill/>
+        </p:spPr>
+        <p:txBody>
+          <a:bodyPr wrap="none" rtlCol="0">
+            <a:spAutoFit/>
+          </a:bodyPr>
+          <a:lstStyle/>
+          <a:p>
+            <a:r>
+              <a:rPr lang="es-ES" dirty="0"/>
+              <a:t>Implementemos</a:t>
+            </a:r>
+            <a:endParaRPr lang="es-419" dirty="0"/>
+          </a:p>
+        </p:txBody>
+      </p:sp>
+      <p:sp>
+        <p:nvSpPr>
+          <p:cNvPr id="8" name="CuadroTexto 7">
+            <a:extLst>
+              <a:ext uri="{FF2B5EF4-FFF2-40B4-BE49-F238E27FC236}">
+                <a16:creationId xmlns:a16="http://schemas.microsoft.com/office/drawing/2014/main" id="{B181CEED-A02B-4908-97C5-A99BEDFDCF2A}"/>
+              </a:ext>
+            </a:extLst>
+          </p:cNvPr>
+          <p:cNvSpPr txBox="1"/>
+          <p:nvPr/>
+        </p:nvSpPr>
+        <p:spPr>
+          <a:xfrm>
+            <a:off x="974721" y="611653"/>
+            <a:ext cx="5778619" cy="646331"/>
+          </a:xfrm>
+          <a:prstGeom prst="rect">
+            <a:avLst/>
+          </a:prstGeom>
+          <a:noFill/>
+        </p:spPr>
+        <p:txBody>
+          <a:bodyPr wrap="square" rtlCol="0">
+            <a:spAutoFit/>
+          </a:bodyPr>
+          <a:lstStyle/>
+          <a:p>
+            <a:r>
+              <a:rPr lang="es-ES" sz="3600" dirty="0"/>
+              <a:t>UML Proxy</a:t>
+            </a:r>
+            <a:endParaRPr lang="es-419" sz="3600" dirty="0"/>
+          </a:p>
+        </p:txBody>
+      </p:sp>
+    </p:spTree>
+    <p:extLst>
+      <p:ext uri="{BB962C8B-B14F-4D97-AF65-F5344CB8AC3E}">
+        <p14:creationId xmlns:p14="http://schemas.microsoft.com/office/powerpoint/2010/main" val="2163885232"/>
+      </p:ext>
+    </p:extLst>
+  </p:cSld>
+  <p:clrMapOvr>
+    <a:masterClrMapping/>
+  </p:clrMapOvr>
+</p:sld>
+</file>
+
+<file path=ppt/slides/slide48.xml><?xml version="1.0" encoding="utf-8"?>
+<p:sld xmlns:a="http://schemas.openxmlformats.org/drawingml/2006/main" xmlns:r="http://schemas.openxmlformats.org/officeDocument/2006/relationships" xmlns:p="http://schemas.openxmlformats.org/presentationml/2006/main">
+  <p:cSld>
+    <p:spTree>
+      <p:nvGrpSpPr>
+        <p:cNvPr id="1" name=""/>
+        <p:cNvGrpSpPr/>
+        <p:nvPr/>
+      </p:nvGrpSpPr>
+      <p:grpSpPr>
+        <a:xfrm>
+          <a:off x="0" y="0"/>
+          <a:ext cx="0" cy="0"/>
+          <a:chOff x="0" y="0"/>
+          <a:chExt cx="0" cy="0"/>
+        </a:xfrm>
+      </p:grpSpPr>
+      <p:sp>
+        <p:nvSpPr>
+          <p:cNvPr id="3" name="CuadroTexto 2">
+            <a:extLst>
+              <a:ext uri="{FF2B5EF4-FFF2-40B4-BE49-F238E27FC236}">
+                <a16:creationId xmlns:a16="http://schemas.microsoft.com/office/drawing/2014/main" id="{83A97330-DDB4-4E8F-B43A-77BDBACBE4D9}"/>
+              </a:ext>
+            </a:extLst>
+          </p:cNvPr>
+          <p:cNvSpPr txBox="1"/>
+          <p:nvPr/>
+        </p:nvSpPr>
+        <p:spPr>
+          <a:xfrm>
+            <a:off x="1254292" y="2413337"/>
+            <a:ext cx="4841708" cy="2862322"/>
+          </a:xfrm>
+          <a:prstGeom prst="rect">
+            <a:avLst/>
+          </a:prstGeom>
+          <a:noFill/>
+        </p:spPr>
+        <p:txBody>
+          <a:bodyPr wrap="square">
+            <a:spAutoFit/>
+          </a:bodyPr>
+          <a:lstStyle/>
+          <a:p>
+            <a:r>
+              <a:rPr lang="es-ES" b="1" dirty="0"/>
+              <a:t>Ventajas y Desventajas del Patrón Proxy</a:t>
+            </a:r>
+          </a:p>
+          <a:p>
+            <a:r>
+              <a:rPr lang="es-ES" dirty="0"/>
+              <a:t>✅ </a:t>
+            </a:r>
+            <a:r>
+              <a:rPr lang="es-ES" b="1" dirty="0"/>
+              <a:t>Ventajas</a:t>
+            </a:r>
+          </a:p>
+          <a:p>
+            <a:br>
+              <a:rPr lang="es-ES" dirty="0"/>
+            </a:br>
+            <a:r>
+              <a:rPr lang="es-ES" dirty="0"/>
+              <a:t>✔ </a:t>
+            </a:r>
+            <a:r>
+              <a:rPr lang="es-ES" b="1" dirty="0"/>
+              <a:t>Seguridad</a:t>
+            </a:r>
+            <a:r>
+              <a:rPr lang="es-ES" dirty="0"/>
+              <a:t>: Controla permisos de acceso.</a:t>
+            </a:r>
+            <a:br>
+              <a:rPr lang="es-ES" dirty="0"/>
+            </a:br>
+            <a:r>
+              <a:rPr lang="es-ES" dirty="0"/>
+              <a:t>✔ </a:t>
+            </a:r>
+            <a:r>
+              <a:rPr lang="es-ES" b="1" dirty="0"/>
+              <a:t>Optimización</a:t>
+            </a:r>
+            <a:r>
+              <a:rPr lang="es-ES" dirty="0"/>
+              <a:t>: Carga diferida de objetos pesados.</a:t>
+            </a:r>
+            <a:br>
+              <a:rPr lang="es-ES" dirty="0"/>
+            </a:br>
+            <a:r>
+              <a:rPr lang="es-ES" dirty="0"/>
+              <a:t>✔ </a:t>
+            </a:r>
+            <a:r>
+              <a:rPr lang="es-ES" b="1" dirty="0"/>
+              <a:t>Reducción de tráfico</a:t>
+            </a:r>
+            <a:r>
+              <a:rPr lang="es-ES" dirty="0"/>
+              <a:t>: Se pueden almacenar datos en caché.</a:t>
+            </a:r>
+            <a:br>
+              <a:rPr lang="es-ES" dirty="0"/>
+            </a:br>
+            <a:r>
+              <a:rPr lang="es-ES" dirty="0"/>
+              <a:t>✔ </a:t>
+            </a:r>
+            <a:r>
+              <a:rPr lang="es-ES" b="1" dirty="0"/>
+              <a:t>Modularidad</a:t>
+            </a:r>
+            <a:r>
+              <a:rPr lang="es-ES" dirty="0"/>
+              <a:t>: Separa lógica de acceso del objeto real.</a:t>
+            </a:r>
+          </a:p>
+        </p:txBody>
+      </p:sp>
+      <p:sp>
+        <p:nvSpPr>
+          <p:cNvPr id="5" name="CuadroTexto 4">
+            <a:extLst>
+              <a:ext uri="{FF2B5EF4-FFF2-40B4-BE49-F238E27FC236}">
+                <a16:creationId xmlns:a16="http://schemas.microsoft.com/office/drawing/2014/main" id="{6700F23A-4D7A-46EE-8C5A-03D7E4E43130}"/>
+              </a:ext>
+            </a:extLst>
+          </p:cNvPr>
+          <p:cNvSpPr txBox="1"/>
+          <p:nvPr/>
+        </p:nvSpPr>
+        <p:spPr>
+          <a:xfrm>
+            <a:off x="6307555" y="2413337"/>
+            <a:ext cx="4220077" cy="1477328"/>
+          </a:xfrm>
+          <a:prstGeom prst="rect">
+            <a:avLst/>
+          </a:prstGeom>
+          <a:noFill/>
+        </p:spPr>
+        <p:txBody>
+          <a:bodyPr wrap="square">
+            <a:spAutoFit/>
+          </a:bodyPr>
+          <a:lstStyle/>
+          <a:p>
+            <a:r>
+              <a:rPr lang="es-ES" dirty="0"/>
+              <a:t>❌ </a:t>
+            </a:r>
+            <a:r>
+              <a:rPr lang="es-ES" b="1" dirty="0"/>
+              <a:t>Desventajas</a:t>
+            </a:r>
+            <a:br>
+              <a:rPr lang="es-ES" dirty="0"/>
+            </a:br>
+            <a:r>
+              <a:rPr lang="es-ES" dirty="0"/>
+              <a:t>⚠ </a:t>
+            </a:r>
+            <a:r>
+              <a:rPr lang="es-ES" b="1" dirty="0"/>
+              <a:t>Mayor complejidad</a:t>
+            </a:r>
+            <a:r>
+              <a:rPr lang="es-ES" dirty="0"/>
+              <a:t>: Introduce clases adicionales.</a:t>
+            </a:r>
+            <a:br>
+              <a:rPr lang="es-ES" dirty="0"/>
+            </a:br>
+            <a:r>
+              <a:rPr lang="es-ES" dirty="0"/>
+              <a:t>⚠ </a:t>
+            </a:r>
+            <a:r>
+              <a:rPr lang="es-ES" b="1" dirty="0"/>
+              <a:t>Retraso en respuesta</a:t>
+            </a:r>
+            <a:r>
+              <a:rPr lang="es-ES" dirty="0"/>
+              <a:t>: Puede añadir latencia si no se implementa bien.</a:t>
+            </a:r>
+          </a:p>
+        </p:txBody>
+      </p:sp>
+      <p:sp>
+        <p:nvSpPr>
+          <p:cNvPr id="6" name="CuadroTexto 5">
+            <a:extLst>
+              <a:ext uri="{FF2B5EF4-FFF2-40B4-BE49-F238E27FC236}">
+                <a16:creationId xmlns:a16="http://schemas.microsoft.com/office/drawing/2014/main" id="{1D771DEB-C2C3-4516-B63C-61A5C68B3343}"/>
+              </a:ext>
+            </a:extLst>
+          </p:cNvPr>
+          <p:cNvSpPr txBox="1"/>
+          <p:nvPr/>
+        </p:nvSpPr>
+        <p:spPr>
+          <a:xfrm>
+            <a:off x="974721" y="611653"/>
+            <a:ext cx="5778619" cy="646331"/>
+          </a:xfrm>
+          <a:prstGeom prst="rect">
+            <a:avLst/>
+          </a:prstGeom>
+          <a:noFill/>
+        </p:spPr>
+        <p:txBody>
+          <a:bodyPr wrap="square" rtlCol="0">
+            <a:spAutoFit/>
+          </a:bodyPr>
+          <a:lstStyle/>
+          <a:p>
+            <a:r>
+              <a:rPr lang="es-419" sz="3600" dirty="0"/>
+              <a:t>Finalmente</a:t>
+            </a:r>
+          </a:p>
+        </p:txBody>
+      </p:sp>
+    </p:spTree>
+    <p:extLst>
+      <p:ext uri="{BB962C8B-B14F-4D97-AF65-F5344CB8AC3E}">
+        <p14:creationId xmlns:p14="http://schemas.microsoft.com/office/powerpoint/2010/main" val="1366297695"/>
+      </p:ext>
+    </p:extLst>
+  </p:cSld>
+  <p:clrMapOvr>
+    <a:masterClrMapping/>
+  </p:clrMapOvr>
+</p:sld>
+</file>
+
+<file path=ppt/slides/slide49.xml><?xml version="1.0" encoding="utf-8"?>
+<p:sld xmlns:a="http://schemas.openxmlformats.org/drawingml/2006/main" xmlns:r="http://schemas.openxmlformats.org/officeDocument/2006/relationships" xmlns:p="http://schemas.openxmlformats.org/presentationml/2006/main">
+  <p:cSld>
+    <p:spTree>
+      <p:nvGrpSpPr>
+        <p:cNvPr id="1" name=""/>
+        <p:cNvGrpSpPr/>
+        <p:nvPr/>
+      </p:nvGrpSpPr>
+      <p:grpSpPr>
+        <a:xfrm>
+          <a:off x="0" y="0"/>
+          <a:ext cx="0" cy="0"/>
+          <a:chOff x="0" y="0"/>
+          <a:chExt cx="0" cy="0"/>
+        </a:xfrm>
+      </p:grpSpPr>
+      <p:sp>
+        <p:nvSpPr>
           <p:cNvPr id="2" name="Título 1"/>
           <p:cNvSpPr>
             <a:spLocks noGrp="1"/>
@@ -16657,7 +20367,169 @@
 </p:sld>
 </file>
 
-<file path=ppt/slides/slide39.xml><?xml version="1.0" encoding="utf-8"?>
+<file path=ppt/slides/slide5.xml><?xml version="1.0" encoding="utf-8"?>
+<p:sld xmlns:a="http://schemas.openxmlformats.org/drawingml/2006/main" xmlns:r="http://schemas.openxmlformats.org/officeDocument/2006/relationships" xmlns:p="http://schemas.openxmlformats.org/presentationml/2006/main">
+  <p:cSld>
+    <p:spTree>
+      <p:nvGrpSpPr>
+        <p:cNvPr id="1" name=""/>
+        <p:cNvGrpSpPr/>
+        <p:nvPr/>
+      </p:nvGrpSpPr>
+      <p:grpSpPr>
+        <a:xfrm>
+          <a:off x="0" y="0"/>
+          <a:ext cx="0" cy="0"/>
+          <a:chOff x="0" y="0"/>
+          <a:chExt cx="0" cy="0"/>
+        </a:xfrm>
+      </p:grpSpPr>
+      <p:sp>
+        <p:nvSpPr>
+          <p:cNvPr id="4" name="CuadroTexto 3">
+            <a:extLst>
+              <a:ext uri="{FF2B5EF4-FFF2-40B4-BE49-F238E27FC236}">
+                <a16:creationId xmlns:a16="http://schemas.microsoft.com/office/drawing/2014/main" id="{9B382B03-E611-49E9-A7A5-B1D6FF135692}"/>
+              </a:ext>
+            </a:extLst>
+          </p:cNvPr>
+          <p:cNvSpPr txBox="1"/>
+          <p:nvPr/>
+        </p:nvSpPr>
+        <p:spPr>
+          <a:xfrm>
+            <a:off x="1033526" y="469231"/>
+            <a:ext cx="2964401" cy="646331"/>
+          </a:xfrm>
+          <a:prstGeom prst="rect">
+            <a:avLst/>
+          </a:prstGeom>
+          <a:noFill/>
+        </p:spPr>
+        <p:txBody>
+          <a:bodyPr wrap="none" rtlCol="0">
+            <a:spAutoFit/>
+          </a:bodyPr>
+          <a:lstStyle/>
+          <a:p>
+            <a:r>
+              <a:rPr lang="es-ES" sz="3600" dirty="0"/>
+              <a:t>Diagrama UML</a:t>
+            </a:r>
+            <a:endParaRPr lang="es-419" sz="3600" dirty="0"/>
+          </a:p>
+        </p:txBody>
+      </p:sp>
+      <p:pic>
+        <p:nvPicPr>
+          <p:cNvPr id="7" name="Imagen 6">
+            <a:extLst>
+              <a:ext uri="{FF2B5EF4-FFF2-40B4-BE49-F238E27FC236}">
+                <a16:creationId xmlns:a16="http://schemas.microsoft.com/office/drawing/2014/main" id="{75AA4496-DD70-4B2F-90E1-C96122774DE4}"/>
+              </a:ext>
+            </a:extLst>
+          </p:cNvPr>
+          <p:cNvPicPr>
+            <a:picLocks noChangeAspect="1"/>
+          </p:cNvPicPr>
+          <p:nvPr/>
+        </p:nvPicPr>
+        <p:blipFill>
+          <a:blip r:embed="rId2"/>
+          <a:stretch>
+            <a:fillRect/>
+          </a:stretch>
+        </p:blipFill>
+        <p:spPr>
+          <a:xfrm>
+            <a:off x="9670411" y="4301595"/>
+            <a:ext cx="1458275" cy="1101808"/>
+          </a:xfrm>
+          <a:prstGeom prst="rect">
+            <a:avLst/>
+          </a:prstGeom>
+        </p:spPr>
+      </p:pic>
+      <p:sp>
+        <p:nvSpPr>
+          <p:cNvPr id="8" name="CuadroTexto 7">
+            <a:extLst>
+              <a:ext uri="{FF2B5EF4-FFF2-40B4-BE49-F238E27FC236}">
+                <a16:creationId xmlns:a16="http://schemas.microsoft.com/office/drawing/2014/main" id="{2D3FE2CF-6422-49F4-AF26-E92C6300C53C}"/>
+              </a:ext>
+            </a:extLst>
+          </p:cNvPr>
+          <p:cNvSpPr txBox="1"/>
+          <p:nvPr/>
+        </p:nvSpPr>
+        <p:spPr>
+          <a:xfrm>
+            <a:off x="9670411" y="5651654"/>
+            <a:ext cx="1722138" cy="369332"/>
+          </a:xfrm>
+          <a:prstGeom prst="rect">
+            <a:avLst/>
+          </a:prstGeom>
+          <a:noFill/>
+        </p:spPr>
+        <p:txBody>
+          <a:bodyPr wrap="none" rtlCol="0">
+            <a:spAutoFit/>
+          </a:bodyPr>
+          <a:lstStyle/>
+          <a:p>
+            <a:r>
+              <a:rPr lang="es-ES" dirty="0"/>
+              <a:t>Implementemos</a:t>
+            </a:r>
+            <a:endParaRPr lang="es-419" dirty="0"/>
+          </a:p>
+        </p:txBody>
+      </p:sp>
+      <p:pic>
+        <p:nvPicPr>
+          <p:cNvPr id="10" name="Imagen 9">
+            <a:extLst>
+              <a:ext uri="{FF2B5EF4-FFF2-40B4-BE49-F238E27FC236}">
+                <a16:creationId xmlns:a16="http://schemas.microsoft.com/office/drawing/2014/main" id="{CC4FB159-D584-4D16-A44D-0AA1C693DE27}"/>
+              </a:ext>
+            </a:extLst>
+          </p:cNvPr>
+          <p:cNvPicPr>
+            <a:picLocks noChangeAspect="1"/>
+          </p:cNvPicPr>
+          <p:nvPr/>
+        </p:nvPicPr>
+        <p:blipFill>
+          <a:blip r:embed="rId3"/>
+          <a:stretch>
+            <a:fillRect/>
+          </a:stretch>
+        </p:blipFill>
+        <p:spPr>
+          <a:xfrm>
+            <a:off x="1156121" y="1973434"/>
+            <a:ext cx="7892540" cy="3429969"/>
+          </a:xfrm>
+          <a:prstGeom prst="rect">
+            <a:avLst/>
+          </a:prstGeom>
+        </p:spPr>
+      </p:pic>
+    </p:spTree>
+    <p:extLst>
+      <p:ext uri="{BB962C8B-B14F-4D97-AF65-F5344CB8AC3E}">
+        <p14:creationId xmlns:p14="http://schemas.microsoft.com/office/powerpoint/2010/main" val="2432000143"/>
+      </p:ext>
+    </p:extLst>
+  </p:cSld>
+  <p:clrMapOvr>
+    <a:masterClrMapping/>
+  </p:clrMapOvr>
+</p:sld>
+</file>
+
+<file path=ppt/slides/slide50.xml><?xml version="1.0" encoding="utf-8"?>
 <p:sld xmlns:a="http://schemas.openxmlformats.org/drawingml/2006/main" xmlns:r="http://schemas.openxmlformats.org/officeDocument/2006/relationships" xmlns:p="http://schemas.openxmlformats.org/presentationml/2006/main">
   <p:cSld>
     <p:spTree>
@@ -16847,390 +20719,6 @@
     <p:extLst>
       <p:ext uri="{BB962C8B-B14F-4D97-AF65-F5344CB8AC3E}">
         <p14:creationId xmlns:p14="http://schemas.microsoft.com/office/powerpoint/2010/main" val="3686965534"/>
-      </p:ext>
-    </p:extLst>
-  </p:cSld>
-  <p:clrMapOvr>
-    <a:masterClrMapping/>
-  </p:clrMapOvr>
-</p:sld>
-</file>
-
-<file path=ppt/slides/slide4.xml><?xml version="1.0" encoding="utf-8"?>
-<p:sld xmlns:a="http://schemas.openxmlformats.org/drawingml/2006/main" xmlns:r="http://schemas.openxmlformats.org/officeDocument/2006/relationships" xmlns:p="http://schemas.openxmlformats.org/presentationml/2006/main">
-  <p:cSld>
-    <p:spTree>
-      <p:nvGrpSpPr>
-        <p:cNvPr id="1" name=""/>
-        <p:cNvGrpSpPr/>
-        <p:nvPr/>
-      </p:nvGrpSpPr>
-      <p:grpSpPr>
-        <a:xfrm>
-          <a:off x="0" y="0"/>
-          <a:ext cx="0" cy="0"/>
-          <a:chOff x="0" y="0"/>
-          <a:chExt cx="0" cy="0"/>
-        </a:xfrm>
-      </p:grpSpPr>
-      <p:pic>
-        <p:nvPicPr>
-          <p:cNvPr id="3" name="Imagen 2">
-            <a:extLst>
-              <a:ext uri="{FF2B5EF4-FFF2-40B4-BE49-F238E27FC236}">
-                <a16:creationId xmlns:a16="http://schemas.microsoft.com/office/drawing/2014/main" id="{52C61192-5480-47E0-B6A7-9FEA92DDC317}"/>
-              </a:ext>
-            </a:extLst>
-          </p:cNvPr>
-          <p:cNvPicPr>
-            <a:picLocks noChangeAspect="1"/>
-          </p:cNvPicPr>
-          <p:nvPr/>
-        </p:nvPicPr>
-        <p:blipFill>
-          <a:blip r:embed="rId2"/>
-          <a:stretch>
-            <a:fillRect/>
-          </a:stretch>
-        </p:blipFill>
-        <p:spPr>
-          <a:xfrm>
-            <a:off x="776238" y="1318832"/>
-            <a:ext cx="4686099" cy="2551710"/>
-          </a:xfrm>
-          <a:prstGeom prst="rect">
-            <a:avLst/>
-          </a:prstGeom>
-        </p:spPr>
-      </p:pic>
-      <p:sp>
-        <p:nvSpPr>
-          <p:cNvPr id="4" name="CuadroTexto 3">
-            <a:extLst>
-              <a:ext uri="{FF2B5EF4-FFF2-40B4-BE49-F238E27FC236}">
-                <a16:creationId xmlns:a16="http://schemas.microsoft.com/office/drawing/2014/main" id="{DDED7E18-0555-43C4-99AC-AE25E90EC659}"/>
-              </a:ext>
-            </a:extLst>
-          </p:cNvPr>
-          <p:cNvSpPr txBox="1"/>
-          <p:nvPr/>
-        </p:nvSpPr>
-        <p:spPr>
-          <a:xfrm>
-            <a:off x="1943301" y="3870542"/>
-            <a:ext cx="1955985" cy="307777"/>
-          </a:xfrm>
-          <a:prstGeom prst="rect">
-            <a:avLst/>
-          </a:prstGeom>
-          <a:noFill/>
-        </p:spPr>
-        <p:txBody>
-          <a:bodyPr wrap="none" rtlCol="0">
-            <a:spAutoFit/>
-          </a:bodyPr>
-          <a:lstStyle/>
-          <a:p>
-            <a:r>
-              <a:rPr lang="es-ES" sz="1400" dirty="0"/>
-              <a:t>Fuente: </a:t>
-            </a:r>
-            <a:r>
-              <a:rPr lang="es-ES" sz="1400" dirty="0" err="1"/>
-              <a:t>refactoring</a:t>
-            </a:r>
-            <a:r>
-              <a:rPr lang="es-ES" sz="1400" dirty="0"/>
-              <a:t> </a:t>
-            </a:r>
-            <a:r>
-              <a:rPr lang="es-ES" sz="1400" dirty="0" err="1"/>
-              <a:t>guru</a:t>
-            </a:r>
-            <a:endParaRPr lang="es-419" sz="1400" dirty="0"/>
-          </a:p>
-        </p:txBody>
-      </p:sp>
-      <p:pic>
-        <p:nvPicPr>
-          <p:cNvPr id="8" name="Imagen 7">
-            <a:extLst>
-              <a:ext uri="{FF2B5EF4-FFF2-40B4-BE49-F238E27FC236}">
-                <a16:creationId xmlns:a16="http://schemas.microsoft.com/office/drawing/2014/main" id="{4AFE1997-E721-45A1-9300-2A907226A5DB}"/>
-              </a:ext>
-            </a:extLst>
-          </p:cNvPr>
-          <p:cNvPicPr>
-            <a:picLocks noChangeAspect="1"/>
-          </p:cNvPicPr>
-          <p:nvPr/>
-        </p:nvPicPr>
-        <p:blipFill>
-          <a:blip r:embed="rId3"/>
-          <a:stretch>
-            <a:fillRect/>
-          </a:stretch>
-        </p:blipFill>
-        <p:spPr>
-          <a:xfrm>
-            <a:off x="6310292" y="3163315"/>
-            <a:ext cx="4686099" cy="2712472"/>
-          </a:xfrm>
-          <a:prstGeom prst="rect">
-            <a:avLst/>
-          </a:prstGeom>
-        </p:spPr>
-      </p:pic>
-      <p:sp>
-        <p:nvSpPr>
-          <p:cNvPr id="9" name="CuadroTexto 8">
-            <a:extLst>
-              <a:ext uri="{FF2B5EF4-FFF2-40B4-BE49-F238E27FC236}">
-                <a16:creationId xmlns:a16="http://schemas.microsoft.com/office/drawing/2014/main" id="{95595F12-9572-472F-9693-0F6A7B687CB6}"/>
-              </a:ext>
-            </a:extLst>
-          </p:cNvPr>
-          <p:cNvSpPr txBox="1"/>
-          <p:nvPr/>
-        </p:nvSpPr>
-        <p:spPr>
-          <a:xfrm>
-            <a:off x="7798670" y="5875787"/>
-            <a:ext cx="1955985" cy="307777"/>
-          </a:xfrm>
-          <a:prstGeom prst="rect">
-            <a:avLst/>
-          </a:prstGeom>
-          <a:noFill/>
-        </p:spPr>
-        <p:txBody>
-          <a:bodyPr wrap="none" rtlCol="0">
-            <a:spAutoFit/>
-          </a:bodyPr>
-          <a:lstStyle/>
-          <a:p>
-            <a:r>
-              <a:rPr lang="es-ES" sz="1400" dirty="0"/>
-              <a:t>Fuente: </a:t>
-            </a:r>
-            <a:r>
-              <a:rPr lang="es-ES" sz="1400" dirty="0" err="1"/>
-              <a:t>refactoring</a:t>
-            </a:r>
-            <a:r>
-              <a:rPr lang="es-ES" sz="1400" dirty="0"/>
-              <a:t> </a:t>
-            </a:r>
-            <a:r>
-              <a:rPr lang="es-ES" sz="1400" dirty="0" err="1"/>
-              <a:t>guru</a:t>
-            </a:r>
-            <a:endParaRPr lang="es-419" sz="1400" dirty="0"/>
-          </a:p>
-        </p:txBody>
-      </p:sp>
-      <p:sp>
-        <p:nvSpPr>
-          <p:cNvPr id="10" name="CuadroTexto 9">
-            <a:extLst>
-              <a:ext uri="{FF2B5EF4-FFF2-40B4-BE49-F238E27FC236}">
-                <a16:creationId xmlns:a16="http://schemas.microsoft.com/office/drawing/2014/main" id="{2C540134-ED54-442A-821A-0A4A96F2537F}"/>
-              </a:ext>
-            </a:extLst>
-          </p:cNvPr>
-          <p:cNvSpPr txBox="1"/>
-          <p:nvPr/>
-        </p:nvSpPr>
-        <p:spPr>
-          <a:xfrm>
-            <a:off x="1033526" y="469231"/>
-            <a:ext cx="3609065" cy="646331"/>
-          </a:xfrm>
-          <a:prstGeom prst="rect">
-            <a:avLst/>
-          </a:prstGeom>
-          <a:noFill/>
-        </p:spPr>
-        <p:txBody>
-          <a:bodyPr wrap="none" rtlCol="0">
-            <a:spAutoFit/>
-          </a:bodyPr>
-          <a:lstStyle/>
-          <a:p>
-            <a:r>
-              <a:rPr lang="es-ES" sz="3600" dirty="0"/>
-              <a:t>El diseño estándar</a:t>
-            </a:r>
-            <a:endParaRPr lang="es-419" sz="3600" dirty="0"/>
-          </a:p>
-        </p:txBody>
-      </p:sp>
-    </p:spTree>
-    <p:extLst>
-      <p:ext uri="{BB962C8B-B14F-4D97-AF65-F5344CB8AC3E}">
-        <p14:creationId xmlns:p14="http://schemas.microsoft.com/office/powerpoint/2010/main" val="2682431457"/>
-      </p:ext>
-    </p:extLst>
-  </p:cSld>
-  <p:clrMapOvr>
-    <a:masterClrMapping/>
-  </p:clrMapOvr>
-</p:sld>
-</file>
-
-<file path=ppt/slides/slide5.xml><?xml version="1.0" encoding="utf-8"?>
-<p:sld xmlns:a="http://schemas.openxmlformats.org/drawingml/2006/main" xmlns:r="http://schemas.openxmlformats.org/officeDocument/2006/relationships" xmlns:p="http://schemas.openxmlformats.org/presentationml/2006/main">
-  <p:cSld>
-    <p:spTree>
-      <p:nvGrpSpPr>
-        <p:cNvPr id="1" name=""/>
-        <p:cNvGrpSpPr/>
-        <p:nvPr/>
-      </p:nvGrpSpPr>
-      <p:grpSpPr>
-        <a:xfrm>
-          <a:off x="0" y="0"/>
-          <a:ext cx="0" cy="0"/>
-          <a:chOff x="0" y="0"/>
-          <a:chExt cx="0" cy="0"/>
-        </a:xfrm>
-      </p:grpSpPr>
-      <p:sp>
-        <p:nvSpPr>
-          <p:cNvPr id="4" name="CuadroTexto 3">
-            <a:extLst>
-              <a:ext uri="{FF2B5EF4-FFF2-40B4-BE49-F238E27FC236}">
-                <a16:creationId xmlns:a16="http://schemas.microsoft.com/office/drawing/2014/main" id="{9B382B03-E611-49E9-A7A5-B1D6FF135692}"/>
-              </a:ext>
-            </a:extLst>
-          </p:cNvPr>
-          <p:cNvSpPr txBox="1"/>
-          <p:nvPr/>
-        </p:nvSpPr>
-        <p:spPr>
-          <a:xfrm>
-            <a:off x="1033526" y="469231"/>
-            <a:ext cx="2964401" cy="646331"/>
-          </a:xfrm>
-          <a:prstGeom prst="rect">
-            <a:avLst/>
-          </a:prstGeom>
-          <a:noFill/>
-        </p:spPr>
-        <p:txBody>
-          <a:bodyPr wrap="none" rtlCol="0">
-            <a:spAutoFit/>
-          </a:bodyPr>
-          <a:lstStyle/>
-          <a:p>
-            <a:r>
-              <a:rPr lang="es-ES" sz="3600" dirty="0"/>
-              <a:t>Diagrama UML</a:t>
-            </a:r>
-            <a:endParaRPr lang="es-419" sz="3600" dirty="0"/>
-          </a:p>
-        </p:txBody>
-      </p:sp>
-      <p:pic>
-        <p:nvPicPr>
-          <p:cNvPr id="7" name="Imagen 6">
-            <a:extLst>
-              <a:ext uri="{FF2B5EF4-FFF2-40B4-BE49-F238E27FC236}">
-                <a16:creationId xmlns:a16="http://schemas.microsoft.com/office/drawing/2014/main" id="{75AA4496-DD70-4B2F-90E1-C96122774DE4}"/>
-              </a:ext>
-            </a:extLst>
-          </p:cNvPr>
-          <p:cNvPicPr>
-            <a:picLocks noChangeAspect="1"/>
-          </p:cNvPicPr>
-          <p:nvPr/>
-        </p:nvPicPr>
-        <p:blipFill>
-          <a:blip r:embed="rId2"/>
-          <a:stretch>
-            <a:fillRect/>
-          </a:stretch>
-        </p:blipFill>
-        <p:spPr>
-          <a:xfrm>
-            <a:off x="9670411" y="4301595"/>
-            <a:ext cx="1458275" cy="1101808"/>
-          </a:xfrm>
-          <a:prstGeom prst="rect">
-            <a:avLst/>
-          </a:prstGeom>
-        </p:spPr>
-      </p:pic>
-      <p:sp>
-        <p:nvSpPr>
-          <p:cNvPr id="8" name="CuadroTexto 7">
-            <a:extLst>
-              <a:ext uri="{FF2B5EF4-FFF2-40B4-BE49-F238E27FC236}">
-                <a16:creationId xmlns:a16="http://schemas.microsoft.com/office/drawing/2014/main" id="{2D3FE2CF-6422-49F4-AF26-E92C6300C53C}"/>
-              </a:ext>
-            </a:extLst>
-          </p:cNvPr>
-          <p:cNvSpPr txBox="1"/>
-          <p:nvPr/>
-        </p:nvSpPr>
-        <p:spPr>
-          <a:xfrm>
-            <a:off x="9670411" y="5651654"/>
-            <a:ext cx="1722138" cy="369332"/>
-          </a:xfrm>
-          <a:prstGeom prst="rect">
-            <a:avLst/>
-          </a:prstGeom>
-          <a:noFill/>
-        </p:spPr>
-        <p:txBody>
-          <a:bodyPr wrap="none" rtlCol="0">
-            <a:spAutoFit/>
-          </a:bodyPr>
-          <a:lstStyle/>
-          <a:p>
-            <a:r>
-              <a:rPr lang="es-ES" dirty="0"/>
-              <a:t>Implementemos</a:t>
-            </a:r>
-            <a:endParaRPr lang="es-419" dirty="0"/>
-          </a:p>
-        </p:txBody>
-      </p:sp>
-      <p:pic>
-        <p:nvPicPr>
-          <p:cNvPr id="10" name="Imagen 9">
-            <a:extLst>
-              <a:ext uri="{FF2B5EF4-FFF2-40B4-BE49-F238E27FC236}">
-                <a16:creationId xmlns:a16="http://schemas.microsoft.com/office/drawing/2014/main" id="{CC4FB159-D584-4D16-A44D-0AA1C693DE27}"/>
-              </a:ext>
-            </a:extLst>
-          </p:cNvPr>
-          <p:cNvPicPr>
-            <a:picLocks noChangeAspect="1"/>
-          </p:cNvPicPr>
-          <p:nvPr/>
-        </p:nvPicPr>
-        <p:blipFill>
-          <a:blip r:embed="rId3"/>
-          <a:stretch>
-            <a:fillRect/>
-          </a:stretch>
-        </p:blipFill>
-        <p:spPr>
-          <a:xfrm>
-            <a:off x="1156121" y="1973434"/>
-            <a:ext cx="7892540" cy="3429969"/>
-          </a:xfrm>
-          <a:prstGeom prst="rect">
-            <a:avLst/>
-          </a:prstGeom>
-        </p:spPr>
-      </p:pic>
-    </p:spTree>
-    <p:extLst>
-      <p:ext uri="{BB962C8B-B14F-4D97-AF65-F5344CB8AC3E}">
-        <p14:creationId xmlns:p14="http://schemas.microsoft.com/office/powerpoint/2010/main" val="2432000143"/>
       </p:ext>
     </p:extLst>
   </p:cSld>

</xml_diff>